<commit_message>
Starting Ramsey in datalistcreator
</commit_message>
<xml_diff>
--- a/2018_09_04DriftUpdate.pptx
+++ b/2018_09_04DriftUpdate.pptx
@@ -5,15 +5,20 @@
     <p:sldMasterId id="2147483667" r:id="rId1"/>
   </p:sldMasterIdLst>
   <p:notesMasterIdLst>
-    <p:notesMasterId r:id="rId5"/>
+    <p:notesMasterId r:id="rId10"/>
   </p:notesMasterIdLst>
   <p:handoutMasterIdLst>
-    <p:handoutMasterId r:id="rId6"/>
+    <p:handoutMasterId r:id="rId11"/>
   </p:handoutMasterIdLst>
   <p:sldIdLst>
     <p:sldId id="257" r:id="rId2"/>
     <p:sldId id="258" r:id="rId3"/>
     <p:sldId id="259" r:id="rId4"/>
+    <p:sldId id="260" r:id="rId5"/>
+    <p:sldId id="261" r:id="rId6"/>
+    <p:sldId id="262" r:id="rId7"/>
+    <p:sldId id="263" r:id="rId8"/>
+    <p:sldId id="264" r:id="rId9"/>
   </p:sldIdLst>
   <p:sldSz cx="12188825" cy="6858000"/>
   <p:notesSz cx="7010400" cy="9271000"/>
@@ -228,7 +233,7 @@
             <a:fld id="{2151C11E-1A00-48AF-8C08-97C362C67874}" type="datetimeFigureOut">
               <a:rPr lang="en-US" smtClean="0"/>
               <a:pPr/>
-              <a:t>9/4/2018</a:t>
+              <a:t>9/5/2018</a:t>
             </a:fld>
             <a:endParaRPr lang="en-US" dirty="0"/>
           </a:p>
@@ -399,7 +404,7 @@
             <a:fld id="{8C7BB64C-82E2-466C-9C50-B2DA6307AB11}" type="datetimeFigureOut">
               <a:rPr lang="en-US" smtClean="0"/>
               <a:pPr/>
-              <a:t>9/4/2018</a:t>
+              <a:t>9/5/2018</a:t>
             </a:fld>
             <a:endParaRPr lang="en-US" dirty="0"/>
           </a:p>
@@ -3155,9 +3160,6 @@
               </a:rPr>
               <a:t>For both experimental data and other simulations, use that function to find the 1-state probability of a normalized power spectrum peak.</a:t>
             </a:r>
-            <a:endParaRPr lang="en-US" b="0" dirty="0" smtClean="0">
-              <a:sym typeface="Wingdings" panose="05000000000000000000" pitchFamily="2" charset="2"/>
-            </a:endParaRPr>
           </a:p>
         </p:txBody>
       </p:sp>
@@ -3231,12 +3233,692 @@
           <a:p>
             <a:r>
               <a:rPr lang="en-US" dirty="0" smtClean="0"/>
-              <a:t>Data Set #1</a:t>
+              <a:t>1. Relating per-gate </a:t>
+            </a:r>
+            <a:r>
+              <a:rPr lang="en-US" dirty="0" err="1" smtClean="0"/>
+              <a:t>overrotation</a:t>
+            </a:r>
+            <a:r>
+              <a:rPr lang="en-US" dirty="0" smtClean="0"/>
+              <a:t> angle to 1-state probability </a:t>
             </a:r>
             <a:endParaRPr lang="en-US" dirty="0"/>
           </a:p>
         </p:txBody>
       </p:sp>
+      <mc:AlternateContent xmlns:mc="http://schemas.openxmlformats.org/markup-compatibility/2006">
+        <mc:Choice xmlns:a14="http://schemas.microsoft.com/office/drawing/2010/main" Requires="a14">
+          <p:sp>
+            <p:nvSpPr>
+              <p:cNvPr id="4" name="TextBox 3"/>
+              <p:cNvSpPr txBox="1"/>
+              <p:nvPr/>
+            </p:nvSpPr>
+            <p:spPr>
+              <a:xfrm>
+                <a:off x="926211" y="1249544"/>
+                <a:ext cx="10336404" cy="1567737"/>
+              </a:xfrm>
+              <a:prstGeom prst="rect">
+                <a:avLst/>
+              </a:prstGeom>
+              <a:noFill/>
+            </p:spPr>
+            <p:txBody>
+              <a:bodyPr wrap="square" rtlCol="0">
+                <a:spAutoFit/>
+              </a:bodyPr>
+              <a:lstStyle/>
+              <a:p>
+                <a:r>
+                  <a:rPr lang="en-US" dirty="0" smtClean="0"/>
+                  <a:t>Example: applying a 5 </a:t>
+                </a:r>
+                <a:r>
+                  <a:rPr lang="en-US" dirty="0"/>
+                  <a:t>Hz, 0.008 amplitude oscillation with </a:t>
+                </a:r>
+                <a:r>
+                  <a:rPr lang="en-US" dirty="0" smtClean="0"/>
+                  <a:t>Gx49</a:t>
+                </a:r>
+              </a:p>
+              <a:p>
+                <a:endParaRPr lang="en-US" dirty="0"/>
+              </a:p>
+              <a:p>
+                <a:pPr marL="285750" indent="-285750">
+                  <a:buFont typeface="Arial" panose="020B0604020202020204" pitchFamily="34" charset="0"/>
+                  <a:buChar char="•"/>
+                </a:pPr>
+                <a:r>
+                  <a:rPr lang="en-US" dirty="0" smtClean="0"/>
+                  <a:t>I don’t change the 1-state probability directly, or even the total </a:t>
+                </a:r>
+                <a:r>
+                  <a:rPr lang="en-US" dirty="0" err="1" smtClean="0"/>
+                  <a:t>overrotation</a:t>
+                </a:r>
+                <a:r>
+                  <a:rPr lang="en-US" dirty="0" smtClean="0"/>
+                  <a:t>. All I define is the probability that at any given time </a:t>
+                </a:r>
+                <a:r>
+                  <a:rPr lang="en-US" i="1" dirty="0" smtClean="0"/>
+                  <a:t>t</a:t>
+                </a:r>
+                <a:r>
+                  <a:rPr lang="en-US" dirty="0" smtClean="0"/>
+                  <a:t>, applying a single </a:t>
+                </a:r>
+                <a:r>
+                  <a:rPr lang="en-US" dirty="0" err="1" smtClean="0"/>
+                  <a:t>Gx</a:t>
+                </a:r>
+                <a:r>
+                  <a:rPr lang="en-US" dirty="0" smtClean="0"/>
+                  <a:t> will rotate by the angle: </a:t>
+                </a:r>
+              </a:p>
+              <a:p>
+                <a:pPr lvl="3"/>
+                <a14:m>
+                  <m:oMath xmlns:m="http://schemas.openxmlformats.org/officeDocument/2006/math">
+                    <m:r>
+                      <a:rPr lang="en-US" i="1" smtClean="0">
+                        <a:latin typeface="Cambria Math" panose="02040503050406030204" pitchFamily="18" charset="0"/>
+                        <a:ea typeface="Cambria Math" panose="02040503050406030204" pitchFamily="18" charset="0"/>
+                      </a:rPr>
+                      <m:t>𝜃</m:t>
+                    </m:r>
+                    <m:d>
+                      <m:dPr>
+                        <m:ctrlPr>
+                          <a:rPr lang="en-US" i="1">
+                            <a:latin typeface="Cambria Math" panose="02040503050406030204" pitchFamily="18" charset="0"/>
+                            <a:ea typeface="Cambria Math" panose="02040503050406030204" pitchFamily="18" charset="0"/>
+                          </a:rPr>
+                        </m:ctrlPr>
+                      </m:dPr>
+                      <m:e>
+                        <m:r>
+                          <a:rPr lang="en-US" i="1">
+                            <a:latin typeface="Cambria Math" panose="02040503050406030204" pitchFamily="18" charset="0"/>
+                            <a:ea typeface="Cambria Math" panose="02040503050406030204" pitchFamily="18" charset="0"/>
+                          </a:rPr>
+                          <m:t>𝑡</m:t>
+                        </m:r>
+                      </m:e>
+                    </m:d>
+                    <m:r>
+                      <a:rPr lang="en-US" i="1">
+                        <a:latin typeface="Cambria Math" panose="02040503050406030204" pitchFamily="18" charset="0"/>
+                        <a:ea typeface="Cambria Math" panose="02040503050406030204" pitchFamily="18" charset="0"/>
+                      </a:rPr>
+                      <m:t>=</m:t>
+                    </m:r>
+                    <m:f>
+                      <m:fPr>
+                        <m:ctrlPr>
+                          <a:rPr lang="en-US" i="1" smtClean="0">
+                            <a:latin typeface="Cambria Math" panose="02040503050406030204" pitchFamily="18" charset="0"/>
+                            <a:ea typeface="Cambria Math" panose="02040503050406030204" pitchFamily="18" charset="0"/>
+                          </a:rPr>
+                        </m:ctrlPr>
+                      </m:fPr>
+                      <m:num>
+                        <m:r>
+                          <a:rPr lang="en-US" i="1" smtClean="0">
+                            <a:latin typeface="Cambria Math" panose="02040503050406030204" pitchFamily="18" charset="0"/>
+                            <a:ea typeface="Cambria Math" panose="02040503050406030204" pitchFamily="18" charset="0"/>
+                          </a:rPr>
+                          <m:t>𝜋</m:t>
+                        </m:r>
+                      </m:num>
+                      <m:den>
+                        <m:r>
+                          <a:rPr lang="en-US" b="0" i="1" smtClean="0">
+                            <a:latin typeface="Cambria Math" panose="02040503050406030204" pitchFamily="18" charset="0"/>
+                            <a:ea typeface="Cambria Math" panose="02040503050406030204" pitchFamily="18" charset="0"/>
+                          </a:rPr>
+                          <m:t>2</m:t>
+                        </m:r>
+                      </m:den>
+                    </m:f>
+                    <m:r>
+                      <a:rPr lang="en-US" b="0" i="1" smtClean="0">
+                        <a:latin typeface="Cambria Math" panose="02040503050406030204" pitchFamily="18" charset="0"/>
+                        <a:ea typeface="Cambria Math" panose="02040503050406030204" pitchFamily="18" charset="0"/>
+                      </a:rPr>
+                      <m:t>+</m:t>
+                    </m:r>
+                    <m:r>
+                      <a:rPr lang="en-US" b="0" i="1" smtClean="0">
+                        <a:latin typeface="Cambria Math" panose="02040503050406030204" pitchFamily="18" charset="0"/>
+                        <a:ea typeface="Cambria Math" panose="02040503050406030204" pitchFamily="18" charset="0"/>
+                      </a:rPr>
+                      <m:t>𝜀</m:t>
+                    </m:r>
+                    <m:r>
+                      <a:rPr lang="en-US" b="0" i="1" smtClean="0">
+                        <a:latin typeface="Cambria Math" panose="02040503050406030204" pitchFamily="18" charset="0"/>
+                        <a:ea typeface="Cambria Math" panose="02040503050406030204" pitchFamily="18" charset="0"/>
+                      </a:rPr>
+                      <m:t>(</m:t>
+                    </m:r>
+                    <m:r>
+                      <a:rPr lang="en-US" b="0" i="1" smtClean="0">
+                        <a:latin typeface="Cambria Math" panose="02040503050406030204" pitchFamily="18" charset="0"/>
+                        <a:ea typeface="Cambria Math" panose="02040503050406030204" pitchFamily="18" charset="0"/>
+                      </a:rPr>
+                      <m:t>𝑡</m:t>
+                    </m:r>
+                    <m:r>
+                      <a:rPr lang="en-US" b="0" i="1" smtClean="0">
+                        <a:latin typeface="Cambria Math" panose="02040503050406030204" pitchFamily="18" charset="0"/>
+                        <a:ea typeface="Cambria Math" panose="02040503050406030204" pitchFamily="18" charset="0"/>
+                      </a:rPr>
+                      <m:t>)</m:t>
+                    </m:r>
+                  </m:oMath>
+                </a14:m>
+                <a:r>
+                  <a:rPr lang="en-US" dirty="0" smtClean="0"/>
+                  <a:t>, where </a:t>
+                </a:r>
+                <a14:m>
+                  <m:oMath xmlns:m="http://schemas.openxmlformats.org/officeDocument/2006/math">
+                    <m:r>
+                      <m:rPr>
+                        <m:sty m:val="p"/>
+                      </m:rPr>
+                      <a:rPr lang="el-GR" i="1" smtClean="0">
+                        <a:latin typeface="Cambria Math" panose="02040503050406030204" pitchFamily="18" charset="0"/>
+                        <a:ea typeface="Cambria Math" panose="02040503050406030204" pitchFamily="18" charset="0"/>
+                      </a:rPr>
+                      <m:t>ε</m:t>
+                    </m:r>
+                    <m:d>
+                      <m:dPr>
+                        <m:ctrlPr>
+                          <a:rPr lang="en-US" b="0" i="1" smtClean="0">
+                            <a:latin typeface="Cambria Math" panose="02040503050406030204" pitchFamily="18" charset="0"/>
+                            <a:ea typeface="Cambria Math" panose="02040503050406030204" pitchFamily="18" charset="0"/>
+                          </a:rPr>
+                        </m:ctrlPr>
+                      </m:dPr>
+                      <m:e>
+                        <m:r>
+                          <a:rPr lang="en-US" b="0" i="1" smtClean="0">
+                            <a:latin typeface="Cambria Math" panose="02040503050406030204" pitchFamily="18" charset="0"/>
+                            <a:ea typeface="Cambria Math" panose="02040503050406030204" pitchFamily="18" charset="0"/>
+                          </a:rPr>
+                          <m:t>𝑡</m:t>
+                        </m:r>
+                      </m:e>
+                    </m:d>
+                    <m:r>
+                      <a:rPr lang="en-US" b="0" i="1" smtClean="0">
+                        <a:latin typeface="Cambria Math" panose="02040503050406030204" pitchFamily="18" charset="0"/>
+                        <a:ea typeface="Cambria Math" panose="02040503050406030204" pitchFamily="18" charset="0"/>
+                      </a:rPr>
+                      <m:t>= </m:t>
+                    </m:r>
+                    <m:r>
+                      <a:rPr lang="en-US" i="1">
+                        <a:latin typeface="Cambria Math" panose="02040503050406030204" pitchFamily="18" charset="0"/>
+                        <a:ea typeface="Cambria Math" panose="02040503050406030204" pitchFamily="18" charset="0"/>
+                      </a:rPr>
+                      <m:t>0</m:t>
+                    </m:r>
+                    <m:r>
+                      <a:rPr lang="en-US">
+                        <a:latin typeface="Cambria Math" panose="02040503050406030204" pitchFamily="18" charset="0"/>
+                        <a:ea typeface="Cambria Math" panose="02040503050406030204" pitchFamily="18" charset="0"/>
+                      </a:rPr>
+                      <m:t>.00</m:t>
+                    </m:r>
+                    <m:r>
+                      <a:rPr lang="en-US">
+                        <a:latin typeface="Cambria Math" panose="02040503050406030204" pitchFamily="18" charset="0"/>
+                        <a:ea typeface="Cambria Math" panose="02040503050406030204" pitchFamily="18" charset="0"/>
+                      </a:rPr>
+                      <m:t>8</m:t>
+                    </m:r>
+                    <m:func>
+                      <m:funcPr>
+                        <m:ctrlPr>
+                          <a:rPr lang="en-US" i="1">
+                            <a:latin typeface="Cambria Math" panose="02040503050406030204" pitchFamily="18" charset="0"/>
+                            <a:ea typeface="Cambria Math" panose="02040503050406030204" pitchFamily="18" charset="0"/>
+                          </a:rPr>
+                        </m:ctrlPr>
+                      </m:funcPr>
+                      <m:fName>
+                        <m:r>
+                          <m:rPr>
+                            <m:sty m:val="p"/>
+                          </m:rPr>
+                          <a:rPr lang="en-US">
+                            <a:latin typeface="Cambria Math" panose="02040503050406030204" pitchFamily="18" charset="0"/>
+                            <a:ea typeface="Cambria Math" panose="02040503050406030204" pitchFamily="18" charset="0"/>
+                          </a:rPr>
+                          <m:t>sin</m:t>
+                        </m:r>
+                      </m:fName>
+                      <m:e>
+                        <m:d>
+                          <m:dPr>
+                            <m:ctrlPr>
+                              <a:rPr lang="en-US" i="1">
+                                <a:latin typeface="Cambria Math" panose="02040503050406030204" pitchFamily="18" charset="0"/>
+                                <a:ea typeface="Cambria Math" panose="02040503050406030204" pitchFamily="18" charset="0"/>
+                              </a:rPr>
+                            </m:ctrlPr>
+                          </m:dPr>
+                          <m:e>
+                            <m:r>
+                              <a:rPr lang="en-US" i="1">
+                                <a:latin typeface="Cambria Math" panose="02040503050406030204" pitchFamily="18" charset="0"/>
+                                <a:ea typeface="Cambria Math" panose="02040503050406030204" pitchFamily="18" charset="0"/>
+                              </a:rPr>
+                              <m:t>2</m:t>
+                            </m:r>
+                            <m:r>
+                              <a:rPr lang="en-US" i="1">
+                                <a:latin typeface="Cambria Math" panose="02040503050406030204" pitchFamily="18" charset="0"/>
+                                <a:ea typeface="Cambria Math" panose="02040503050406030204" pitchFamily="18" charset="0"/>
+                              </a:rPr>
+                              <m:t>𝜋</m:t>
+                            </m:r>
+                            <m:r>
+                              <a:rPr lang="en-US" i="1">
+                                <a:latin typeface="Cambria Math" panose="02040503050406030204" pitchFamily="18" charset="0"/>
+                                <a:ea typeface="Cambria Math" panose="02040503050406030204" pitchFamily="18" charset="0"/>
+                              </a:rPr>
+                              <m:t>∗5∗</m:t>
+                            </m:r>
+                            <m:r>
+                              <a:rPr lang="en-US" i="1">
+                                <a:latin typeface="Cambria Math" panose="02040503050406030204" pitchFamily="18" charset="0"/>
+                                <a:ea typeface="Cambria Math" panose="02040503050406030204" pitchFamily="18" charset="0"/>
+                              </a:rPr>
+                              <m:t>𝑡</m:t>
+                            </m:r>
+                          </m:e>
+                        </m:d>
+                      </m:e>
+                    </m:func>
+                  </m:oMath>
+                </a14:m>
+                <a:endParaRPr lang="en-US" dirty="0"/>
+              </a:p>
+            </p:txBody>
+          </p:sp>
+        </mc:Choice>
+        <mc:Fallback>
+          <p:sp>
+            <p:nvSpPr>
+              <p:cNvPr id="4" name="TextBox 3"/>
+              <p:cNvSpPr txBox="1">
+                <a:spLocks noRot="1" noChangeAspect="1" noMove="1" noResize="1" noEditPoints="1" noAdjustHandles="1" noChangeArrowheads="1" noChangeShapeType="1" noTextEdit="1"/>
+              </p:cNvSpPr>
+              <p:nvPr/>
+            </p:nvSpPr>
+            <p:spPr>
+              <a:xfrm>
+                <a:off x="926211" y="1249544"/>
+                <a:ext cx="10336404" cy="1567737"/>
+              </a:xfrm>
+              <a:prstGeom prst="rect">
+                <a:avLst/>
+              </a:prstGeom>
+              <a:blipFill>
+                <a:blip r:embed="rId2"/>
+                <a:stretch>
+                  <a:fillRect l="-531" t="-2335" b="-1556"/>
+                </a:stretch>
+              </a:blipFill>
+            </p:spPr>
+            <p:txBody>
+              <a:bodyPr/>
+              <a:lstStyle/>
+              <a:p>
+                <a:r>
+                  <a:rPr lang="en-US">
+                    <a:noFill/>
+                  </a:rPr>
+                  <a:t> </a:t>
+                </a:r>
+              </a:p>
+            </p:txBody>
+          </p:sp>
+        </mc:Fallback>
+      </mc:AlternateContent>
+      <p:pic>
+        <p:nvPicPr>
+          <p:cNvPr id="5" name="Picture 4"/>
+          <p:cNvPicPr>
+            <a:picLocks noChangeAspect="1"/>
+          </p:cNvPicPr>
+          <p:nvPr/>
+        </p:nvPicPr>
+        <p:blipFill>
+          <a:blip r:embed="rId3"/>
+          <a:stretch>
+            <a:fillRect/>
+          </a:stretch>
+        </p:blipFill>
+        <p:spPr>
+          <a:xfrm>
+            <a:off x="152400" y="3656101"/>
+            <a:ext cx="3798276" cy="2583924"/>
+          </a:xfrm>
+          <a:prstGeom prst="rect">
+            <a:avLst/>
+          </a:prstGeom>
+        </p:spPr>
+      </p:pic>
+      <p:pic>
+        <p:nvPicPr>
+          <p:cNvPr id="8" name="Picture 7"/>
+          <p:cNvPicPr>
+            <a:picLocks noChangeAspect="1"/>
+          </p:cNvPicPr>
+          <p:nvPr/>
+        </p:nvPicPr>
+        <p:blipFill>
+          <a:blip r:embed="rId4"/>
+          <a:stretch>
+            <a:fillRect/>
+          </a:stretch>
+        </p:blipFill>
+        <p:spPr>
+          <a:xfrm>
+            <a:off x="4198549" y="3805525"/>
+            <a:ext cx="3761420" cy="2544490"/>
+          </a:xfrm>
+          <a:prstGeom prst="rect">
+            <a:avLst/>
+          </a:prstGeom>
+        </p:spPr>
+      </p:pic>
+      <p:pic>
+        <p:nvPicPr>
+          <p:cNvPr id="9" name="Picture 8"/>
+          <p:cNvPicPr>
+            <a:picLocks noChangeAspect="1"/>
+          </p:cNvPicPr>
+          <p:nvPr/>
+        </p:nvPicPr>
+        <p:blipFill>
+          <a:blip r:embed="rId5"/>
+          <a:stretch>
+            <a:fillRect/>
+          </a:stretch>
+        </p:blipFill>
+        <p:spPr>
+          <a:xfrm>
+            <a:off x="8306471" y="3805525"/>
+            <a:ext cx="3561039" cy="2504567"/>
+          </a:xfrm>
+          <a:prstGeom prst="rect">
+            <a:avLst/>
+          </a:prstGeom>
+        </p:spPr>
+      </p:pic>
+      <mc:AlternateContent xmlns:mc="http://schemas.openxmlformats.org/markup-compatibility/2006">
+        <mc:Choice xmlns:a14="http://schemas.microsoft.com/office/drawing/2010/main" Requires="a14">
+          <p:sp>
+            <p:nvSpPr>
+              <p:cNvPr id="2" name="Rectangle 1"/>
+              <p:cNvSpPr/>
+              <p:nvPr/>
+            </p:nvSpPr>
+            <p:spPr>
+              <a:xfrm>
+                <a:off x="1808488" y="3297693"/>
+                <a:ext cx="639983" cy="369332"/>
+              </a:xfrm>
+              <a:prstGeom prst="rect">
+                <a:avLst/>
+              </a:prstGeom>
+            </p:spPr>
+            <p:txBody>
+              <a:bodyPr wrap="none">
+                <a:spAutoFit/>
+              </a:bodyPr>
+              <a:lstStyle/>
+              <a:p>
+                <a14:m>
+                  <m:oMathPara xmlns:m="http://schemas.openxmlformats.org/officeDocument/2006/math">
+                    <m:oMathParaPr>
+                      <m:jc m:val="centerGroup"/>
+                    </m:oMathParaPr>
+                    <m:oMath xmlns:m="http://schemas.openxmlformats.org/officeDocument/2006/math">
+                      <m:r>
+                        <m:rPr>
+                          <m:sty m:val="p"/>
+                        </m:rPr>
+                        <a:rPr lang="el-GR" i="1">
+                          <a:latin typeface="Cambria Math" panose="02040503050406030204" pitchFamily="18" charset="0"/>
+                          <a:ea typeface="Cambria Math" panose="02040503050406030204" pitchFamily="18" charset="0"/>
+                        </a:rPr>
+                        <m:t>ε</m:t>
+                      </m:r>
+                      <m:d>
+                        <m:dPr>
+                          <m:ctrlPr>
+                            <a:rPr lang="en-US" i="1">
+                              <a:latin typeface="Cambria Math" panose="02040503050406030204" pitchFamily="18" charset="0"/>
+                              <a:ea typeface="Cambria Math" panose="02040503050406030204" pitchFamily="18" charset="0"/>
+                            </a:rPr>
+                          </m:ctrlPr>
+                        </m:dPr>
+                        <m:e>
+                          <m:r>
+                            <a:rPr lang="en-US" i="1">
+                              <a:latin typeface="Cambria Math" panose="02040503050406030204" pitchFamily="18" charset="0"/>
+                              <a:ea typeface="Cambria Math" panose="02040503050406030204" pitchFamily="18" charset="0"/>
+                            </a:rPr>
+                            <m:t>𝑡</m:t>
+                          </m:r>
+                        </m:e>
+                      </m:d>
+                    </m:oMath>
+                  </m:oMathPara>
+                </a14:m>
+                <a:endParaRPr lang="en-US" dirty="0"/>
+              </a:p>
+            </p:txBody>
+          </p:sp>
+        </mc:Choice>
+        <mc:Fallback>
+          <p:sp>
+            <p:nvSpPr>
+              <p:cNvPr id="2" name="Rectangle 1"/>
+              <p:cNvSpPr>
+                <a:spLocks noRot="1" noChangeAspect="1" noMove="1" noResize="1" noEditPoints="1" noAdjustHandles="1" noChangeArrowheads="1" noChangeShapeType="1" noTextEdit="1"/>
+              </p:cNvSpPr>
+              <p:nvPr/>
+            </p:nvSpPr>
+            <p:spPr>
+              <a:xfrm>
+                <a:off x="1808488" y="3297693"/>
+                <a:ext cx="639983" cy="369332"/>
+              </a:xfrm>
+              <a:prstGeom prst="rect">
+                <a:avLst/>
+              </a:prstGeom>
+              <a:blipFill>
+                <a:blip r:embed="rId6"/>
+                <a:stretch>
+                  <a:fillRect/>
+                </a:stretch>
+              </a:blipFill>
+            </p:spPr>
+            <p:txBody>
+              <a:bodyPr/>
+              <a:lstStyle/>
+              <a:p>
+                <a:r>
+                  <a:rPr lang="en-US">
+                    <a:noFill/>
+                  </a:rPr>
+                  <a:t> </a:t>
+                </a:r>
+              </a:p>
+            </p:txBody>
+          </p:sp>
+        </mc:Fallback>
+      </mc:AlternateContent>
+      <p:sp>
+        <p:nvSpPr>
+          <p:cNvPr id="10" name="Rectangle 9"/>
+          <p:cNvSpPr/>
+          <p:nvPr/>
+        </p:nvSpPr>
+        <p:spPr>
+          <a:xfrm>
+            <a:off x="8762816" y="3159194"/>
+            <a:ext cx="2886880" cy="646331"/>
+          </a:xfrm>
+          <a:prstGeom prst="rect">
+            <a:avLst/>
+          </a:prstGeom>
+        </p:spPr>
+        <p:txBody>
+          <a:bodyPr wrap="square">
+            <a:spAutoFit/>
+          </a:bodyPr>
+          <a:lstStyle/>
+          <a:p>
+            <a:r>
+              <a:rPr lang="en-US" dirty="0" smtClean="0"/>
+              <a:t>1-state probability after 49 </a:t>
+            </a:r>
+            <a:r>
+              <a:rPr lang="en-US" dirty="0" err="1" smtClean="0"/>
+              <a:t>Gx</a:t>
+            </a:r>
+            <a:r>
+              <a:rPr lang="en-US" dirty="0" smtClean="0"/>
+              <a:t> gates</a:t>
+            </a:r>
+            <a:endParaRPr lang="en-US" dirty="0"/>
+          </a:p>
+        </p:txBody>
+      </p:sp>
+      <mc:AlternateContent xmlns:mc="http://schemas.openxmlformats.org/markup-compatibility/2006">
+        <mc:Choice xmlns:a14="http://schemas.microsoft.com/office/drawing/2010/main" Requires="a14">
+          <p:sp>
+            <p:nvSpPr>
+              <p:cNvPr id="11" name="Rectangle 10"/>
+              <p:cNvSpPr/>
+              <p:nvPr/>
+            </p:nvSpPr>
+            <p:spPr>
+              <a:xfrm>
+                <a:off x="4825923" y="3297693"/>
+                <a:ext cx="2571923" cy="369332"/>
+              </a:xfrm>
+              <a:prstGeom prst="rect">
+                <a:avLst/>
+              </a:prstGeom>
+            </p:spPr>
+            <p:txBody>
+              <a:bodyPr wrap="none">
+                <a:spAutoFit/>
+              </a:bodyPr>
+              <a:lstStyle/>
+              <a:p>
+                <a14:m>
+                  <m:oMath xmlns:m="http://schemas.openxmlformats.org/officeDocument/2006/math">
+                    <m:r>
+                      <a:rPr lang="en-US" i="1">
+                        <a:latin typeface="Cambria Math" panose="02040503050406030204" pitchFamily="18" charset="0"/>
+                        <a:ea typeface="Cambria Math" panose="02040503050406030204" pitchFamily="18" charset="0"/>
+                      </a:rPr>
+                      <m:t>𝜃</m:t>
+                    </m:r>
+                    <m:d>
+                      <m:dPr>
+                        <m:ctrlPr>
+                          <a:rPr lang="en-US" i="1">
+                            <a:latin typeface="Cambria Math" panose="02040503050406030204" pitchFamily="18" charset="0"/>
+                            <a:ea typeface="Cambria Math" panose="02040503050406030204" pitchFamily="18" charset="0"/>
+                          </a:rPr>
+                        </m:ctrlPr>
+                      </m:dPr>
+                      <m:e>
+                        <m:r>
+                          <a:rPr lang="en-US" i="1">
+                            <a:latin typeface="Cambria Math" panose="02040503050406030204" pitchFamily="18" charset="0"/>
+                            <a:ea typeface="Cambria Math" panose="02040503050406030204" pitchFamily="18" charset="0"/>
+                          </a:rPr>
+                          <m:t>𝑡</m:t>
+                        </m:r>
+                      </m:e>
+                    </m:d>
+                  </m:oMath>
+                </a14:m>
+                <a:r>
+                  <a:rPr lang="en-US" dirty="0" smtClean="0"/>
+                  <a:t> x 49 (49 </a:t>
+                </a:r>
+                <a:r>
+                  <a:rPr lang="en-US" dirty="0" err="1" smtClean="0"/>
+                  <a:t>Gx</a:t>
+                </a:r>
+                <a:r>
+                  <a:rPr lang="en-US" dirty="0" smtClean="0"/>
+                  <a:t> gates)</a:t>
+                </a:r>
+                <a:endParaRPr lang="en-US" dirty="0"/>
+              </a:p>
+            </p:txBody>
+          </p:sp>
+        </mc:Choice>
+        <mc:Fallback>
+          <p:sp>
+            <p:nvSpPr>
+              <p:cNvPr id="11" name="Rectangle 10"/>
+              <p:cNvSpPr>
+                <a:spLocks noRot="1" noChangeAspect="1" noMove="1" noResize="1" noEditPoints="1" noAdjustHandles="1" noChangeArrowheads="1" noChangeShapeType="1" noTextEdit="1"/>
+              </p:cNvSpPr>
+              <p:nvPr/>
+            </p:nvSpPr>
+            <p:spPr>
+              <a:xfrm>
+                <a:off x="4825923" y="3297693"/>
+                <a:ext cx="2571923" cy="369332"/>
+              </a:xfrm>
+              <a:prstGeom prst="rect">
+                <a:avLst/>
+              </a:prstGeom>
+              <a:blipFill>
+                <a:blip r:embed="rId7"/>
+                <a:stretch>
+                  <a:fillRect t="-9836" r="-1185" b="-24590"/>
+                </a:stretch>
+              </a:blipFill>
+            </p:spPr>
+            <p:txBody>
+              <a:bodyPr/>
+              <a:lstStyle/>
+              <a:p>
+                <a:r>
+                  <a:rPr lang="en-US">
+                    <a:noFill/>
+                  </a:rPr>
+                  <a:t> </a:t>
+                </a:r>
+              </a:p>
+            </p:txBody>
+          </p:sp>
+        </mc:Fallback>
+      </mc:AlternateContent>
     </p:spTree>
     <p:extLst>
       <p:ext uri="{BB962C8B-B14F-4D97-AF65-F5344CB8AC3E}">
@@ -3282,14 +3964,2342 @@
           <a:bodyPr/>
           <a:lstStyle/>
           <a:p>
+            <a:r>
+              <a:rPr lang="en-US" dirty="0" smtClean="0"/>
+              <a:t>2. Vary the </a:t>
+            </a:r>
+            <a:r>
+              <a:rPr lang="en-US" dirty="0" err="1" smtClean="0"/>
+              <a:t>overrotation</a:t>
+            </a:r>
+            <a:r>
+              <a:rPr lang="en-US" dirty="0" smtClean="0"/>
+              <a:t> angle amplitude over multiple trials</a:t>
+            </a:r>
             <a:endParaRPr lang="en-US" dirty="0"/>
+          </a:p>
+        </p:txBody>
+      </p:sp>
+      <p:pic>
+        <p:nvPicPr>
+          <p:cNvPr id="2" name="Picture 1"/>
+          <p:cNvPicPr>
+            <a:picLocks noChangeAspect="1"/>
+          </p:cNvPicPr>
+          <p:nvPr/>
+        </p:nvPicPr>
+        <p:blipFill>
+          <a:blip r:embed="rId2"/>
+          <a:stretch>
+            <a:fillRect/>
+          </a:stretch>
+        </p:blipFill>
+        <p:spPr>
+          <a:xfrm>
+            <a:off x="5063821" y="2183642"/>
+            <a:ext cx="4783563" cy="3425693"/>
+          </a:xfrm>
+          <a:prstGeom prst="rect">
+            <a:avLst/>
+          </a:prstGeom>
+        </p:spPr>
+      </p:pic>
+      <p:sp>
+        <p:nvSpPr>
+          <p:cNvPr id="4" name="TextBox 3"/>
+          <p:cNvSpPr txBox="1"/>
+          <p:nvPr/>
+        </p:nvSpPr>
+        <p:spPr>
+          <a:xfrm>
+            <a:off x="1148861" y="1322283"/>
+            <a:ext cx="10339754" cy="523220"/>
+          </a:xfrm>
+          <a:prstGeom prst="rect">
+            <a:avLst/>
+          </a:prstGeom>
+          <a:noFill/>
+        </p:spPr>
+        <p:txBody>
+          <a:bodyPr wrap="square" rtlCol="0">
+            <a:spAutoFit/>
+          </a:bodyPr>
+          <a:lstStyle/>
+          <a:p>
+            <a:pPr algn="ctr"/>
+            <a:r>
+              <a:rPr lang="en-US" sz="1400" dirty="0" smtClean="0"/>
+              <a:t>***Normalized spectrum = absolute spectrum divided by the number of samples, so that all power values are between 0 and 1 (total normalized power sums to 1)</a:t>
+            </a:r>
+            <a:endParaRPr lang="en-US" sz="1400" dirty="0"/>
+          </a:p>
+        </p:txBody>
+      </p:sp>
+      <mc:AlternateContent xmlns:mc="http://schemas.openxmlformats.org/markup-compatibility/2006">
+        <mc:Choice xmlns:a14="http://schemas.microsoft.com/office/drawing/2010/main" Requires="a14">
+          <p:sp>
+            <p:nvSpPr>
+              <p:cNvPr id="5" name="Rectangle 4"/>
+              <p:cNvSpPr/>
+              <p:nvPr/>
+            </p:nvSpPr>
+            <p:spPr>
+              <a:xfrm>
+                <a:off x="1930166" y="3295636"/>
+                <a:ext cx="2640658" cy="923330"/>
+              </a:xfrm>
+              <a:prstGeom prst="rect">
+                <a:avLst/>
+              </a:prstGeom>
+            </p:spPr>
+            <p:txBody>
+              <a:bodyPr wrap="none">
+                <a:spAutoFit/>
+              </a:bodyPr>
+              <a:lstStyle/>
+              <a:p>
+                <a:pPr algn="ctr"/>
+                <a:r>
+                  <a:rPr lang="en-US" dirty="0" smtClean="0">
+                    <a:ea typeface="Cambria Math" panose="02040503050406030204" pitchFamily="18" charset="0"/>
+                  </a:rPr>
+                  <a:t>Vary </a:t>
+                </a:r>
+                <a14:m>
+                  <m:oMath xmlns:m="http://schemas.openxmlformats.org/officeDocument/2006/math">
+                    <m:r>
+                      <m:rPr>
+                        <m:sty m:val="p"/>
+                      </m:rPr>
+                      <a:rPr lang="el-GR" i="1">
+                        <a:latin typeface="Cambria Math" panose="02040503050406030204" pitchFamily="18" charset="0"/>
+                        <a:ea typeface="Cambria Math" panose="02040503050406030204" pitchFamily="18" charset="0"/>
+                      </a:rPr>
+                      <m:t>ε</m:t>
+                    </m:r>
+                    <m:d>
+                      <m:dPr>
+                        <m:ctrlPr>
+                          <a:rPr lang="en-US" i="1">
+                            <a:latin typeface="Cambria Math" panose="02040503050406030204" pitchFamily="18" charset="0"/>
+                            <a:ea typeface="Cambria Math" panose="02040503050406030204" pitchFamily="18" charset="0"/>
+                          </a:rPr>
+                        </m:ctrlPr>
+                      </m:dPr>
+                      <m:e>
+                        <m:r>
+                          <a:rPr lang="en-US" i="1">
+                            <a:latin typeface="Cambria Math" panose="02040503050406030204" pitchFamily="18" charset="0"/>
+                            <a:ea typeface="Cambria Math" panose="02040503050406030204" pitchFamily="18" charset="0"/>
+                          </a:rPr>
+                          <m:t>𝑡</m:t>
+                        </m:r>
+                      </m:e>
+                    </m:d>
+                  </m:oMath>
+                </a14:m>
+                <a:r>
+                  <a:rPr lang="en-US" dirty="0" smtClean="0">
+                    <a:ea typeface="Cambria Math" panose="02040503050406030204" pitchFamily="18" charset="0"/>
+                  </a:rPr>
+                  <a:t> from</a:t>
+                </a:r>
+              </a:p>
+              <a:p>
+                <a:pPr algn="ctr"/>
+                <a:r>
+                  <a:rPr lang="en-US" dirty="0" smtClean="0">
+                    <a:ea typeface="Cambria Math" panose="02040503050406030204" pitchFamily="18" charset="0"/>
+                  </a:rPr>
+                  <a:t>  </a:t>
+                </a:r>
+                <a14:m>
+                  <m:oMath xmlns:m="http://schemas.openxmlformats.org/officeDocument/2006/math">
+                    <m:r>
+                      <a:rPr lang="en-US" i="1">
+                        <a:latin typeface="Cambria Math" panose="02040503050406030204" pitchFamily="18" charset="0"/>
+                        <a:ea typeface="Cambria Math" panose="02040503050406030204" pitchFamily="18" charset="0"/>
+                      </a:rPr>
+                      <m:t>0</m:t>
+                    </m:r>
+                    <m:r>
+                      <a:rPr lang="en-US">
+                        <a:latin typeface="Cambria Math" panose="02040503050406030204" pitchFamily="18" charset="0"/>
+                        <a:ea typeface="Cambria Math" panose="02040503050406030204" pitchFamily="18" charset="0"/>
+                      </a:rPr>
+                      <m:t>.00</m:t>
+                    </m:r>
+                    <m:r>
+                      <a:rPr lang="en-US" b="0" i="0" smtClean="0">
+                        <a:latin typeface="Cambria Math" panose="02040503050406030204" pitchFamily="18" charset="0"/>
+                        <a:ea typeface="Cambria Math" panose="02040503050406030204" pitchFamily="18" charset="0"/>
+                      </a:rPr>
+                      <m:t>0</m:t>
+                    </m:r>
+                    <m:func>
+                      <m:funcPr>
+                        <m:ctrlPr>
+                          <a:rPr lang="en-US" i="1">
+                            <a:latin typeface="Cambria Math" panose="02040503050406030204" pitchFamily="18" charset="0"/>
+                            <a:ea typeface="Cambria Math" panose="02040503050406030204" pitchFamily="18" charset="0"/>
+                          </a:rPr>
+                        </m:ctrlPr>
+                      </m:funcPr>
+                      <m:fName>
+                        <m:r>
+                          <m:rPr>
+                            <m:sty m:val="p"/>
+                          </m:rPr>
+                          <a:rPr lang="en-US">
+                            <a:latin typeface="Cambria Math" panose="02040503050406030204" pitchFamily="18" charset="0"/>
+                            <a:ea typeface="Cambria Math" panose="02040503050406030204" pitchFamily="18" charset="0"/>
+                          </a:rPr>
+                          <m:t>sin</m:t>
+                        </m:r>
+                      </m:fName>
+                      <m:e>
+                        <m:d>
+                          <m:dPr>
+                            <m:ctrlPr>
+                              <a:rPr lang="en-US" i="1">
+                                <a:latin typeface="Cambria Math" panose="02040503050406030204" pitchFamily="18" charset="0"/>
+                                <a:ea typeface="Cambria Math" panose="02040503050406030204" pitchFamily="18" charset="0"/>
+                              </a:rPr>
+                            </m:ctrlPr>
+                          </m:dPr>
+                          <m:e>
+                            <m:r>
+                              <a:rPr lang="en-US" i="1">
+                                <a:latin typeface="Cambria Math" panose="02040503050406030204" pitchFamily="18" charset="0"/>
+                                <a:ea typeface="Cambria Math" panose="02040503050406030204" pitchFamily="18" charset="0"/>
+                              </a:rPr>
+                              <m:t>2</m:t>
+                            </m:r>
+                            <m:r>
+                              <a:rPr lang="en-US" i="1">
+                                <a:latin typeface="Cambria Math" panose="02040503050406030204" pitchFamily="18" charset="0"/>
+                                <a:ea typeface="Cambria Math" panose="02040503050406030204" pitchFamily="18" charset="0"/>
+                              </a:rPr>
+                              <m:t>𝜋</m:t>
+                            </m:r>
+                            <m:r>
+                              <a:rPr lang="en-US" i="1">
+                                <a:latin typeface="Cambria Math" panose="02040503050406030204" pitchFamily="18" charset="0"/>
+                                <a:ea typeface="Cambria Math" panose="02040503050406030204" pitchFamily="18" charset="0"/>
+                              </a:rPr>
+                              <m:t>∗3∗</m:t>
+                            </m:r>
+                            <m:r>
+                              <a:rPr lang="en-US" i="1">
+                                <a:latin typeface="Cambria Math" panose="02040503050406030204" pitchFamily="18" charset="0"/>
+                                <a:ea typeface="Cambria Math" panose="02040503050406030204" pitchFamily="18" charset="0"/>
+                              </a:rPr>
+                              <m:t>𝑡</m:t>
+                            </m:r>
+                          </m:e>
+                        </m:d>
+                      </m:e>
+                    </m:func>
+                  </m:oMath>
+                </a14:m>
+                <a:r>
+                  <a:rPr lang="en-US" dirty="0" smtClean="0"/>
+                  <a:t> to </a:t>
+                </a:r>
+              </a:p>
+              <a:p>
+                <a:pPr algn="ctr"/>
+                <a14:m>
+                  <m:oMathPara xmlns:m="http://schemas.openxmlformats.org/officeDocument/2006/math">
+                    <m:oMathParaPr>
+                      <m:jc m:val="center"/>
+                    </m:oMathParaPr>
+                    <m:oMath xmlns:m="http://schemas.openxmlformats.org/officeDocument/2006/math">
+                      <m:r>
+                        <a:rPr lang="en-US" i="1">
+                          <a:latin typeface="Cambria Math" panose="02040503050406030204" pitchFamily="18" charset="0"/>
+                          <a:ea typeface="Cambria Math" panose="02040503050406030204" pitchFamily="18" charset="0"/>
+                        </a:rPr>
+                        <m:t>0</m:t>
+                      </m:r>
+                      <m:r>
+                        <a:rPr lang="en-US">
+                          <a:latin typeface="Cambria Math" panose="02040503050406030204" pitchFamily="18" charset="0"/>
+                          <a:ea typeface="Cambria Math" panose="02040503050406030204" pitchFamily="18" charset="0"/>
+                        </a:rPr>
+                        <m:t>.0</m:t>
+                      </m:r>
+                      <m:r>
+                        <a:rPr lang="en-US" b="0" i="0" smtClean="0">
+                          <a:latin typeface="Cambria Math" panose="02040503050406030204" pitchFamily="18" charset="0"/>
+                          <a:ea typeface="Cambria Math" panose="02040503050406030204" pitchFamily="18" charset="0"/>
+                        </a:rPr>
+                        <m:t>35</m:t>
+                      </m:r>
+                      <m:func>
+                        <m:funcPr>
+                          <m:ctrlPr>
+                            <a:rPr lang="en-US" i="1">
+                              <a:latin typeface="Cambria Math" panose="02040503050406030204" pitchFamily="18" charset="0"/>
+                              <a:ea typeface="Cambria Math" panose="02040503050406030204" pitchFamily="18" charset="0"/>
+                            </a:rPr>
+                          </m:ctrlPr>
+                        </m:funcPr>
+                        <m:fName>
+                          <m:r>
+                            <m:rPr>
+                              <m:sty m:val="p"/>
+                            </m:rPr>
+                            <a:rPr lang="en-US">
+                              <a:latin typeface="Cambria Math" panose="02040503050406030204" pitchFamily="18" charset="0"/>
+                              <a:ea typeface="Cambria Math" panose="02040503050406030204" pitchFamily="18" charset="0"/>
+                            </a:rPr>
+                            <m:t>sin</m:t>
+                          </m:r>
+                        </m:fName>
+                        <m:e>
+                          <m:d>
+                            <m:dPr>
+                              <m:ctrlPr>
+                                <a:rPr lang="en-US" i="1">
+                                  <a:latin typeface="Cambria Math" panose="02040503050406030204" pitchFamily="18" charset="0"/>
+                                  <a:ea typeface="Cambria Math" panose="02040503050406030204" pitchFamily="18" charset="0"/>
+                                </a:rPr>
+                              </m:ctrlPr>
+                            </m:dPr>
+                            <m:e>
+                              <m:r>
+                                <a:rPr lang="en-US" i="1">
+                                  <a:latin typeface="Cambria Math" panose="02040503050406030204" pitchFamily="18" charset="0"/>
+                                  <a:ea typeface="Cambria Math" panose="02040503050406030204" pitchFamily="18" charset="0"/>
+                                </a:rPr>
+                                <m:t>2</m:t>
+                              </m:r>
+                              <m:r>
+                                <a:rPr lang="en-US" i="1">
+                                  <a:latin typeface="Cambria Math" panose="02040503050406030204" pitchFamily="18" charset="0"/>
+                                  <a:ea typeface="Cambria Math" panose="02040503050406030204" pitchFamily="18" charset="0"/>
+                                </a:rPr>
+                                <m:t>𝜋</m:t>
+                              </m:r>
+                              <m:r>
+                                <a:rPr lang="en-US" i="1">
+                                  <a:latin typeface="Cambria Math" panose="02040503050406030204" pitchFamily="18" charset="0"/>
+                                  <a:ea typeface="Cambria Math" panose="02040503050406030204" pitchFamily="18" charset="0"/>
+                                </a:rPr>
+                                <m:t>∗3∗</m:t>
+                              </m:r>
+                              <m:r>
+                                <a:rPr lang="en-US" i="1">
+                                  <a:latin typeface="Cambria Math" panose="02040503050406030204" pitchFamily="18" charset="0"/>
+                                  <a:ea typeface="Cambria Math" panose="02040503050406030204" pitchFamily="18" charset="0"/>
+                                </a:rPr>
+                                <m:t>𝑡</m:t>
+                              </m:r>
+                            </m:e>
+                          </m:d>
+                        </m:e>
+                      </m:func>
+                    </m:oMath>
+                  </m:oMathPara>
+                </a14:m>
+                <a:endParaRPr lang="en-US" dirty="0"/>
+              </a:p>
+            </p:txBody>
+          </p:sp>
+        </mc:Choice>
+        <mc:Fallback>
+          <p:sp>
+            <p:nvSpPr>
+              <p:cNvPr id="5" name="Rectangle 4"/>
+              <p:cNvSpPr>
+                <a:spLocks noRot="1" noChangeAspect="1" noMove="1" noResize="1" noEditPoints="1" noAdjustHandles="1" noChangeArrowheads="1" noChangeShapeType="1" noTextEdit="1"/>
+              </p:cNvSpPr>
+              <p:nvPr/>
+            </p:nvSpPr>
+            <p:spPr>
+              <a:xfrm>
+                <a:off x="1930166" y="3295636"/>
+                <a:ext cx="2640658" cy="923330"/>
+              </a:xfrm>
+              <a:prstGeom prst="rect">
+                <a:avLst/>
+              </a:prstGeom>
+              <a:blipFill>
+                <a:blip r:embed="rId3"/>
+                <a:stretch>
+                  <a:fillRect t="-3974" r="-1386"/>
+                </a:stretch>
+              </a:blipFill>
+            </p:spPr>
+            <p:txBody>
+              <a:bodyPr/>
+              <a:lstStyle/>
+              <a:p>
+                <a:r>
+                  <a:rPr lang="en-US">
+                    <a:noFill/>
+                  </a:rPr>
+                  <a:t> </a:t>
+                </a:r>
+              </a:p>
+            </p:txBody>
+          </p:sp>
+        </mc:Fallback>
+      </mc:AlternateContent>
+    </p:spTree>
+    <p:extLst>
+      <p:ext uri="{BB962C8B-B14F-4D97-AF65-F5344CB8AC3E}">
+        <p14:creationId xmlns:p14="http://schemas.microsoft.com/office/powerpoint/2010/main" val="2564791784"/>
+      </p:ext>
+    </p:extLst>
+  </p:cSld>
+  <p:clrMapOvr>
+    <a:masterClrMapping/>
+  </p:clrMapOvr>
+</p:sld>
+</file>
+
+<file path=ppt/slides/slide4.xml><?xml version="1.0" encoding="utf-8"?>
+<p:sld xmlns:a="http://schemas.openxmlformats.org/drawingml/2006/main" xmlns:r="http://schemas.openxmlformats.org/officeDocument/2006/relationships" xmlns:p="http://schemas.openxmlformats.org/presentationml/2006/main">
+  <p:cSld>
+    <p:spTree>
+      <p:nvGrpSpPr>
+        <p:cNvPr id="1" name=""/>
+        <p:cNvGrpSpPr/>
+        <p:nvPr/>
+      </p:nvGrpSpPr>
+      <p:grpSpPr>
+        <a:xfrm>
+          <a:off x="0" y="0"/>
+          <a:ext cx="0" cy="0"/>
+          <a:chOff x="0" y="0"/>
+          <a:chExt cx="0" cy="0"/>
+        </a:xfrm>
+      </p:grpSpPr>
+      <p:sp>
+        <p:nvSpPr>
+          <p:cNvPr id="3" name="Title 2"/>
+          <p:cNvSpPr>
+            <a:spLocks noGrp="1"/>
+          </p:cNvSpPr>
+          <p:nvPr>
+            <p:ph type="title"/>
+          </p:nvPr>
+        </p:nvSpPr>
+        <p:spPr>
+          <a:xfrm>
+            <a:off x="1461155" y="93447"/>
+            <a:ext cx="9681406" cy="816989"/>
+          </a:xfrm>
+        </p:spPr>
+        <p:txBody>
+          <a:bodyPr/>
+          <a:lstStyle/>
+          <a:p>
+            <a:r>
+              <a:rPr lang="en-US" sz="2400" dirty="0" smtClean="0"/>
+              <a:t>3. </a:t>
+            </a:r>
+            <a:r>
+              <a:rPr lang="en-US" sz="2400" dirty="0">
+                <a:sym typeface="Wingdings" panose="05000000000000000000" pitchFamily="2" charset="2"/>
+              </a:rPr>
+              <a:t>Convert the per-gate </a:t>
+            </a:r>
+            <a:r>
+              <a:rPr lang="en-US" sz="2400" dirty="0" err="1">
+                <a:sym typeface="Wingdings" panose="05000000000000000000" pitchFamily="2" charset="2"/>
+              </a:rPr>
+              <a:t>overrotation</a:t>
+            </a:r>
+            <a:r>
+              <a:rPr lang="en-US" sz="2400" dirty="0">
+                <a:sym typeface="Wingdings" panose="05000000000000000000" pitchFamily="2" charset="2"/>
+              </a:rPr>
+              <a:t> amplitude to a 1-state probability </a:t>
+            </a:r>
+            <a:r>
+              <a:rPr lang="en-US" sz="2400" dirty="0" smtClean="0">
+                <a:sym typeface="Wingdings" panose="05000000000000000000" pitchFamily="2" charset="2"/>
+              </a:rPr>
+              <a:t>amplitude, and relate that to normalized peak power.</a:t>
+            </a:r>
+            <a:endParaRPr lang="en-US" sz="2400" dirty="0"/>
+          </a:p>
+        </p:txBody>
+      </p:sp>
+      <p:pic>
+        <p:nvPicPr>
+          <p:cNvPr id="4" name="Picture 3">
+            <a:extLst>
+              <a:ext uri="{FF2B5EF4-FFF2-40B4-BE49-F238E27FC236}">
+                <a16:creationId xmlns:a16="http://schemas.microsoft.com/office/drawing/2014/main" id="{83DFB0FF-97DE-4208-A609-5BB0E80BD134}"/>
+              </a:ext>
+            </a:extLst>
+          </p:cNvPr>
+          <p:cNvPicPr>
+            <a:picLocks noChangeAspect="1"/>
+          </p:cNvPicPr>
+          <p:nvPr/>
+        </p:nvPicPr>
+        <p:blipFill>
+          <a:blip r:embed="rId2"/>
+          <a:stretch>
+            <a:fillRect/>
+          </a:stretch>
+        </p:blipFill>
+        <p:spPr>
+          <a:xfrm>
+            <a:off x="1139842" y="1187032"/>
+            <a:ext cx="3938954" cy="2722901"/>
+          </a:xfrm>
+          <a:prstGeom prst="rect">
+            <a:avLst/>
+          </a:prstGeom>
+        </p:spPr>
+      </p:pic>
+      <p:pic>
+        <p:nvPicPr>
+          <p:cNvPr id="5" name="Picture 4">
+            <a:extLst>
+              <a:ext uri="{FF2B5EF4-FFF2-40B4-BE49-F238E27FC236}">
+                <a16:creationId xmlns:a16="http://schemas.microsoft.com/office/drawing/2014/main" id="{2C2397C3-E442-4F77-AB82-BA25BABFCE70}"/>
+              </a:ext>
+            </a:extLst>
+          </p:cNvPr>
+          <p:cNvPicPr>
+            <a:picLocks noChangeAspect="1"/>
+          </p:cNvPicPr>
+          <p:nvPr/>
+        </p:nvPicPr>
+        <p:blipFill>
+          <a:blip r:embed="rId3"/>
+          <a:stretch>
+            <a:fillRect/>
+          </a:stretch>
+        </p:blipFill>
+        <p:spPr>
+          <a:xfrm>
+            <a:off x="2523426" y="4186529"/>
+            <a:ext cx="3446065" cy="2448733"/>
+          </a:xfrm>
+          <a:prstGeom prst="rect">
+            <a:avLst/>
+          </a:prstGeom>
+        </p:spPr>
+      </p:pic>
+      <mc:AlternateContent xmlns:mc="http://schemas.openxmlformats.org/markup-compatibility/2006">
+        <mc:Choice xmlns:a14="http://schemas.microsoft.com/office/drawing/2010/main" Requires="a14">
+          <p:sp>
+            <p:nvSpPr>
+              <p:cNvPr id="6" name="TextBox 5"/>
+              <p:cNvSpPr txBox="1"/>
+              <p:nvPr/>
+            </p:nvSpPr>
+            <p:spPr>
+              <a:xfrm>
+                <a:off x="269631" y="4360985"/>
+                <a:ext cx="2004646" cy="2031325"/>
+              </a:xfrm>
+              <a:prstGeom prst="rect">
+                <a:avLst/>
+              </a:prstGeom>
+              <a:noFill/>
+            </p:spPr>
+            <p:txBody>
+              <a:bodyPr wrap="square" rtlCol="0">
+                <a:spAutoFit/>
+              </a:bodyPr>
+              <a:lstStyle/>
+              <a:p>
+                <a:pPr algn="ctr"/>
+                <a:r>
+                  <a:rPr lang="en-US" sz="1400" dirty="0" smtClean="0"/>
+                  <a:t>This relationship simply plots the maximum 1-state probability (the 3</a:t>
+                </a:r>
+                <a:r>
+                  <a:rPr lang="en-US" sz="1400" baseline="30000" dirty="0" smtClean="0"/>
+                  <a:t>rd</a:t>
+                </a:r>
+                <a:r>
+                  <a:rPr lang="en-US" sz="1400" dirty="0" smtClean="0"/>
+                  <a:t> graph in the 2</a:t>
+                </a:r>
+                <a:r>
+                  <a:rPr lang="en-US" sz="1400" baseline="30000" dirty="0" smtClean="0"/>
+                  <a:t>nd</a:t>
+                </a:r>
+                <a:r>
+                  <a:rPr lang="en-US" sz="1400" dirty="0" smtClean="0"/>
+                  <a:t> slide) to the amplitude of </a:t>
+                </a:r>
+                <a14:m>
+                  <m:oMath xmlns:m="http://schemas.openxmlformats.org/officeDocument/2006/math">
+                    <m:r>
+                      <a:rPr lang="el-GR" sz="1400" b="0" i="1">
+                        <a:latin typeface="Cambria Math" panose="02040503050406030204" pitchFamily="18" charset="0"/>
+                        <a:ea typeface="Cambria Math" panose="02040503050406030204" pitchFamily="18" charset="0"/>
+                      </a:rPr>
+                      <m:t>𝜀</m:t>
+                    </m:r>
+                    <m:d>
+                      <m:dPr>
+                        <m:ctrlPr>
+                          <a:rPr lang="en-US" sz="1400" i="1">
+                            <a:latin typeface="Cambria Math" panose="02040503050406030204" pitchFamily="18" charset="0"/>
+                            <a:ea typeface="Cambria Math" panose="02040503050406030204" pitchFamily="18" charset="0"/>
+                          </a:rPr>
+                        </m:ctrlPr>
+                      </m:dPr>
+                      <m:e>
+                        <m:r>
+                          <a:rPr lang="en-US" sz="1400" b="0" i="1">
+                            <a:latin typeface="Cambria Math" panose="02040503050406030204" pitchFamily="18" charset="0"/>
+                            <a:ea typeface="Cambria Math" panose="02040503050406030204" pitchFamily="18" charset="0"/>
+                          </a:rPr>
+                          <m:t>𝑡</m:t>
+                        </m:r>
+                      </m:e>
+                    </m:d>
+                  </m:oMath>
+                </a14:m>
+                <a:r>
+                  <a:rPr lang="en-US" sz="1400" dirty="0" smtClean="0"/>
+                  <a:t> . The x-axis is the same as the graph above.</a:t>
+                </a:r>
+                <a:endParaRPr lang="en-US" sz="1400" dirty="0"/>
+              </a:p>
+            </p:txBody>
+          </p:sp>
+        </mc:Choice>
+        <mc:Fallback>
+          <p:sp>
+            <p:nvSpPr>
+              <p:cNvPr id="6" name="TextBox 5"/>
+              <p:cNvSpPr txBox="1">
+                <a:spLocks noRot="1" noChangeAspect="1" noMove="1" noResize="1" noEditPoints="1" noAdjustHandles="1" noChangeArrowheads="1" noChangeShapeType="1" noTextEdit="1"/>
+              </p:cNvSpPr>
+              <p:nvPr/>
+            </p:nvSpPr>
+            <p:spPr>
+              <a:xfrm>
+                <a:off x="269631" y="4360985"/>
+                <a:ext cx="2004646" cy="2031325"/>
+              </a:xfrm>
+              <a:prstGeom prst="rect">
+                <a:avLst/>
+              </a:prstGeom>
+              <a:blipFill>
+                <a:blip r:embed="rId4"/>
+                <a:stretch>
+                  <a:fillRect l="-912" t="-299" b="-2096"/>
+                </a:stretch>
+              </a:blipFill>
+            </p:spPr>
+            <p:txBody>
+              <a:bodyPr/>
+              <a:lstStyle/>
+              <a:p>
+                <a:r>
+                  <a:rPr lang="en-US">
+                    <a:noFill/>
+                  </a:rPr>
+                  <a:t> </a:t>
+                </a:r>
+              </a:p>
+            </p:txBody>
+          </p:sp>
+        </mc:Fallback>
+      </mc:AlternateContent>
+      <p:cxnSp>
+        <p:nvCxnSpPr>
+          <p:cNvPr id="8" name="Straight Arrow Connector 7"/>
+          <p:cNvCxnSpPr>
+            <a:stCxn id="4" idx="3"/>
+          </p:cNvCxnSpPr>
+          <p:nvPr/>
+        </p:nvCxnSpPr>
+        <p:spPr>
+          <a:xfrm>
+            <a:off x="5078796" y="2548483"/>
+            <a:ext cx="2633298" cy="1038779"/>
+          </a:xfrm>
+          <a:prstGeom prst="straightConnector1">
+            <a:avLst/>
+          </a:prstGeom>
+          <a:ln w="12700">
+            <a:solidFill>
+              <a:schemeClr val="tx1"/>
+            </a:solidFill>
+            <a:tailEnd type="triangle"/>
+          </a:ln>
+        </p:spPr>
+        <p:style>
+          <a:lnRef idx="1">
+            <a:schemeClr val="accent1"/>
+          </a:lnRef>
+          <a:fillRef idx="0">
+            <a:schemeClr val="accent1"/>
+          </a:fillRef>
+          <a:effectRef idx="0">
+            <a:schemeClr val="accent1"/>
+          </a:effectRef>
+          <a:fontRef idx="minor">
+            <a:schemeClr val="tx1"/>
+          </a:fontRef>
+        </p:style>
+      </p:cxnSp>
+      <p:cxnSp>
+        <p:nvCxnSpPr>
+          <p:cNvPr id="10" name="Straight Arrow Connector 9"/>
+          <p:cNvCxnSpPr/>
+          <p:nvPr/>
+        </p:nvCxnSpPr>
+        <p:spPr>
+          <a:xfrm flipV="1">
+            <a:off x="6010842" y="3587262"/>
+            <a:ext cx="1761928" cy="1547446"/>
+          </a:xfrm>
+          <a:prstGeom prst="straightConnector1">
+            <a:avLst/>
+          </a:prstGeom>
+          <a:ln w="12700">
+            <a:solidFill>
+              <a:schemeClr val="tx1"/>
+            </a:solidFill>
+            <a:tailEnd type="triangle"/>
+          </a:ln>
+        </p:spPr>
+        <p:style>
+          <a:lnRef idx="1">
+            <a:schemeClr val="accent1"/>
+          </a:lnRef>
+          <a:fillRef idx="0">
+            <a:schemeClr val="accent1"/>
+          </a:fillRef>
+          <a:effectRef idx="0">
+            <a:schemeClr val="accent1"/>
+          </a:effectRef>
+          <a:fontRef idx="minor">
+            <a:schemeClr val="tx1"/>
+          </a:fontRef>
+        </p:style>
+      </p:cxnSp>
+      <mc:AlternateContent xmlns:mc="http://schemas.openxmlformats.org/markup-compatibility/2006">
+        <mc:Choice xmlns:a14="http://schemas.microsoft.com/office/drawing/2010/main" Requires="a14">
+          <p:sp>
+            <p:nvSpPr>
+              <p:cNvPr id="12" name="TextBox 11"/>
+              <p:cNvSpPr txBox="1"/>
+              <p:nvPr/>
+            </p:nvSpPr>
+            <p:spPr>
+              <a:xfrm>
+                <a:off x="5492966" y="1523805"/>
+                <a:ext cx="2219128" cy="1169551"/>
+              </a:xfrm>
+              <a:prstGeom prst="rect">
+                <a:avLst/>
+              </a:prstGeom>
+              <a:noFill/>
+            </p:spPr>
+            <p:txBody>
+              <a:bodyPr wrap="square" rtlCol="0">
+                <a:spAutoFit/>
+              </a:bodyPr>
+              <a:lstStyle/>
+              <a:p>
+                <a:pPr algn="ctr"/>
+                <a:r>
+                  <a:rPr lang="en-US" sz="1400" dirty="0" smtClean="0"/>
+                  <a:t>Convert the x-axis of the top graph from </a:t>
+                </a:r>
+                <a14:m>
+                  <m:oMath xmlns:m="http://schemas.openxmlformats.org/officeDocument/2006/math">
+                    <m:r>
+                      <a:rPr lang="el-GR" sz="1400" i="1">
+                        <a:latin typeface="Cambria Math" panose="02040503050406030204" pitchFamily="18" charset="0"/>
+                        <a:ea typeface="Cambria Math" panose="02040503050406030204" pitchFamily="18" charset="0"/>
+                      </a:rPr>
+                      <m:t>𝜀</m:t>
+                    </m:r>
+                    <m:d>
+                      <m:dPr>
+                        <m:ctrlPr>
+                          <a:rPr lang="en-US" sz="1400" i="1">
+                            <a:latin typeface="Cambria Math" panose="02040503050406030204" pitchFamily="18" charset="0"/>
+                            <a:ea typeface="Cambria Math" panose="02040503050406030204" pitchFamily="18" charset="0"/>
+                          </a:rPr>
+                        </m:ctrlPr>
+                      </m:dPr>
+                      <m:e>
+                        <m:r>
+                          <a:rPr lang="en-US" sz="1400" i="1">
+                            <a:latin typeface="Cambria Math" panose="02040503050406030204" pitchFamily="18" charset="0"/>
+                            <a:ea typeface="Cambria Math" panose="02040503050406030204" pitchFamily="18" charset="0"/>
+                          </a:rPr>
+                          <m:t>𝑡</m:t>
+                        </m:r>
+                      </m:e>
+                    </m:d>
+                  </m:oMath>
+                </a14:m>
+                <a:r>
+                  <a:rPr lang="en-US" sz="1400" dirty="0" smtClean="0"/>
+                  <a:t> amplitude to max 1-state probability using the bottom graph. </a:t>
+                </a:r>
+                <a:endParaRPr lang="en-US" sz="1400" dirty="0"/>
+              </a:p>
+            </p:txBody>
+          </p:sp>
+        </mc:Choice>
+        <mc:Fallback>
+          <p:sp>
+            <p:nvSpPr>
+              <p:cNvPr id="12" name="TextBox 11"/>
+              <p:cNvSpPr txBox="1">
+                <a:spLocks noRot="1" noChangeAspect="1" noMove="1" noResize="1" noEditPoints="1" noAdjustHandles="1" noChangeArrowheads="1" noChangeShapeType="1" noTextEdit="1"/>
+              </p:cNvSpPr>
+              <p:nvPr/>
+            </p:nvSpPr>
+            <p:spPr>
+              <a:xfrm>
+                <a:off x="5492966" y="1523805"/>
+                <a:ext cx="2219128" cy="1169551"/>
+              </a:xfrm>
+              <a:prstGeom prst="rect">
+                <a:avLst/>
+              </a:prstGeom>
+              <a:blipFill>
+                <a:blip r:embed="rId5"/>
+                <a:stretch>
+                  <a:fillRect t="-1042" r="-824" b="-4167"/>
+                </a:stretch>
+              </a:blipFill>
+            </p:spPr>
+            <p:txBody>
+              <a:bodyPr/>
+              <a:lstStyle/>
+              <a:p>
+                <a:r>
+                  <a:rPr lang="en-US">
+                    <a:noFill/>
+                  </a:rPr>
+                  <a:t> </a:t>
+                </a:r>
+              </a:p>
+            </p:txBody>
+          </p:sp>
+        </mc:Fallback>
+      </mc:AlternateContent>
+      <p:pic>
+        <p:nvPicPr>
+          <p:cNvPr id="14" name="Picture 13">
+            <a:extLst>
+              <a:ext uri="{FF2B5EF4-FFF2-40B4-BE49-F238E27FC236}">
+                <a16:creationId xmlns:a16="http://schemas.microsoft.com/office/drawing/2014/main" id="{D0A56CDC-2C06-4364-8FAB-108BC0AFFC3B}"/>
+              </a:ext>
+            </a:extLst>
+          </p:cNvPr>
+          <p:cNvPicPr>
+            <a:picLocks noChangeAspect="1"/>
+          </p:cNvPicPr>
+          <p:nvPr/>
+        </p:nvPicPr>
+        <p:blipFill>
+          <a:blip r:embed="rId6"/>
+          <a:stretch>
+            <a:fillRect/>
+          </a:stretch>
+        </p:blipFill>
+        <p:spPr>
+          <a:xfrm>
+            <a:off x="7833446" y="1781724"/>
+            <a:ext cx="4314825" cy="2943225"/>
+          </a:xfrm>
+          <a:prstGeom prst="rect">
+            <a:avLst/>
+          </a:prstGeom>
+        </p:spPr>
+      </p:pic>
+      <p:sp>
+        <p:nvSpPr>
+          <p:cNvPr id="16" name="TextBox 15"/>
+          <p:cNvSpPr txBox="1"/>
+          <p:nvPr/>
+        </p:nvSpPr>
+        <p:spPr>
+          <a:xfrm>
+            <a:off x="8185138" y="4923692"/>
+            <a:ext cx="3807569" cy="1384995"/>
+          </a:xfrm>
+          <a:prstGeom prst="rect">
+            <a:avLst/>
+          </a:prstGeom>
+          <a:noFill/>
+        </p:spPr>
+        <p:txBody>
+          <a:bodyPr wrap="square" rtlCol="0">
+            <a:spAutoFit/>
+          </a:bodyPr>
+          <a:lstStyle/>
+          <a:p>
+            <a:pPr algn="ctr"/>
+            <a:r>
+              <a:rPr lang="en-US" sz="1400" b="1" dirty="0" smtClean="0"/>
+              <a:t>There’s a pretty clear relationship between maximum 1-state probability and normalized peak power.  This is important because 1-state probability is ultimately what we see in the lab when we do experiments.</a:t>
+            </a:r>
+            <a:endParaRPr lang="en-US" sz="1400" b="1" dirty="0"/>
           </a:p>
         </p:txBody>
       </p:sp>
     </p:spTree>
     <p:extLst>
       <p:ext uri="{BB962C8B-B14F-4D97-AF65-F5344CB8AC3E}">
-        <p14:creationId xmlns:p14="http://schemas.microsoft.com/office/powerpoint/2010/main" val="2564791784"/>
+        <p14:creationId xmlns:p14="http://schemas.microsoft.com/office/powerpoint/2010/main" val="1347261217"/>
+      </p:ext>
+    </p:extLst>
+  </p:cSld>
+  <p:clrMapOvr>
+    <a:masterClrMapping/>
+  </p:clrMapOvr>
+</p:sld>
+</file>
+
+<file path=ppt/slides/slide5.xml><?xml version="1.0" encoding="utf-8"?>
+<p:sld xmlns:a="http://schemas.openxmlformats.org/drawingml/2006/main" xmlns:r="http://schemas.openxmlformats.org/officeDocument/2006/relationships" xmlns:p="http://schemas.openxmlformats.org/presentationml/2006/main">
+  <p:cSld>
+    <p:spTree>
+      <p:nvGrpSpPr>
+        <p:cNvPr id="1" name=""/>
+        <p:cNvGrpSpPr/>
+        <p:nvPr/>
+      </p:nvGrpSpPr>
+      <p:grpSpPr>
+        <a:xfrm>
+          <a:off x="0" y="0"/>
+          <a:ext cx="0" cy="0"/>
+          <a:chOff x="0" y="0"/>
+          <a:chExt cx="0" cy="0"/>
+        </a:xfrm>
+      </p:grpSpPr>
+      <p:sp>
+        <p:nvSpPr>
+          <p:cNvPr id="3" name="Title 2"/>
+          <p:cNvSpPr>
+            <a:spLocks noGrp="1"/>
+          </p:cNvSpPr>
+          <p:nvPr>
+            <p:ph type="title"/>
+          </p:nvPr>
+        </p:nvSpPr>
+        <p:spPr/>
+        <p:txBody>
+          <a:bodyPr/>
+          <a:lstStyle/>
+          <a:p>
+            <a:r>
+              <a:rPr lang="en-US" dirty="0" smtClean="0">
+                <a:sym typeface="Wingdings" panose="05000000000000000000" pitchFamily="2" charset="2"/>
+              </a:rPr>
+              <a:t>4. Relate 1-state </a:t>
+            </a:r>
+            <a:r>
+              <a:rPr lang="en-US" dirty="0">
+                <a:sym typeface="Wingdings" panose="05000000000000000000" pitchFamily="2" charset="2"/>
+              </a:rPr>
+              <a:t>probability amplitude and normalized peak power</a:t>
+            </a:r>
+            <a:r>
+              <a:rPr lang="en-US" dirty="0" smtClean="0">
+                <a:sym typeface="Wingdings" panose="05000000000000000000" pitchFamily="2" charset="2"/>
+              </a:rPr>
+              <a:t>.</a:t>
+            </a:r>
+            <a:endParaRPr lang="en-US" dirty="0"/>
+          </a:p>
+        </p:txBody>
+      </p:sp>
+      <p:pic>
+        <p:nvPicPr>
+          <p:cNvPr id="4" name="Picture 3">
+            <a:extLst>
+              <a:ext uri="{FF2B5EF4-FFF2-40B4-BE49-F238E27FC236}">
+                <a16:creationId xmlns:a16="http://schemas.microsoft.com/office/drawing/2014/main" id="{3E964DDF-7248-4C4B-82E8-EA31DAEB2711}"/>
+              </a:ext>
+            </a:extLst>
+          </p:cNvPr>
+          <p:cNvPicPr>
+            <a:picLocks noChangeAspect="1"/>
+          </p:cNvPicPr>
+          <p:nvPr/>
+        </p:nvPicPr>
+        <p:blipFill>
+          <a:blip r:embed="rId2"/>
+          <a:stretch>
+            <a:fillRect/>
+          </a:stretch>
+        </p:blipFill>
+        <p:spPr>
+          <a:xfrm>
+            <a:off x="-140677" y="2499116"/>
+            <a:ext cx="4927492" cy="3539797"/>
+          </a:xfrm>
+          <a:prstGeom prst="rect">
+            <a:avLst/>
+          </a:prstGeom>
+        </p:spPr>
+      </p:pic>
+      <p:sp>
+        <p:nvSpPr>
+          <p:cNvPr id="5" name="TextBox 4"/>
+          <p:cNvSpPr txBox="1"/>
+          <p:nvPr/>
+        </p:nvSpPr>
+        <p:spPr>
+          <a:xfrm>
+            <a:off x="246184" y="1172308"/>
+            <a:ext cx="11418277" cy="954107"/>
+          </a:xfrm>
+          <a:prstGeom prst="rect">
+            <a:avLst/>
+          </a:prstGeom>
+          <a:noFill/>
+        </p:spPr>
+        <p:txBody>
+          <a:bodyPr wrap="square" rtlCol="0">
+            <a:spAutoFit/>
+          </a:bodyPr>
+          <a:lstStyle/>
+          <a:p>
+            <a:pPr algn="ctr"/>
+            <a:r>
+              <a:rPr lang="en-US" sz="1400" dirty="0" smtClean="0"/>
+              <a:t>I tried different ranges of amplitudes and frequencies, and the following relationship held for essentially all of the cases. However, when the maximum 1-state probability exceeds 1 (i.e. the 1-state probability vs. time plot for a single frequency no longer looks like a simple sine curve), this relationship breaks down. </a:t>
+            </a:r>
+            <a:r>
+              <a:rPr lang="en-US" sz="1400" dirty="0" smtClean="0"/>
+              <a:t>Although simulation data may exceed p = 1, experimental data is NOT likely to do so. We’ll probably see the 1-state probability going haywire in </a:t>
+            </a:r>
+            <a:r>
+              <a:rPr lang="en-US" sz="1400" dirty="0" err="1" smtClean="0"/>
+              <a:t>LabView</a:t>
+            </a:r>
+            <a:r>
+              <a:rPr lang="en-US" sz="1400" dirty="0" smtClean="0"/>
+              <a:t> before we run in through drift.</a:t>
+            </a:r>
+            <a:endParaRPr lang="en-US" sz="1400" dirty="0"/>
+          </a:p>
+        </p:txBody>
+      </p:sp>
+      <mc:AlternateContent xmlns:mc="http://schemas.openxmlformats.org/markup-compatibility/2006">
+        <mc:Choice xmlns:a14="http://schemas.microsoft.com/office/drawing/2010/main" Requires="a14">
+          <p:sp>
+            <p:nvSpPr>
+              <p:cNvPr id="6" name="TextBox 5"/>
+              <p:cNvSpPr txBox="1"/>
+              <p:nvPr/>
+            </p:nvSpPr>
+            <p:spPr>
+              <a:xfrm>
+                <a:off x="4988099" y="2591149"/>
+                <a:ext cx="2329093" cy="2900666"/>
+              </a:xfrm>
+              <a:prstGeom prst="rect">
+                <a:avLst/>
+              </a:prstGeom>
+              <a:noFill/>
+            </p:spPr>
+            <p:txBody>
+              <a:bodyPr wrap="square" rtlCol="0">
+                <a:spAutoFit/>
+              </a:bodyPr>
+              <a:lstStyle/>
+              <a:p>
+                <a:pPr algn="ctr"/>
+                <a:r>
+                  <a:rPr lang="en-US" sz="1400" dirty="0" smtClean="0"/>
+                  <a:t>Both a polynomial function </a:t>
+                </a:r>
+              </a:p>
+              <a:p>
+                <a:pPr algn="ctr"/>
+                <a14:m>
+                  <m:oMath xmlns:m="http://schemas.openxmlformats.org/officeDocument/2006/math">
+                    <m:r>
+                      <a:rPr lang="en-US" sz="1400" b="0" i="1" smtClean="0">
+                        <a:latin typeface="Cambria Math" panose="02040503050406030204" pitchFamily="18" charset="0"/>
+                      </a:rPr>
+                      <m:t>𝑦</m:t>
+                    </m:r>
+                    <m:r>
+                      <a:rPr lang="en-US" sz="1400" b="0" i="1" smtClean="0">
+                        <a:latin typeface="Cambria Math" panose="02040503050406030204" pitchFamily="18" charset="0"/>
+                      </a:rPr>
+                      <m:t>=</m:t>
+                    </m:r>
+                    <m:r>
+                      <a:rPr lang="en-US" sz="1400" b="0" i="1" smtClean="0">
+                        <a:latin typeface="Cambria Math" panose="02040503050406030204" pitchFamily="18" charset="0"/>
+                      </a:rPr>
+                      <m:t>𝑎</m:t>
+                    </m:r>
+                    <m:sSup>
+                      <m:sSupPr>
+                        <m:ctrlPr>
+                          <a:rPr lang="en-US" sz="1400" b="0" i="1" smtClean="0">
+                            <a:latin typeface="Cambria Math" panose="02040503050406030204" pitchFamily="18" charset="0"/>
+                          </a:rPr>
+                        </m:ctrlPr>
+                      </m:sSupPr>
+                      <m:e>
+                        <m:r>
+                          <a:rPr lang="en-US" sz="1400" b="0" i="1" smtClean="0">
+                            <a:latin typeface="Cambria Math" panose="02040503050406030204" pitchFamily="18" charset="0"/>
+                          </a:rPr>
+                          <m:t>𝑥</m:t>
+                        </m:r>
+                      </m:e>
+                      <m:sup>
+                        <m:r>
+                          <a:rPr lang="en-US" sz="1400" b="0" i="1" smtClean="0">
+                            <a:latin typeface="Cambria Math" panose="02040503050406030204" pitchFamily="18" charset="0"/>
+                          </a:rPr>
+                          <m:t>𝑏</m:t>
+                        </m:r>
+                      </m:sup>
+                    </m:sSup>
+                    <m:r>
+                      <a:rPr lang="en-US" sz="1400" b="0" i="1" smtClean="0">
+                        <a:latin typeface="Cambria Math" panose="02040503050406030204" pitchFamily="18" charset="0"/>
+                      </a:rPr>
+                      <m:t>+</m:t>
+                    </m:r>
+                    <m:r>
+                      <a:rPr lang="en-US" sz="1400" b="0" i="1" smtClean="0">
+                        <a:latin typeface="Cambria Math" panose="02040503050406030204" pitchFamily="18" charset="0"/>
+                      </a:rPr>
+                      <m:t>𝑐</m:t>
+                    </m:r>
+                  </m:oMath>
+                </a14:m>
+                <a:r>
+                  <a:rPr lang="en-US" sz="1400" dirty="0" smtClean="0"/>
+                  <a:t> </a:t>
+                </a:r>
+              </a:p>
+              <a:p>
+                <a:pPr algn="ctr"/>
+                <a:r>
+                  <a:rPr lang="en-US" sz="1400" dirty="0" smtClean="0"/>
+                  <a:t>and an exponential function </a:t>
+                </a:r>
+              </a:p>
+              <a:p>
+                <a:pPr algn="ctr"/>
+                <a14:m>
+                  <m:oMath xmlns:m="http://schemas.openxmlformats.org/officeDocument/2006/math">
+                    <m:r>
+                      <a:rPr lang="en-US" sz="1400" b="0" i="1" smtClean="0">
+                        <a:latin typeface="Cambria Math" panose="02040503050406030204" pitchFamily="18" charset="0"/>
+                      </a:rPr>
+                      <m:t>𝑦</m:t>
+                    </m:r>
+                    <m:r>
+                      <a:rPr lang="en-US" sz="1400" b="0" i="1" smtClean="0">
+                        <a:latin typeface="Cambria Math" panose="02040503050406030204" pitchFamily="18" charset="0"/>
+                      </a:rPr>
+                      <m:t>=</m:t>
+                    </m:r>
+                    <m:r>
+                      <a:rPr lang="en-US" sz="1400" b="0" i="1" smtClean="0">
+                        <a:latin typeface="Cambria Math" panose="02040503050406030204" pitchFamily="18" charset="0"/>
+                      </a:rPr>
+                      <m:t>𝑎</m:t>
+                    </m:r>
+                    <m:sSup>
+                      <m:sSupPr>
+                        <m:ctrlPr>
+                          <a:rPr lang="en-US" sz="1400" b="0" i="1" smtClean="0">
+                            <a:latin typeface="Cambria Math" panose="02040503050406030204" pitchFamily="18" charset="0"/>
+                          </a:rPr>
+                        </m:ctrlPr>
+                      </m:sSupPr>
+                      <m:e>
+                        <m:r>
+                          <a:rPr lang="en-US" sz="1400" b="0" i="1" smtClean="0">
+                            <a:latin typeface="Cambria Math" panose="02040503050406030204" pitchFamily="18" charset="0"/>
+                          </a:rPr>
+                          <m:t>𝑒</m:t>
+                        </m:r>
+                      </m:e>
+                      <m:sup>
+                        <m:r>
+                          <a:rPr lang="en-US" sz="1400" b="0" i="1" smtClean="0">
+                            <a:latin typeface="Cambria Math" panose="02040503050406030204" pitchFamily="18" charset="0"/>
+                          </a:rPr>
+                          <m:t>𝑏𝑥</m:t>
+                        </m:r>
+                      </m:sup>
+                    </m:sSup>
+                    <m:r>
+                      <a:rPr lang="en-US" sz="1400" b="0" i="1" smtClean="0">
+                        <a:latin typeface="Cambria Math" panose="02040503050406030204" pitchFamily="18" charset="0"/>
+                      </a:rPr>
+                      <m:t>+</m:t>
+                    </m:r>
+                    <m:r>
+                      <a:rPr lang="en-US" sz="1400" b="0" i="1" smtClean="0">
+                        <a:latin typeface="Cambria Math" panose="02040503050406030204" pitchFamily="18" charset="0"/>
+                      </a:rPr>
+                      <m:t>𝑐</m:t>
+                    </m:r>
+                  </m:oMath>
+                </a14:m>
+                <a:r>
+                  <a:rPr lang="en-US" sz="1400" dirty="0" smtClean="0"/>
+                  <a:t> </a:t>
+                </a:r>
+              </a:p>
+              <a:p>
+                <a:pPr algn="ctr"/>
+                <a:r>
+                  <a:rPr lang="en-US" sz="1400" dirty="0" smtClean="0"/>
+                  <a:t>fit the simulated data equally well.</a:t>
+                </a:r>
+              </a:p>
+              <a:p>
+                <a:pPr algn="ctr"/>
+                <a:endParaRPr lang="en-US" sz="1400" dirty="0"/>
+              </a:p>
+              <a:p>
+                <a:pPr algn="ctr"/>
+                <a:r>
+                  <a:rPr lang="en-US" sz="1400" dirty="0" smtClean="0"/>
+                  <a:t>Invert the function to get </a:t>
+                </a:r>
+                <a:r>
+                  <a:rPr lang="en-US" sz="1400" i="1" dirty="0" smtClean="0"/>
+                  <a:t>x(y)</a:t>
+                </a:r>
+                <a:r>
+                  <a:rPr lang="en-US" sz="1400" dirty="0" smtClean="0"/>
+                  <a:t> and find the max 1-state probability as a function of normalized peak power.</a:t>
+                </a:r>
+                <a:endParaRPr lang="en-US" sz="1400" dirty="0"/>
+              </a:p>
+            </p:txBody>
+          </p:sp>
+        </mc:Choice>
+        <mc:Fallback>
+          <p:sp>
+            <p:nvSpPr>
+              <p:cNvPr id="6" name="TextBox 5"/>
+              <p:cNvSpPr txBox="1">
+                <a:spLocks noRot="1" noChangeAspect="1" noMove="1" noResize="1" noEditPoints="1" noAdjustHandles="1" noChangeArrowheads="1" noChangeShapeType="1" noTextEdit="1"/>
+              </p:cNvSpPr>
+              <p:nvPr/>
+            </p:nvSpPr>
+            <p:spPr>
+              <a:xfrm>
+                <a:off x="4988099" y="2591149"/>
+                <a:ext cx="2329093" cy="2900666"/>
+              </a:xfrm>
+              <a:prstGeom prst="rect">
+                <a:avLst/>
+              </a:prstGeom>
+              <a:blipFill>
+                <a:blip r:embed="rId3"/>
+                <a:stretch>
+                  <a:fillRect t="-420" r="-1309" b="-1471"/>
+                </a:stretch>
+              </a:blipFill>
+            </p:spPr>
+            <p:txBody>
+              <a:bodyPr/>
+              <a:lstStyle/>
+              <a:p>
+                <a:r>
+                  <a:rPr lang="en-US">
+                    <a:noFill/>
+                  </a:rPr>
+                  <a:t> </a:t>
+                </a:r>
+              </a:p>
+            </p:txBody>
+          </p:sp>
+        </mc:Fallback>
+      </mc:AlternateContent>
+      <p:pic>
+        <p:nvPicPr>
+          <p:cNvPr id="8" name="Picture 7">
+            <a:extLst>
+              <a:ext uri="{FF2B5EF4-FFF2-40B4-BE49-F238E27FC236}">
+                <a16:creationId xmlns:a16="http://schemas.microsoft.com/office/drawing/2014/main" id="{FA67C886-514F-498F-B598-E665D8B8D2D4}"/>
+              </a:ext>
+            </a:extLst>
+          </p:cNvPr>
+          <p:cNvPicPr>
+            <a:picLocks noChangeAspect="1"/>
+          </p:cNvPicPr>
+          <p:nvPr/>
+        </p:nvPicPr>
+        <p:blipFill>
+          <a:blip r:embed="rId4"/>
+          <a:stretch>
+            <a:fillRect/>
+          </a:stretch>
+        </p:blipFill>
+        <p:spPr>
+          <a:xfrm>
+            <a:off x="7412970" y="2591149"/>
+            <a:ext cx="4670348" cy="3355732"/>
+          </a:xfrm>
+          <a:prstGeom prst="rect">
+            <a:avLst/>
+          </a:prstGeom>
+        </p:spPr>
+      </p:pic>
+      <p:sp>
+        <p:nvSpPr>
+          <p:cNvPr id="9" name="Right Arrow 8"/>
+          <p:cNvSpPr/>
+          <p:nvPr/>
+        </p:nvSpPr>
+        <p:spPr>
+          <a:xfrm>
+            <a:off x="4876800" y="5615354"/>
+            <a:ext cx="2801815" cy="246184"/>
+          </a:xfrm>
+          <a:prstGeom prst="rightArrow">
+            <a:avLst/>
+          </a:prstGeom>
+          <a:solidFill>
+            <a:srgbClr val="D2DCF2"/>
+          </a:solidFill>
+          <a:ln w="12700">
+            <a:solidFill>
+              <a:schemeClr val="tx1"/>
+            </a:solidFill>
+          </a:ln>
+        </p:spPr>
+        <p:style>
+          <a:lnRef idx="2">
+            <a:schemeClr val="accent1">
+              <a:shade val="50000"/>
+            </a:schemeClr>
+          </a:lnRef>
+          <a:fillRef idx="1">
+            <a:schemeClr val="accent1"/>
+          </a:fillRef>
+          <a:effectRef idx="0">
+            <a:schemeClr val="accent1"/>
+          </a:effectRef>
+          <a:fontRef idx="minor">
+            <a:schemeClr val="lt1"/>
+          </a:fontRef>
+        </p:style>
+        <p:txBody>
+          <a:bodyPr rtlCol="0" anchor="ctr"/>
+          <a:lstStyle/>
+          <a:p>
+            <a:pPr algn="ctr"/>
+            <a:endParaRPr lang="en-US" sz="1400" b="1" dirty="0" smtClean="0">
+              <a:solidFill>
+                <a:schemeClr val="tx1"/>
+              </a:solidFill>
+            </a:endParaRPr>
+          </a:p>
+        </p:txBody>
+      </p:sp>
+    </p:spTree>
+    <p:extLst>
+      <p:ext uri="{BB962C8B-B14F-4D97-AF65-F5344CB8AC3E}">
+        <p14:creationId xmlns:p14="http://schemas.microsoft.com/office/powerpoint/2010/main" val="4255663008"/>
+      </p:ext>
+    </p:extLst>
+  </p:cSld>
+  <p:clrMapOvr>
+    <a:masterClrMapping/>
+  </p:clrMapOvr>
+</p:sld>
+</file>
+
+<file path=ppt/slides/slide6.xml><?xml version="1.0" encoding="utf-8"?>
+<p:sld xmlns:a="http://schemas.openxmlformats.org/drawingml/2006/main" xmlns:r="http://schemas.openxmlformats.org/officeDocument/2006/relationships" xmlns:p="http://schemas.openxmlformats.org/presentationml/2006/main">
+  <p:cSld>
+    <p:spTree>
+      <p:nvGrpSpPr>
+        <p:cNvPr id="1" name=""/>
+        <p:cNvGrpSpPr/>
+        <p:nvPr/>
+      </p:nvGrpSpPr>
+      <p:grpSpPr>
+        <a:xfrm>
+          <a:off x="0" y="0"/>
+          <a:ext cx="0" cy="0"/>
+          <a:chOff x="0" y="0"/>
+          <a:chExt cx="0" cy="0"/>
+        </a:xfrm>
+      </p:grpSpPr>
+      <p:sp>
+        <p:nvSpPr>
+          <p:cNvPr id="2" name="Content Placeholder 1"/>
+          <p:cNvSpPr>
+            <a:spLocks noGrp="1"/>
+          </p:cNvSpPr>
+          <p:nvPr>
+            <p:ph sz="quarter" idx="10"/>
+          </p:nvPr>
+        </p:nvSpPr>
+        <p:spPr/>
+        <p:txBody>
+          <a:bodyPr/>
+          <a:lstStyle/>
+          <a:p>
+            <a:pPr marL="0" indent="0">
+              <a:buNone/>
+            </a:pPr>
+            <a:r>
+              <a:rPr lang="en-US" b="0" dirty="0" smtClean="0"/>
+              <a:t>Recall: from 20AUG, we used Gx^11 and modulated amplitude at ~5.5 Hz by ~5% by dithering noise eater </a:t>
+            </a:r>
+            <a:r>
+              <a:rPr lang="en-US" b="0" dirty="0" err="1" smtClean="0"/>
+              <a:t>setpoint</a:t>
+            </a:r>
+            <a:r>
+              <a:rPr lang="en-US" b="0" dirty="0" smtClean="0"/>
+              <a:t>. It used 28000 samples.</a:t>
+            </a:r>
+          </a:p>
+          <a:p>
+            <a:pPr marL="0" indent="0">
+              <a:buNone/>
+            </a:pPr>
+            <a:endParaRPr lang="en-US" b="0" dirty="0"/>
+          </a:p>
+          <a:p>
+            <a:pPr marL="0" indent="0">
+              <a:buNone/>
+            </a:pPr>
+            <a:r>
+              <a:rPr lang="en-US" b="0" dirty="0" smtClean="0"/>
+              <a:t>The normalized power spectrum for the experiment is shown below.</a:t>
+            </a:r>
+            <a:endParaRPr lang="en-US" b="0" dirty="0"/>
+          </a:p>
+        </p:txBody>
+      </p:sp>
+      <p:sp>
+        <p:nvSpPr>
+          <p:cNvPr id="3" name="Title 2"/>
+          <p:cNvSpPr>
+            <a:spLocks noGrp="1"/>
+          </p:cNvSpPr>
+          <p:nvPr>
+            <p:ph type="title"/>
+          </p:nvPr>
+        </p:nvSpPr>
+        <p:spPr/>
+        <p:txBody>
+          <a:bodyPr/>
+          <a:lstStyle/>
+          <a:p>
+            <a:r>
+              <a:rPr lang="en-US" dirty="0" smtClean="0"/>
+              <a:t>5. For experimental data, find the maximum 1-state probability of a selected frequency peak.</a:t>
+            </a:r>
+            <a:endParaRPr lang="en-US" dirty="0"/>
+          </a:p>
+        </p:txBody>
+      </p:sp>
+      <p:pic>
+        <p:nvPicPr>
+          <p:cNvPr id="4" name="Picture 3"/>
+          <p:cNvPicPr>
+            <a:picLocks noChangeAspect="1"/>
+          </p:cNvPicPr>
+          <p:nvPr/>
+        </p:nvPicPr>
+        <p:blipFill>
+          <a:blip r:embed="rId2"/>
+          <a:stretch>
+            <a:fillRect/>
+          </a:stretch>
+        </p:blipFill>
+        <p:spPr>
+          <a:xfrm>
+            <a:off x="1588720" y="2867390"/>
+            <a:ext cx="9454418" cy="2808549"/>
+          </a:xfrm>
+          <a:prstGeom prst="rect">
+            <a:avLst/>
+          </a:prstGeom>
+        </p:spPr>
+      </p:pic>
+      <p:sp>
+        <p:nvSpPr>
+          <p:cNvPr id="5" name="TextBox 4"/>
+          <p:cNvSpPr txBox="1"/>
+          <p:nvPr/>
+        </p:nvSpPr>
+        <p:spPr>
+          <a:xfrm>
+            <a:off x="2754923" y="5714549"/>
+            <a:ext cx="7537939" cy="307777"/>
+          </a:xfrm>
+          <a:prstGeom prst="rect">
+            <a:avLst/>
+          </a:prstGeom>
+          <a:noFill/>
+        </p:spPr>
+        <p:txBody>
+          <a:bodyPr wrap="square" rtlCol="0">
+            <a:spAutoFit/>
+          </a:bodyPr>
+          <a:lstStyle/>
+          <a:p>
+            <a:pPr algn="ctr"/>
+            <a:r>
+              <a:rPr lang="en-US" sz="1400" dirty="0" smtClean="0"/>
+              <a:t>The peak frequencies are </a:t>
+            </a:r>
+            <a:r>
+              <a:rPr lang="en-US" sz="1400" b="1" dirty="0" smtClean="0"/>
+              <a:t>5.64 Hz </a:t>
+            </a:r>
+            <a:r>
+              <a:rPr lang="en-US" sz="1400" dirty="0" smtClean="0"/>
+              <a:t>(power = 0.0051) and </a:t>
+            </a:r>
+            <a:r>
+              <a:rPr lang="en-US" sz="1400" b="1" dirty="0" smtClean="0"/>
+              <a:t>0.010 Hz </a:t>
+            </a:r>
+            <a:r>
+              <a:rPr lang="en-US" sz="1400" dirty="0" smtClean="0"/>
+              <a:t>(power = 0.0050)</a:t>
+            </a:r>
+            <a:endParaRPr lang="en-US" sz="1400" dirty="0"/>
+          </a:p>
+        </p:txBody>
+      </p:sp>
+    </p:spTree>
+    <p:extLst>
+      <p:ext uri="{BB962C8B-B14F-4D97-AF65-F5344CB8AC3E}">
+        <p14:creationId xmlns:p14="http://schemas.microsoft.com/office/powerpoint/2010/main" val="2707999688"/>
+      </p:ext>
+    </p:extLst>
+  </p:cSld>
+  <p:clrMapOvr>
+    <a:masterClrMapping/>
+  </p:clrMapOvr>
+</p:sld>
+</file>
+
+<file path=ppt/slides/slide7.xml><?xml version="1.0" encoding="utf-8"?>
+<p:sld xmlns:a="http://schemas.openxmlformats.org/drawingml/2006/main" xmlns:r="http://schemas.openxmlformats.org/officeDocument/2006/relationships" xmlns:p="http://schemas.openxmlformats.org/presentationml/2006/main">
+  <p:cSld>
+    <p:spTree>
+      <p:nvGrpSpPr>
+        <p:cNvPr id="1" name=""/>
+        <p:cNvGrpSpPr/>
+        <p:nvPr/>
+      </p:nvGrpSpPr>
+      <p:grpSpPr>
+        <a:xfrm>
+          <a:off x="0" y="0"/>
+          <a:ext cx="0" cy="0"/>
+          <a:chOff x="0" y="0"/>
+          <a:chExt cx="0" cy="0"/>
+        </a:xfrm>
+      </p:grpSpPr>
+      <p:sp>
+        <p:nvSpPr>
+          <p:cNvPr id="2" name="Content Placeholder 1"/>
+          <p:cNvSpPr>
+            <a:spLocks noGrp="1"/>
+          </p:cNvSpPr>
+          <p:nvPr>
+            <p:ph sz="quarter" idx="10"/>
+          </p:nvPr>
+        </p:nvSpPr>
+        <p:spPr>
+          <a:xfrm>
+            <a:off x="527574" y="918590"/>
+            <a:ext cx="10915522" cy="4830616"/>
+          </a:xfrm>
+        </p:spPr>
+        <p:txBody>
+          <a:bodyPr/>
+          <a:lstStyle/>
+          <a:p>
+            <a:r>
+              <a:rPr lang="en-US" b="0" dirty="0" smtClean="0"/>
+              <a:t>Using the optimized parameters from the exponential fit between 1-state probability and normalized power, the 1-state probabilities for 5.640 and 0.010 Hz are plotted below.</a:t>
+            </a:r>
+            <a:endParaRPr lang="en-US" b="0" dirty="0"/>
+          </a:p>
+        </p:txBody>
+      </p:sp>
+      <p:sp>
+        <p:nvSpPr>
+          <p:cNvPr id="3" name="Title 2"/>
+          <p:cNvSpPr>
+            <a:spLocks noGrp="1"/>
+          </p:cNvSpPr>
+          <p:nvPr>
+            <p:ph type="title"/>
+          </p:nvPr>
+        </p:nvSpPr>
+        <p:spPr/>
+        <p:txBody>
+          <a:bodyPr/>
+          <a:lstStyle/>
+          <a:p>
+            <a:r>
+              <a:rPr lang="en-US" dirty="0" smtClean="0"/>
+              <a:t>5, continued.</a:t>
+            </a:r>
+            <a:endParaRPr lang="en-US" dirty="0"/>
+          </a:p>
+        </p:txBody>
+      </p:sp>
+      <p:pic>
+        <p:nvPicPr>
+          <p:cNvPr id="4" name="Picture 3"/>
+          <p:cNvPicPr>
+            <a:picLocks noChangeAspect="1"/>
+          </p:cNvPicPr>
+          <p:nvPr/>
+        </p:nvPicPr>
+        <p:blipFill>
+          <a:blip r:embed="rId2"/>
+          <a:stretch>
+            <a:fillRect/>
+          </a:stretch>
+        </p:blipFill>
+        <p:spPr>
+          <a:xfrm>
+            <a:off x="2075810" y="1735579"/>
+            <a:ext cx="7819049" cy="2528419"/>
+          </a:xfrm>
+          <a:prstGeom prst="rect">
+            <a:avLst/>
+          </a:prstGeom>
+        </p:spPr>
+      </p:pic>
+      <p:pic>
+        <p:nvPicPr>
+          <p:cNvPr id="5" name="Picture 4"/>
+          <p:cNvPicPr>
+            <a:picLocks noChangeAspect="1"/>
+          </p:cNvPicPr>
+          <p:nvPr/>
+        </p:nvPicPr>
+        <p:blipFill>
+          <a:blip r:embed="rId3"/>
+          <a:stretch>
+            <a:fillRect/>
+          </a:stretch>
+        </p:blipFill>
+        <p:spPr>
+          <a:xfrm>
+            <a:off x="2075810" y="4263998"/>
+            <a:ext cx="7999996" cy="2581497"/>
+          </a:xfrm>
+          <a:prstGeom prst="rect">
+            <a:avLst/>
+          </a:prstGeom>
+        </p:spPr>
+      </p:pic>
+      <mc:AlternateContent xmlns:mc="http://schemas.openxmlformats.org/markup-compatibility/2006">
+        <mc:Choice xmlns:a14="http://schemas.microsoft.com/office/drawing/2010/main" Requires="a14">
+          <p:sp>
+            <p:nvSpPr>
+              <p:cNvPr id="6" name="TextBox 5"/>
+              <p:cNvSpPr txBox="1"/>
+              <p:nvPr/>
+            </p:nvSpPr>
+            <p:spPr>
+              <a:xfrm>
+                <a:off x="4109624" y="3253691"/>
+                <a:ext cx="2460482" cy="215444"/>
+              </a:xfrm>
+              <a:prstGeom prst="rect">
+                <a:avLst/>
+              </a:prstGeom>
+              <a:noFill/>
+            </p:spPr>
+            <p:txBody>
+              <a:bodyPr wrap="none" lIns="0" tIns="0" rIns="0" bIns="0" rtlCol="0">
+                <a:spAutoFit/>
+              </a:bodyPr>
+              <a:lstStyle/>
+              <a:p>
+                <a:pPr algn="ctr"/>
+                <a14:m>
+                  <m:oMathPara xmlns:m="http://schemas.openxmlformats.org/officeDocument/2006/math">
+                    <m:oMathParaPr>
+                      <m:jc m:val="centerGroup"/>
+                    </m:oMathParaPr>
+                    <m:oMath xmlns:m="http://schemas.openxmlformats.org/officeDocument/2006/math">
+                      <m:r>
+                        <a:rPr lang="en-US" sz="1400" b="0" i="1" smtClean="0">
+                          <a:latin typeface="Cambria Math" panose="02040503050406030204" pitchFamily="18" charset="0"/>
+                        </a:rPr>
+                        <m:t>𝑝</m:t>
+                      </m:r>
+                      <m:r>
+                        <a:rPr lang="en-US" sz="1400" b="0" i="1" smtClean="0">
+                          <a:latin typeface="Cambria Math" panose="02040503050406030204" pitchFamily="18" charset="0"/>
+                        </a:rPr>
+                        <m:t>=0.5+0.063</m:t>
+                      </m:r>
+                      <m:func>
+                        <m:funcPr>
+                          <m:ctrlPr>
+                            <a:rPr lang="en-US" sz="1400" b="0" i="1" smtClean="0">
+                              <a:latin typeface="Cambria Math" panose="02040503050406030204" pitchFamily="18" charset="0"/>
+                            </a:rPr>
+                          </m:ctrlPr>
+                        </m:funcPr>
+                        <m:fName>
+                          <m:r>
+                            <m:rPr>
+                              <m:sty m:val="p"/>
+                            </m:rPr>
+                            <a:rPr lang="en-US" sz="1400" b="0" i="0" smtClean="0">
+                              <a:latin typeface="Cambria Math" panose="02040503050406030204" pitchFamily="18" charset="0"/>
+                            </a:rPr>
+                            <m:t>sin</m:t>
+                          </m:r>
+                        </m:fName>
+                        <m:e>
+                          <m:r>
+                            <a:rPr lang="en-US" sz="1400" b="0" i="1" smtClean="0">
+                              <a:latin typeface="Cambria Math" panose="02040503050406030204" pitchFamily="18" charset="0"/>
+                            </a:rPr>
+                            <m:t>(2</m:t>
+                          </m:r>
+                          <m:r>
+                            <a:rPr lang="en-US" sz="1400" b="0" i="1" smtClean="0">
+                              <a:latin typeface="Cambria Math" panose="02040503050406030204" pitchFamily="18" charset="0"/>
+                              <a:ea typeface="Cambria Math" panose="02040503050406030204" pitchFamily="18" charset="0"/>
+                            </a:rPr>
+                            <m:t>𝜋</m:t>
+                          </m:r>
+                          <m:r>
+                            <a:rPr lang="en-US" sz="1400" b="0" i="1" smtClean="0">
+                              <a:latin typeface="Cambria Math" panose="02040503050406030204" pitchFamily="18" charset="0"/>
+                              <a:ea typeface="Cambria Math" panose="02040503050406030204" pitchFamily="18" charset="0"/>
+                            </a:rPr>
+                            <m:t>∗5.64</m:t>
+                          </m:r>
+                          <m:r>
+                            <a:rPr lang="en-US" sz="1400" b="0" i="1" smtClean="0">
+                              <a:latin typeface="Cambria Math" panose="02040503050406030204" pitchFamily="18" charset="0"/>
+                              <a:ea typeface="Cambria Math" panose="02040503050406030204" pitchFamily="18" charset="0"/>
+                            </a:rPr>
+                            <m:t>𝑡</m:t>
+                          </m:r>
+                          <m:r>
+                            <a:rPr lang="en-US" sz="1400" b="0" i="1" smtClean="0">
+                              <a:latin typeface="Cambria Math" panose="02040503050406030204" pitchFamily="18" charset="0"/>
+                              <a:ea typeface="Cambria Math" panose="02040503050406030204" pitchFamily="18" charset="0"/>
+                            </a:rPr>
+                            <m:t>)</m:t>
+                          </m:r>
+                        </m:e>
+                      </m:func>
+                    </m:oMath>
+                  </m:oMathPara>
+                </a14:m>
+                <a:endParaRPr lang="en-US" sz="1400" dirty="0"/>
+              </a:p>
+            </p:txBody>
+          </p:sp>
+        </mc:Choice>
+        <mc:Fallback>
+          <p:sp>
+            <p:nvSpPr>
+              <p:cNvPr id="6" name="TextBox 5"/>
+              <p:cNvSpPr txBox="1">
+                <a:spLocks noRot="1" noChangeAspect="1" noMove="1" noResize="1" noEditPoints="1" noAdjustHandles="1" noChangeArrowheads="1" noChangeShapeType="1" noTextEdit="1"/>
+              </p:cNvSpPr>
+              <p:nvPr/>
+            </p:nvSpPr>
+            <p:spPr>
+              <a:xfrm>
+                <a:off x="4109624" y="3253691"/>
+                <a:ext cx="2460482" cy="215444"/>
+              </a:xfrm>
+              <a:prstGeom prst="rect">
+                <a:avLst/>
+              </a:prstGeom>
+              <a:blipFill>
+                <a:blip r:embed="rId4"/>
+                <a:stretch>
+                  <a:fillRect l="-1980" r="-990" b="-34286"/>
+                </a:stretch>
+              </a:blipFill>
+            </p:spPr>
+            <p:txBody>
+              <a:bodyPr/>
+              <a:lstStyle/>
+              <a:p>
+                <a:r>
+                  <a:rPr lang="en-US">
+                    <a:noFill/>
+                  </a:rPr>
+                  <a:t> </a:t>
+                </a:r>
+              </a:p>
+            </p:txBody>
+          </p:sp>
+        </mc:Fallback>
+      </mc:AlternateContent>
+      <mc:AlternateContent xmlns:mc="http://schemas.openxmlformats.org/markup-compatibility/2006">
+        <mc:Choice xmlns:a14="http://schemas.microsoft.com/office/drawing/2010/main" Requires="a14">
+          <p:sp>
+            <p:nvSpPr>
+              <p:cNvPr id="7" name="TextBox 6"/>
+              <p:cNvSpPr txBox="1"/>
+              <p:nvPr/>
+            </p:nvSpPr>
+            <p:spPr>
+              <a:xfrm>
+                <a:off x="3769656" y="5808638"/>
+                <a:ext cx="2460482" cy="215444"/>
+              </a:xfrm>
+              <a:prstGeom prst="rect">
+                <a:avLst/>
+              </a:prstGeom>
+              <a:noFill/>
+            </p:spPr>
+            <p:txBody>
+              <a:bodyPr wrap="none" lIns="0" tIns="0" rIns="0" bIns="0" rtlCol="0">
+                <a:spAutoFit/>
+              </a:bodyPr>
+              <a:lstStyle/>
+              <a:p>
+                <a:pPr algn="ctr"/>
+                <a14:m>
+                  <m:oMathPara xmlns:m="http://schemas.openxmlformats.org/officeDocument/2006/math">
+                    <m:oMathParaPr>
+                      <m:jc m:val="centerGroup"/>
+                    </m:oMathParaPr>
+                    <m:oMath xmlns:m="http://schemas.openxmlformats.org/officeDocument/2006/math">
+                      <m:r>
+                        <a:rPr lang="en-US" sz="1400" b="0" i="1" smtClean="0">
+                          <a:latin typeface="Cambria Math" panose="02040503050406030204" pitchFamily="18" charset="0"/>
+                        </a:rPr>
+                        <m:t>𝑝</m:t>
+                      </m:r>
+                      <m:r>
+                        <a:rPr lang="en-US" sz="1400" b="0" i="1" smtClean="0">
+                          <a:latin typeface="Cambria Math" panose="02040503050406030204" pitchFamily="18" charset="0"/>
+                        </a:rPr>
+                        <m:t>=0.5+0.062</m:t>
+                      </m:r>
+                      <m:func>
+                        <m:funcPr>
+                          <m:ctrlPr>
+                            <a:rPr lang="en-US" sz="1400" b="0" i="1" smtClean="0">
+                              <a:latin typeface="Cambria Math" panose="02040503050406030204" pitchFamily="18" charset="0"/>
+                            </a:rPr>
+                          </m:ctrlPr>
+                        </m:funcPr>
+                        <m:fName>
+                          <m:r>
+                            <m:rPr>
+                              <m:sty m:val="p"/>
+                            </m:rPr>
+                            <a:rPr lang="en-US" sz="1400" b="0" i="0" smtClean="0">
+                              <a:latin typeface="Cambria Math" panose="02040503050406030204" pitchFamily="18" charset="0"/>
+                            </a:rPr>
+                            <m:t>sin</m:t>
+                          </m:r>
+                        </m:fName>
+                        <m:e>
+                          <m:r>
+                            <a:rPr lang="en-US" sz="1400" b="0" i="1" smtClean="0">
+                              <a:latin typeface="Cambria Math" panose="02040503050406030204" pitchFamily="18" charset="0"/>
+                            </a:rPr>
+                            <m:t>(2</m:t>
+                          </m:r>
+                          <m:r>
+                            <a:rPr lang="en-US" sz="1400" b="0" i="1" smtClean="0">
+                              <a:latin typeface="Cambria Math" panose="02040503050406030204" pitchFamily="18" charset="0"/>
+                              <a:ea typeface="Cambria Math" panose="02040503050406030204" pitchFamily="18" charset="0"/>
+                            </a:rPr>
+                            <m:t>𝜋</m:t>
+                          </m:r>
+                          <m:r>
+                            <a:rPr lang="en-US" sz="1400" b="0" i="1" smtClean="0">
+                              <a:latin typeface="Cambria Math" panose="02040503050406030204" pitchFamily="18" charset="0"/>
+                              <a:ea typeface="Cambria Math" panose="02040503050406030204" pitchFamily="18" charset="0"/>
+                            </a:rPr>
+                            <m:t>∗0.01</m:t>
+                          </m:r>
+                          <m:r>
+                            <a:rPr lang="en-US" sz="1400" b="0" i="1" smtClean="0">
+                              <a:latin typeface="Cambria Math" panose="02040503050406030204" pitchFamily="18" charset="0"/>
+                              <a:ea typeface="Cambria Math" panose="02040503050406030204" pitchFamily="18" charset="0"/>
+                            </a:rPr>
+                            <m:t>𝑡</m:t>
+                          </m:r>
+                          <m:r>
+                            <a:rPr lang="en-US" sz="1400" b="0" i="1" smtClean="0">
+                              <a:latin typeface="Cambria Math" panose="02040503050406030204" pitchFamily="18" charset="0"/>
+                              <a:ea typeface="Cambria Math" panose="02040503050406030204" pitchFamily="18" charset="0"/>
+                            </a:rPr>
+                            <m:t>)</m:t>
+                          </m:r>
+                        </m:e>
+                      </m:func>
+                    </m:oMath>
+                  </m:oMathPara>
+                </a14:m>
+                <a:endParaRPr lang="en-US" sz="1400" dirty="0"/>
+              </a:p>
+            </p:txBody>
+          </p:sp>
+        </mc:Choice>
+        <mc:Fallback>
+          <p:sp>
+            <p:nvSpPr>
+              <p:cNvPr id="7" name="TextBox 6"/>
+              <p:cNvSpPr txBox="1">
+                <a:spLocks noRot="1" noChangeAspect="1" noMove="1" noResize="1" noEditPoints="1" noAdjustHandles="1" noChangeArrowheads="1" noChangeShapeType="1" noTextEdit="1"/>
+              </p:cNvSpPr>
+              <p:nvPr/>
+            </p:nvSpPr>
+            <p:spPr>
+              <a:xfrm>
+                <a:off x="3769656" y="5808638"/>
+                <a:ext cx="2460482" cy="215444"/>
+              </a:xfrm>
+              <a:prstGeom prst="rect">
+                <a:avLst/>
+              </a:prstGeom>
+              <a:blipFill>
+                <a:blip r:embed="rId5"/>
+                <a:stretch>
+                  <a:fillRect l="-1980" r="-990" b="-34286"/>
+                </a:stretch>
+              </a:blipFill>
+            </p:spPr>
+            <p:txBody>
+              <a:bodyPr/>
+              <a:lstStyle/>
+              <a:p>
+                <a:r>
+                  <a:rPr lang="en-US">
+                    <a:noFill/>
+                  </a:rPr>
+                  <a:t> </a:t>
+                </a:r>
+              </a:p>
+            </p:txBody>
+          </p:sp>
+        </mc:Fallback>
+      </mc:AlternateContent>
+    </p:spTree>
+    <p:extLst>
+      <p:ext uri="{BB962C8B-B14F-4D97-AF65-F5344CB8AC3E}">
+        <p14:creationId xmlns:p14="http://schemas.microsoft.com/office/powerpoint/2010/main" val="1935256672"/>
+      </p:ext>
+    </p:extLst>
+  </p:cSld>
+  <p:clrMapOvr>
+    <a:masterClrMapping/>
+  </p:clrMapOvr>
+</p:sld>
+</file>
+
+<file path=ppt/slides/slide8.xml><?xml version="1.0" encoding="utf-8"?>
+<p:sld xmlns:a="http://schemas.openxmlformats.org/drawingml/2006/main" xmlns:r="http://schemas.openxmlformats.org/officeDocument/2006/relationships" xmlns:p="http://schemas.openxmlformats.org/presentationml/2006/main">
+  <p:cSld>
+    <p:spTree>
+      <p:nvGrpSpPr>
+        <p:cNvPr id="1" name=""/>
+        <p:cNvGrpSpPr/>
+        <p:nvPr/>
+      </p:nvGrpSpPr>
+      <p:grpSpPr>
+        <a:xfrm>
+          <a:off x="0" y="0"/>
+          <a:ext cx="0" cy="0"/>
+          <a:chOff x="0" y="0"/>
+          <a:chExt cx="0" cy="0"/>
+        </a:xfrm>
+      </p:grpSpPr>
+      <mc:AlternateContent xmlns:mc="http://schemas.openxmlformats.org/markup-compatibility/2006">
+        <mc:Choice xmlns:a14="http://schemas.microsoft.com/office/drawing/2010/main" Requires="a14">
+          <p:sp>
+            <p:nvSpPr>
+              <p:cNvPr id="2" name="Content Placeholder 1"/>
+              <p:cNvSpPr>
+                <a:spLocks noGrp="1"/>
+              </p:cNvSpPr>
+              <p:nvPr>
+                <p:ph sz="quarter" idx="10"/>
+              </p:nvPr>
+            </p:nvSpPr>
+            <p:spPr/>
+            <p:txBody>
+              <a:bodyPr/>
+              <a:lstStyle/>
+              <a:p>
+                <a:r>
+                  <a:rPr lang="en-US" b="0" dirty="0" smtClean="0"/>
+                  <a:t>To make this useful, we need to find the change in probability per second, </a:t>
+                </a:r>
+                <a14:m>
+                  <m:oMath xmlns:m="http://schemas.openxmlformats.org/officeDocument/2006/math">
+                    <m:f>
+                      <m:fPr>
+                        <m:ctrlPr>
+                          <a:rPr lang="en-US" b="0" i="1" smtClean="0">
+                            <a:latin typeface="Cambria Math" panose="02040503050406030204" pitchFamily="18" charset="0"/>
+                            <a:ea typeface="Cambria Math" panose="02040503050406030204" pitchFamily="18" charset="0"/>
+                          </a:rPr>
+                        </m:ctrlPr>
+                      </m:fPr>
+                      <m:num>
+                        <m:r>
+                          <a:rPr lang="en-US" b="0" i="1">
+                            <a:latin typeface="Cambria Math" panose="02040503050406030204" pitchFamily="18" charset="0"/>
+                            <a:ea typeface="Cambria Math" panose="02040503050406030204" pitchFamily="18" charset="0"/>
+                          </a:rPr>
+                          <m:t>∆</m:t>
+                        </m:r>
+                        <m:r>
+                          <a:rPr lang="en-US" b="0" i="1">
+                            <a:latin typeface="Cambria Math" panose="02040503050406030204" pitchFamily="18" charset="0"/>
+                            <a:ea typeface="Cambria Math" panose="02040503050406030204" pitchFamily="18" charset="0"/>
+                          </a:rPr>
+                          <m:t>𝑝</m:t>
+                        </m:r>
+                      </m:num>
+                      <m:den>
+                        <m:r>
+                          <a:rPr lang="en-US" b="0" i="1" smtClean="0">
+                            <a:latin typeface="Cambria Math" panose="02040503050406030204" pitchFamily="18" charset="0"/>
+                            <a:ea typeface="Cambria Math" panose="02040503050406030204" pitchFamily="18" charset="0"/>
+                          </a:rPr>
+                          <m:t>𝑠</m:t>
+                        </m:r>
+                      </m:den>
+                    </m:f>
+                  </m:oMath>
+                </a14:m>
+                <a:endParaRPr lang="en-US" b="0" dirty="0" smtClean="0"/>
+              </a:p>
+              <a:p>
+                <a:pPr lvl="1"/>
+                <a:r>
+                  <a:rPr lang="en-US" b="0" dirty="0" smtClean="0"/>
+                  <a:t>This corresponds to the slope of the </a:t>
+                </a:r>
+                <a:r>
+                  <a:rPr lang="en-US" b="0" i="1" dirty="0" smtClean="0"/>
+                  <a:t>p(t) </a:t>
+                </a:r>
+                <a:r>
+                  <a:rPr lang="en-US" b="0" dirty="0" smtClean="0"/>
+                  <a:t>plots shown earlier, i.e. 1</a:t>
+                </a:r>
+                <a:r>
+                  <a:rPr lang="en-US" b="0" baseline="30000" dirty="0" smtClean="0"/>
+                  <a:t>st</a:t>
+                </a:r>
+                <a:r>
+                  <a:rPr lang="en-US" b="0" dirty="0" smtClean="0"/>
+                  <a:t> derivative</a:t>
+                </a:r>
+              </a:p>
+              <a:p>
+                <a:endParaRPr lang="en-US" b="0" dirty="0"/>
+              </a:p>
+              <a:p>
+                <a:r>
+                  <a:rPr lang="en-US" b="0" dirty="0" smtClean="0"/>
+                  <a:t>The maximum </a:t>
+                </a:r>
+                <a14:m>
+                  <m:oMath xmlns:m="http://schemas.openxmlformats.org/officeDocument/2006/math">
+                    <m:f>
+                      <m:fPr>
+                        <m:ctrlPr>
+                          <a:rPr lang="en-US" b="0" i="1">
+                            <a:latin typeface="Cambria Math" panose="02040503050406030204" pitchFamily="18" charset="0"/>
+                            <a:ea typeface="Cambria Math" panose="02040503050406030204" pitchFamily="18" charset="0"/>
+                          </a:rPr>
+                        </m:ctrlPr>
+                      </m:fPr>
+                      <m:num>
+                        <m:r>
+                          <a:rPr lang="en-US" b="0" i="1">
+                            <a:latin typeface="Cambria Math" panose="02040503050406030204" pitchFamily="18" charset="0"/>
+                            <a:ea typeface="Cambria Math" panose="02040503050406030204" pitchFamily="18" charset="0"/>
+                          </a:rPr>
+                          <m:t>∆</m:t>
+                        </m:r>
+                        <m:r>
+                          <a:rPr lang="en-US" b="0" i="1">
+                            <a:latin typeface="Cambria Math" panose="02040503050406030204" pitchFamily="18" charset="0"/>
+                            <a:ea typeface="Cambria Math" panose="02040503050406030204" pitchFamily="18" charset="0"/>
+                          </a:rPr>
+                          <m:t>𝑝</m:t>
+                        </m:r>
+                      </m:num>
+                      <m:den>
+                        <m:r>
+                          <a:rPr lang="en-US" b="0" i="1">
+                            <a:latin typeface="Cambria Math" panose="02040503050406030204" pitchFamily="18" charset="0"/>
+                            <a:ea typeface="Cambria Math" panose="02040503050406030204" pitchFamily="18" charset="0"/>
+                          </a:rPr>
+                          <m:t>𝑠</m:t>
+                        </m:r>
+                      </m:den>
+                    </m:f>
+                  </m:oMath>
+                </a14:m>
+                <a:r>
+                  <a:rPr lang="en-US" b="0" dirty="0" smtClean="0"/>
+                  <a:t> from the 1</a:t>
+                </a:r>
+                <a:r>
+                  <a:rPr lang="en-US" b="0" baseline="30000" dirty="0" smtClean="0"/>
+                  <a:t>st</a:t>
+                </a:r>
+                <a:r>
+                  <a:rPr lang="en-US" b="0" dirty="0" smtClean="0"/>
+                  <a:t> derivative of the previous plots were:</a:t>
+                </a:r>
+              </a:p>
+              <a:p>
+                <a:pPr lvl="1"/>
+                <a:r>
+                  <a:rPr lang="en-US" b="0" dirty="0" smtClean="0"/>
+                  <a:t>5.64 Hz: max </a:t>
+                </a:r>
+                <a14:m>
+                  <m:oMath xmlns:m="http://schemas.openxmlformats.org/officeDocument/2006/math">
+                    <m:f>
+                      <m:fPr>
+                        <m:ctrlPr>
+                          <a:rPr lang="en-US" b="0" i="1">
+                            <a:latin typeface="Cambria Math" panose="02040503050406030204" pitchFamily="18" charset="0"/>
+                            <a:ea typeface="Cambria Math" panose="02040503050406030204" pitchFamily="18" charset="0"/>
+                          </a:rPr>
+                        </m:ctrlPr>
+                      </m:fPr>
+                      <m:num>
+                        <m:r>
+                          <a:rPr lang="en-US" b="0" i="1">
+                            <a:latin typeface="Cambria Math" panose="02040503050406030204" pitchFamily="18" charset="0"/>
+                            <a:ea typeface="Cambria Math" panose="02040503050406030204" pitchFamily="18" charset="0"/>
+                          </a:rPr>
+                          <m:t>∆</m:t>
+                        </m:r>
+                        <m:r>
+                          <a:rPr lang="en-US" b="0" i="1">
+                            <a:latin typeface="Cambria Math" panose="02040503050406030204" pitchFamily="18" charset="0"/>
+                            <a:ea typeface="Cambria Math" panose="02040503050406030204" pitchFamily="18" charset="0"/>
+                          </a:rPr>
+                          <m:t>𝑝</m:t>
+                        </m:r>
+                      </m:num>
+                      <m:den>
+                        <m:r>
+                          <a:rPr lang="en-US" b="0" i="1">
+                            <a:latin typeface="Cambria Math" panose="02040503050406030204" pitchFamily="18" charset="0"/>
+                            <a:ea typeface="Cambria Math" panose="02040503050406030204" pitchFamily="18" charset="0"/>
+                          </a:rPr>
+                          <m:t>𝑠</m:t>
+                        </m:r>
+                      </m:den>
+                    </m:f>
+                  </m:oMath>
+                </a14:m>
+                <a:r>
+                  <a:rPr lang="en-US" b="0" dirty="0" smtClean="0"/>
+                  <a:t> = 0.049</a:t>
+                </a:r>
+              </a:p>
+              <a:p>
+                <a:pPr lvl="1"/>
+                <a:r>
+                  <a:rPr lang="en-US" b="0" dirty="0" smtClean="0"/>
+                  <a:t>0.010 Hz: max </a:t>
+                </a:r>
+                <a14:m>
+                  <m:oMath xmlns:m="http://schemas.openxmlformats.org/officeDocument/2006/math">
+                    <m:f>
+                      <m:fPr>
+                        <m:ctrlPr>
+                          <a:rPr lang="en-US" b="0" i="1">
+                            <a:latin typeface="Cambria Math" panose="02040503050406030204" pitchFamily="18" charset="0"/>
+                            <a:ea typeface="Cambria Math" panose="02040503050406030204" pitchFamily="18" charset="0"/>
+                          </a:rPr>
+                        </m:ctrlPr>
+                      </m:fPr>
+                      <m:num>
+                        <m:r>
+                          <a:rPr lang="en-US" b="0" i="1">
+                            <a:latin typeface="Cambria Math" panose="02040503050406030204" pitchFamily="18" charset="0"/>
+                            <a:ea typeface="Cambria Math" panose="02040503050406030204" pitchFamily="18" charset="0"/>
+                          </a:rPr>
+                          <m:t>∆</m:t>
+                        </m:r>
+                        <m:r>
+                          <a:rPr lang="en-US" b="0" i="1">
+                            <a:latin typeface="Cambria Math" panose="02040503050406030204" pitchFamily="18" charset="0"/>
+                            <a:ea typeface="Cambria Math" panose="02040503050406030204" pitchFamily="18" charset="0"/>
+                          </a:rPr>
+                          <m:t>𝑝</m:t>
+                        </m:r>
+                      </m:num>
+                      <m:den>
+                        <m:r>
+                          <a:rPr lang="en-US" b="0" i="1">
+                            <a:latin typeface="Cambria Math" panose="02040503050406030204" pitchFamily="18" charset="0"/>
+                            <a:ea typeface="Cambria Math" panose="02040503050406030204" pitchFamily="18" charset="0"/>
+                          </a:rPr>
+                          <m:t>𝑠</m:t>
+                        </m:r>
+                      </m:den>
+                    </m:f>
+                  </m:oMath>
+                </a14:m>
+                <a:r>
+                  <a:rPr lang="en-US" b="0" dirty="0" smtClean="0"/>
+                  <a:t> = 0.004</a:t>
+                </a:r>
+              </a:p>
+              <a:p>
+                <a:pPr lvl="1"/>
+                <a:endParaRPr lang="en-US" b="0" dirty="0"/>
+              </a:p>
+              <a:p>
+                <a:r>
+                  <a:rPr lang="en-US" b="0" dirty="0" smtClean="0"/>
+                  <a:t>We should be able to relate </a:t>
+                </a:r>
+                <a14:m>
+                  <m:oMath xmlns:m="http://schemas.openxmlformats.org/officeDocument/2006/math">
+                    <m:f>
+                      <m:fPr>
+                        <m:ctrlPr>
+                          <a:rPr lang="en-US" b="0" i="1">
+                            <a:latin typeface="Cambria Math" panose="02040503050406030204" pitchFamily="18" charset="0"/>
+                            <a:ea typeface="Cambria Math" panose="02040503050406030204" pitchFamily="18" charset="0"/>
+                          </a:rPr>
+                        </m:ctrlPr>
+                      </m:fPr>
+                      <m:num>
+                        <m:r>
+                          <a:rPr lang="en-US" b="0" i="1">
+                            <a:latin typeface="Cambria Math" panose="02040503050406030204" pitchFamily="18" charset="0"/>
+                            <a:ea typeface="Cambria Math" panose="02040503050406030204" pitchFamily="18" charset="0"/>
+                          </a:rPr>
+                          <m:t>∆</m:t>
+                        </m:r>
+                        <m:r>
+                          <a:rPr lang="en-US" b="0" i="1">
+                            <a:latin typeface="Cambria Math" panose="02040503050406030204" pitchFamily="18" charset="0"/>
+                            <a:ea typeface="Cambria Math" panose="02040503050406030204" pitchFamily="18" charset="0"/>
+                          </a:rPr>
+                          <m:t>𝑝</m:t>
+                        </m:r>
+                      </m:num>
+                      <m:den>
+                        <m:r>
+                          <a:rPr lang="en-US" b="0" i="1">
+                            <a:latin typeface="Cambria Math" panose="02040503050406030204" pitchFamily="18" charset="0"/>
+                            <a:ea typeface="Cambria Math" panose="02040503050406030204" pitchFamily="18" charset="0"/>
+                          </a:rPr>
+                          <m:t>𝑠</m:t>
+                        </m:r>
+                      </m:den>
+                    </m:f>
+                  </m:oMath>
+                </a14:m>
+                <a:r>
+                  <a:rPr lang="en-US" b="0" dirty="0" smtClean="0"/>
+                  <a:t> to the amount of detuning at the specified frequency.</a:t>
+                </a:r>
+              </a:p>
+            </p:txBody>
+          </p:sp>
+        </mc:Choice>
+        <mc:Fallback>
+          <p:sp>
+            <p:nvSpPr>
+              <p:cNvPr id="2" name="Content Placeholder 1"/>
+              <p:cNvSpPr>
+                <a:spLocks noGrp="1" noRot="1" noChangeAspect="1" noMove="1" noResize="1" noEditPoints="1" noAdjustHandles="1" noChangeArrowheads="1" noChangeShapeType="1" noTextEdit="1"/>
+              </p:cNvSpPr>
+              <p:nvPr>
+                <p:ph sz="quarter" idx="10"/>
+              </p:nvPr>
+            </p:nvSpPr>
+            <p:spPr>
+              <a:blipFill>
+                <a:blip r:embed="rId2"/>
+                <a:stretch>
+                  <a:fillRect l="-503"/>
+                </a:stretch>
+              </a:blipFill>
+            </p:spPr>
+            <p:txBody>
+              <a:bodyPr/>
+              <a:lstStyle/>
+              <a:p>
+                <a:r>
+                  <a:rPr lang="en-US">
+                    <a:noFill/>
+                  </a:rPr>
+                  <a:t> </a:t>
+                </a:r>
+              </a:p>
+            </p:txBody>
+          </p:sp>
+        </mc:Fallback>
+      </mc:AlternateContent>
+      <p:sp>
+        <p:nvSpPr>
+          <p:cNvPr id="3" name="Title 2"/>
+          <p:cNvSpPr>
+            <a:spLocks noGrp="1"/>
+          </p:cNvSpPr>
+          <p:nvPr>
+            <p:ph type="title"/>
+          </p:nvPr>
+        </p:nvSpPr>
+        <p:spPr/>
+        <p:txBody>
+          <a:bodyPr/>
+          <a:lstStyle/>
+          <a:p>
+            <a:r>
+              <a:rPr lang="en-US" dirty="0" smtClean="0"/>
+              <a:t>5., continued.</a:t>
+            </a:r>
+            <a:endParaRPr lang="en-US" dirty="0"/>
+          </a:p>
+        </p:txBody>
+      </p:sp>
+    </p:spTree>
+    <p:extLst>
+      <p:ext uri="{BB962C8B-B14F-4D97-AF65-F5344CB8AC3E}">
+        <p14:creationId xmlns:p14="http://schemas.microsoft.com/office/powerpoint/2010/main" val="2988728982"/>
       </p:ext>
     </p:extLst>
   </p:cSld>

</xml_diff>

<commit_message>
Worked through IDCT input
</commit_message>
<xml_diff>
--- a/2018_09_04DriftUpdate.pptx
+++ b/2018_09_04DriftUpdate.pptx
@@ -5,10 +5,10 @@
     <p:sldMasterId id="2147483667" r:id="rId1"/>
   </p:sldMasterIdLst>
   <p:notesMasterIdLst>
-    <p:notesMasterId r:id="rId10"/>
+    <p:notesMasterId r:id="rId14"/>
   </p:notesMasterIdLst>
   <p:handoutMasterIdLst>
-    <p:handoutMasterId r:id="rId11"/>
+    <p:handoutMasterId r:id="rId15"/>
   </p:handoutMasterIdLst>
   <p:sldIdLst>
     <p:sldId id="257" r:id="rId2"/>
@@ -19,6 +19,10 @@
     <p:sldId id="262" r:id="rId7"/>
     <p:sldId id="263" r:id="rId8"/>
     <p:sldId id="264" r:id="rId9"/>
+    <p:sldId id="265" r:id="rId10"/>
+    <p:sldId id="267" r:id="rId11"/>
+    <p:sldId id="268" r:id="rId12"/>
+    <p:sldId id="269" r:id="rId13"/>
   </p:sldIdLst>
   <p:sldSz cx="12188825" cy="6858000"/>
   <p:notesSz cx="7010400" cy="9271000"/>
@@ -233,7 +237,7 @@
             <a:fld id="{2151C11E-1A00-48AF-8C08-97C362C67874}" type="datetimeFigureOut">
               <a:rPr lang="en-US" smtClean="0"/>
               <a:pPr/>
-              <a:t>9/5/2018</a:t>
+              <a:t>9/10/2018</a:t>
             </a:fld>
             <a:endParaRPr lang="en-US" dirty="0"/>
           </a:p>
@@ -404,7 +408,7 @@
             <a:fld id="{8C7BB64C-82E2-466C-9C50-B2DA6307AB11}" type="datetimeFigureOut">
               <a:rPr lang="en-US" smtClean="0"/>
               <a:pPr/>
-              <a:t>9/5/2018</a:t>
+              <a:t>9/10/2018</a:t>
             </a:fld>
             <a:endParaRPr lang="en-US" dirty="0"/>
           </a:p>
@@ -3199,6 +3203,994 @@
 </p:sld>
 </file>
 
+<file path=ppt/slides/slide10.xml><?xml version="1.0" encoding="utf-8"?>
+<p:sld xmlns:a="http://schemas.openxmlformats.org/drawingml/2006/main" xmlns:r="http://schemas.openxmlformats.org/officeDocument/2006/relationships" xmlns:p="http://schemas.openxmlformats.org/presentationml/2006/main">
+  <p:cSld>
+    <p:spTree>
+      <p:nvGrpSpPr>
+        <p:cNvPr id="1" name=""/>
+        <p:cNvGrpSpPr/>
+        <p:nvPr/>
+      </p:nvGrpSpPr>
+      <p:grpSpPr>
+        <a:xfrm>
+          <a:off x="0" y="0"/>
+          <a:ext cx="0" cy="0"/>
+          <a:chOff x="0" y="0"/>
+          <a:chExt cx="0" cy="0"/>
+        </a:xfrm>
+      </p:grpSpPr>
+      <p:sp>
+        <p:nvSpPr>
+          <p:cNvPr id="2" name="Content Placeholder 1"/>
+          <p:cNvSpPr>
+            <a:spLocks noGrp="1"/>
+          </p:cNvSpPr>
+          <p:nvPr>
+            <p:ph sz="quarter" idx="10"/>
+          </p:nvPr>
+        </p:nvSpPr>
+        <p:spPr/>
+        <p:txBody>
+          <a:bodyPr/>
+          <a:lstStyle/>
+          <a:p>
+            <a:r>
+              <a:rPr lang="en-US" dirty="0" err="1"/>
+              <a:t>Gx</a:t>
+            </a:r>
+            <a:r>
+              <a:rPr lang="en-US" dirty="0"/>
+              <a:t>(16Gi)</a:t>
+            </a:r>
+            <a:r>
+              <a:rPr lang="en-US" dirty="0" err="1"/>
+              <a:t>Gy</a:t>
+            </a:r>
+            <a:r>
+              <a:rPr lang="en-US" dirty="0"/>
+              <a:t> </a:t>
+            </a:r>
+            <a:r>
+              <a:rPr lang="en-US" dirty="0" smtClean="0"/>
+              <a:t>: 2018_08_27_1354_31_DRIFT</a:t>
+            </a:r>
+            <a:endParaRPr lang="en-US" dirty="0"/>
+          </a:p>
+        </p:txBody>
+      </p:sp>
+      <p:sp>
+        <p:nvSpPr>
+          <p:cNvPr id="3" name="Title 2"/>
+          <p:cNvSpPr>
+            <a:spLocks noGrp="1"/>
+          </p:cNvSpPr>
+          <p:nvPr>
+            <p:ph type="title"/>
+          </p:nvPr>
+        </p:nvSpPr>
+        <p:spPr/>
+        <p:txBody>
+          <a:bodyPr/>
+          <a:lstStyle/>
+          <a:p>
+            <a:r>
+              <a:rPr lang="en-US" dirty="0" smtClean="0"/>
+              <a:t>More experimental data, using Ramsey experiments</a:t>
+            </a:r>
+            <a:endParaRPr lang="en-US" dirty="0"/>
+          </a:p>
+        </p:txBody>
+      </p:sp>
+      <mc:AlternateContent xmlns:mc="http://schemas.openxmlformats.org/markup-compatibility/2006" xmlns:a14="http://schemas.microsoft.com/office/drawing/2010/main">
+        <mc:Choice Requires="a14">
+          <p:sp>
+            <p:nvSpPr>
+              <p:cNvPr id="5" name="TextBox 4"/>
+              <p:cNvSpPr txBox="1"/>
+              <p:nvPr/>
+            </p:nvSpPr>
+            <p:spPr>
+              <a:xfrm>
+                <a:off x="3201103" y="4563938"/>
+                <a:ext cx="5779477" cy="1145826"/>
+              </a:xfrm>
+              <a:prstGeom prst="rect">
+                <a:avLst/>
+              </a:prstGeom>
+              <a:noFill/>
+            </p:spPr>
+            <p:txBody>
+              <a:bodyPr wrap="square" rtlCol="0">
+                <a:spAutoFit/>
+              </a:bodyPr>
+              <a:lstStyle/>
+              <a:p>
+                <a:pPr algn="ctr"/>
+                <a:r>
+                  <a:rPr lang="en-US" sz="1400" b="1" dirty="0" smtClean="0"/>
+                  <a:t>Frequency: </a:t>
+                </a:r>
+                <a:r>
+                  <a:rPr lang="en-US" sz="1400" dirty="0" smtClean="0"/>
+                  <a:t>0.0001 Hz</a:t>
+                </a:r>
+                <a:r>
+                  <a:rPr lang="en-US" sz="1400" b="1" dirty="0" smtClean="0"/>
+                  <a:t>, Norm. Power: </a:t>
+                </a:r>
+                <a:r>
+                  <a:rPr lang="en-US" sz="1400" dirty="0" smtClean="0"/>
+                  <a:t>0.0035,</a:t>
+                </a:r>
+                <a:r>
+                  <a:rPr lang="en-US" sz="1400" b="1" dirty="0" smtClean="0"/>
+                  <a:t> Max </a:t>
+                </a:r>
+                <a14:m>
+                  <m:oMath xmlns:m="http://schemas.openxmlformats.org/officeDocument/2006/math">
+                    <m:f>
+                      <m:fPr>
+                        <m:ctrlPr>
+                          <a:rPr lang="en-US" sz="1400" i="1">
+                            <a:latin typeface="Cambria Math" panose="02040503050406030204" pitchFamily="18" charset="0"/>
+                            <a:ea typeface="Cambria Math" panose="02040503050406030204" pitchFamily="18" charset="0"/>
+                          </a:rPr>
+                        </m:ctrlPr>
+                      </m:fPr>
+                      <m:num>
+                        <m:r>
+                          <a:rPr lang="en-US" sz="1400" i="1">
+                            <a:latin typeface="Cambria Math" panose="02040503050406030204" pitchFamily="18" charset="0"/>
+                            <a:ea typeface="Cambria Math" panose="02040503050406030204" pitchFamily="18" charset="0"/>
+                          </a:rPr>
+                          <m:t>∆</m:t>
+                        </m:r>
+                        <m:r>
+                          <a:rPr lang="en-US" sz="1400" i="1">
+                            <a:latin typeface="Cambria Math" panose="02040503050406030204" pitchFamily="18" charset="0"/>
+                            <a:ea typeface="Cambria Math" panose="02040503050406030204" pitchFamily="18" charset="0"/>
+                          </a:rPr>
+                          <m:t>𝑝</m:t>
+                        </m:r>
+                      </m:num>
+                      <m:den>
+                        <m:r>
+                          <a:rPr lang="en-US" sz="1400" i="1">
+                            <a:latin typeface="Cambria Math" panose="02040503050406030204" pitchFamily="18" charset="0"/>
+                            <a:ea typeface="Cambria Math" panose="02040503050406030204" pitchFamily="18" charset="0"/>
+                          </a:rPr>
+                          <m:t>𝑠</m:t>
+                        </m:r>
+                      </m:den>
+                    </m:f>
+                  </m:oMath>
+                </a14:m>
+                <a:r>
+                  <a:rPr lang="en-US" sz="1400" b="1" dirty="0" smtClean="0"/>
+                  <a:t> : </a:t>
+                </a:r>
+                <a:r>
+                  <a:rPr lang="en-US" sz="1400" dirty="0" smtClean="0"/>
+                  <a:t>0.00003</a:t>
+                </a:r>
+              </a:p>
+              <a:p>
+                <a:pPr algn="ctr"/>
+                <a:endParaRPr lang="en-US" sz="1400" b="1" dirty="0"/>
+              </a:p>
+              <a:p>
+                <a:pPr algn="ctr"/>
+                <a:r>
+                  <a:rPr lang="en-US" sz="1400" b="1" dirty="0"/>
+                  <a:t>Frequency</a:t>
+                </a:r>
+                <a:r>
+                  <a:rPr lang="en-US" sz="1400" b="1" dirty="0" smtClean="0"/>
+                  <a:t>: </a:t>
+                </a:r>
+                <a:r>
+                  <a:rPr lang="en-US" sz="1400" dirty="0" smtClean="0"/>
+                  <a:t>1.208 Hz</a:t>
+                </a:r>
+                <a:r>
+                  <a:rPr lang="en-US" sz="1400" b="1" dirty="0" smtClean="0"/>
+                  <a:t>, </a:t>
+                </a:r>
+                <a:r>
+                  <a:rPr lang="en-US" sz="1400" b="1" dirty="0"/>
+                  <a:t>Norm. Power</a:t>
+                </a:r>
+                <a:r>
+                  <a:rPr lang="en-US" sz="1400" b="1" dirty="0" smtClean="0"/>
+                  <a:t>: </a:t>
+                </a:r>
+                <a:r>
+                  <a:rPr lang="en-US" sz="1400" dirty="0" smtClean="0"/>
+                  <a:t>2.2e-4,</a:t>
+                </a:r>
+                <a:r>
+                  <a:rPr lang="en-US" sz="1400" b="1" dirty="0" smtClean="0"/>
+                  <a:t> </a:t>
+                </a:r>
+                <a:r>
+                  <a:rPr lang="en-US" sz="1400" b="1" dirty="0"/>
+                  <a:t>Max </a:t>
+                </a:r>
+                <a14:m>
+                  <m:oMath xmlns:m="http://schemas.openxmlformats.org/officeDocument/2006/math">
+                    <m:f>
+                      <m:fPr>
+                        <m:ctrlPr>
+                          <a:rPr lang="en-US" sz="1400" i="1">
+                            <a:latin typeface="Cambria Math" panose="02040503050406030204" pitchFamily="18" charset="0"/>
+                            <a:ea typeface="Cambria Math" panose="02040503050406030204" pitchFamily="18" charset="0"/>
+                          </a:rPr>
+                        </m:ctrlPr>
+                      </m:fPr>
+                      <m:num>
+                        <m:r>
+                          <a:rPr lang="en-US" sz="1400" i="1">
+                            <a:latin typeface="Cambria Math" panose="02040503050406030204" pitchFamily="18" charset="0"/>
+                            <a:ea typeface="Cambria Math" panose="02040503050406030204" pitchFamily="18" charset="0"/>
+                          </a:rPr>
+                          <m:t>∆</m:t>
+                        </m:r>
+                        <m:r>
+                          <a:rPr lang="en-US" sz="1400" i="1">
+                            <a:latin typeface="Cambria Math" panose="02040503050406030204" pitchFamily="18" charset="0"/>
+                            <a:ea typeface="Cambria Math" panose="02040503050406030204" pitchFamily="18" charset="0"/>
+                          </a:rPr>
+                          <m:t>𝑝</m:t>
+                        </m:r>
+                      </m:num>
+                      <m:den>
+                        <m:r>
+                          <a:rPr lang="en-US" sz="1400" i="1">
+                            <a:latin typeface="Cambria Math" panose="02040503050406030204" pitchFamily="18" charset="0"/>
+                            <a:ea typeface="Cambria Math" panose="02040503050406030204" pitchFamily="18" charset="0"/>
+                          </a:rPr>
+                          <m:t>𝑠</m:t>
+                        </m:r>
+                      </m:den>
+                    </m:f>
+                  </m:oMath>
+                </a14:m>
+                <a:r>
+                  <a:rPr lang="en-US" sz="1400" b="1" dirty="0"/>
+                  <a:t> </a:t>
+                </a:r>
+                <a:r>
+                  <a:rPr lang="en-US" sz="1400" b="1" dirty="0" smtClean="0"/>
+                  <a:t>: </a:t>
+                </a:r>
+                <a:r>
+                  <a:rPr lang="en-US" sz="1400" dirty="0" smtClean="0"/>
+                  <a:t>0.0247</a:t>
+                </a:r>
+                <a:r>
+                  <a:rPr lang="en-US" sz="1400" b="1" dirty="0" smtClean="0"/>
+                  <a:t> </a:t>
+                </a:r>
+                <a:endParaRPr lang="en-US" sz="1400" dirty="0"/>
+              </a:p>
+              <a:p>
+                <a:pPr algn="ctr"/>
+                <a:endParaRPr lang="en-US" sz="1400" b="1" dirty="0"/>
+              </a:p>
+            </p:txBody>
+          </p:sp>
+        </mc:Choice>
+        <mc:Fallback xmlns="">
+          <p:sp>
+            <p:nvSpPr>
+              <p:cNvPr id="5" name="TextBox 4"/>
+              <p:cNvSpPr txBox="1">
+                <a:spLocks noRot="1" noChangeAspect="1" noMove="1" noResize="1" noEditPoints="1" noAdjustHandles="1" noChangeArrowheads="1" noChangeShapeType="1" noTextEdit="1"/>
+              </p:cNvSpPr>
+              <p:nvPr/>
+            </p:nvSpPr>
+            <p:spPr>
+              <a:xfrm>
+                <a:off x="3201103" y="4563938"/>
+                <a:ext cx="5779477" cy="1145826"/>
+              </a:xfrm>
+              <a:prstGeom prst="rect">
+                <a:avLst/>
+              </a:prstGeom>
+              <a:blipFill>
+                <a:blip r:embed="rId2"/>
+                <a:stretch>
+                  <a:fillRect/>
+                </a:stretch>
+              </a:blipFill>
+            </p:spPr>
+            <p:txBody>
+              <a:bodyPr/>
+              <a:lstStyle/>
+              <a:p>
+                <a:r>
+                  <a:rPr lang="en-US">
+                    <a:noFill/>
+                  </a:rPr>
+                  <a:t> </a:t>
+                </a:r>
+              </a:p>
+            </p:txBody>
+          </p:sp>
+        </mc:Fallback>
+      </mc:AlternateContent>
+      <p:pic>
+        <p:nvPicPr>
+          <p:cNvPr id="6" name="Picture 5"/>
+          <p:cNvPicPr>
+            <a:picLocks noChangeAspect="1"/>
+          </p:cNvPicPr>
+          <p:nvPr/>
+        </p:nvPicPr>
+        <p:blipFill>
+          <a:blip r:embed="rId3"/>
+          <a:stretch>
+            <a:fillRect/>
+          </a:stretch>
+        </p:blipFill>
+        <p:spPr>
+          <a:xfrm>
+            <a:off x="2245673" y="1859429"/>
+            <a:ext cx="7690338" cy="2290563"/>
+          </a:xfrm>
+          <a:prstGeom prst="rect">
+            <a:avLst/>
+          </a:prstGeom>
+        </p:spPr>
+      </p:pic>
+      <mc:AlternateContent xmlns:mc="http://schemas.openxmlformats.org/markup-compatibility/2006" xmlns:a14="http://schemas.microsoft.com/office/drawing/2010/main">
+        <mc:Choice Requires="a14">
+          <p:sp>
+            <p:nvSpPr>
+              <p:cNvPr id="7" name="TextBox 6"/>
+              <p:cNvSpPr txBox="1"/>
+              <p:nvPr/>
+            </p:nvSpPr>
+            <p:spPr>
+              <a:xfrm>
+                <a:off x="9433289" y="4575049"/>
+                <a:ext cx="2115312" cy="1265411"/>
+              </a:xfrm>
+              <a:prstGeom prst="rect">
+                <a:avLst/>
+              </a:prstGeom>
+              <a:noFill/>
+              <a:ln>
+                <a:solidFill>
+                  <a:schemeClr val="tx1"/>
+                </a:solidFill>
+              </a:ln>
+            </p:spPr>
+            <p:txBody>
+              <a:bodyPr wrap="square" rtlCol="0">
+                <a:spAutoFit/>
+              </a:bodyPr>
+              <a:lstStyle/>
+              <a:p>
+                <a:pPr algn="ctr"/>
+                <a:r>
+                  <a:rPr lang="en-US" sz="1400" dirty="0" smtClean="0"/>
+                  <a:t>The normalized power and </a:t>
+                </a:r>
+                <a14:m>
+                  <m:oMath xmlns:m="http://schemas.openxmlformats.org/officeDocument/2006/math">
+                    <m:f>
+                      <m:fPr>
+                        <m:ctrlPr>
+                          <a:rPr lang="en-US" sz="1400" i="1">
+                            <a:latin typeface="Cambria Math" panose="02040503050406030204" pitchFamily="18" charset="0"/>
+                            <a:ea typeface="Cambria Math" panose="02040503050406030204" pitchFamily="18" charset="0"/>
+                          </a:rPr>
+                        </m:ctrlPr>
+                      </m:fPr>
+                      <m:num>
+                        <m:r>
+                          <a:rPr lang="en-US" sz="1400" i="1">
+                            <a:latin typeface="Cambria Math" panose="02040503050406030204" pitchFamily="18" charset="0"/>
+                            <a:ea typeface="Cambria Math" panose="02040503050406030204" pitchFamily="18" charset="0"/>
+                          </a:rPr>
+                          <m:t>∆</m:t>
+                        </m:r>
+                        <m:r>
+                          <a:rPr lang="en-US" sz="1400" i="1">
+                            <a:latin typeface="Cambria Math" panose="02040503050406030204" pitchFamily="18" charset="0"/>
+                            <a:ea typeface="Cambria Math" panose="02040503050406030204" pitchFamily="18" charset="0"/>
+                          </a:rPr>
+                          <m:t>𝑝</m:t>
+                        </m:r>
+                      </m:num>
+                      <m:den>
+                        <m:r>
+                          <a:rPr lang="en-US" sz="1400" i="1">
+                            <a:latin typeface="Cambria Math" panose="02040503050406030204" pitchFamily="18" charset="0"/>
+                            <a:ea typeface="Cambria Math" panose="02040503050406030204" pitchFamily="18" charset="0"/>
+                          </a:rPr>
+                          <m:t>𝑠</m:t>
+                        </m:r>
+                      </m:den>
+                    </m:f>
+                  </m:oMath>
+                </a14:m>
+                <a:r>
+                  <a:rPr lang="en-US" sz="1400" dirty="0" smtClean="0"/>
+                  <a:t> is constant for both the 16 and 32 length Ramsey experiments.</a:t>
+                </a:r>
+                <a:endParaRPr lang="en-US" sz="1400" dirty="0"/>
+              </a:p>
+            </p:txBody>
+          </p:sp>
+        </mc:Choice>
+        <mc:Fallback xmlns="">
+          <p:sp>
+            <p:nvSpPr>
+              <p:cNvPr id="7" name="TextBox 6"/>
+              <p:cNvSpPr txBox="1">
+                <a:spLocks noRot="1" noChangeAspect="1" noMove="1" noResize="1" noEditPoints="1" noAdjustHandles="1" noChangeArrowheads="1" noChangeShapeType="1" noTextEdit="1"/>
+              </p:cNvSpPr>
+              <p:nvPr/>
+            </p:nvSpPr>
+            <p:spPr>
+              <a:xfrm>
+                <a:off x="9433289" y="4575049"/>
+                <a:ext cx="2115312" cy="1265411"/>
+              </a:xfrm>
+              <a:prstGeom prst="rect">
+                <a:avLst/>
+              </a:prstGeom>
+              <a:blipFill>
+                <a:blip r:embed="rId4"/>
+                <a:stretch>
+                  <a:fillRect t="-478" b="-3828"/>
+                </a:stretch>
+              </a:blipFill>
+              <a:ln>
+                <a:solidFill>
+                  <a:schemeClr val="tx1"/>
+                </a:solidFill>
+              </a:ln>
+            </p:spPr>
+            <p:txBody>
+              <a:bodyPr/>
+              <a:lstStyle/>
+              <a:p>
+                <a:r>
+                  <a:rPr lang="en-US">
+                    <a:noFill/>
+                  </a:rPr>
+                  <a:t> </a:t>
+                </a:r>
+              </a:p>
+            </p:txBody>
+          </p:sp>
+        </mc:Fallback>
+      </mc:AlternateContent>
+    </p:spTree>
+    <p:extLst>
+      <p:ext uri="{BB962C8B-B14F-4D97-AF65-F5344CB8AC3E}">
+        <p14:creationId xmlns:p14="http://schemas.microsoft.com/office/powerpoint/2010/main" val="3443568076"/>
+      </p:ext>
+    </p:extLst>
+  </p:cSld>
+  <p:clrMapOvr>
+    <a:masterClrMapping/>
+  </p:clrMapOvr>
+</p:sld>
+</file>
+
+<file path=ppt/slides/slide11.xml><?xml version="1.0" encoding="utf-8"?>
+<p:sld xmlns:a="http://schemas.openxmlformats.org/drawingml/2006/main" xmlns:r="http://schemas.openxmlformats.org/officeDocument/2006/relationships" xmlns:p="http://schemas.openxmlformats.org/presentationml/2006/main">
+  <p:cSld>
+    <p:spTree>
+      <p:nvGrpSpPr>
+        <p:cNvPr id="1" name=""/>
+        <p:cNvGrpSpPr/>
+        <p:nvPr/>
+      </p:nvGrpSpPr>
+      <p:grpSpPr>
+        <a:xfrm>
+          <a:off x="0" y="0"/>
+          <a:ext cx="0" cy="0"/>
+          <a:chOff x="0" y="0"/>
+          <a:chExt cx="0" cy="0"/>
+        </a:xfrm>
+      </p:grpSpPr>
+      <p:sp>
+        <p:nvSpPr>
+          <p:cNvPr id="2" name="Content Placeholder 1"/>
+          <p:cNvSpPr>
+            <a:spLocks noGrp="1"/>
+          </p:cNvSpPr>
+          <p:nvPr>
+            <p:ph sz="quarter" idx="10"/>
+          </p:nvPr>
+        </p:nvSpPr>
+        <p:spPr/>
+        <p:txBody>
+          <a:bodyPr/>
+          <a:lstStyle/>
+          <a:p>
+            <a:r>
+              <a:rPr lang="en-US" dirty="0" smtClean="0"/>
+              <a:t>79 Gx49: </a:t>
+            </a:r>
+            <a:r>
+              <a:rPr lang="en-US" b="0" dirty="0"/>
+              <a:t>08_21_1614_28</a:t>
+            </a:r>
+            <a:endParaRPr lang="en-US" dirty="0"/>
+          </a:p>
+        </p:txBody>
+      </p:sp>
+      <p:sp>
+        <p:nvSpPr>
+          <p:cNvPr id="3" name="Title 2"/>
+          <p:cNvSpPr>
+            <a:spLocks noGrp="1"/>
+          </p:cNvSpPr>
+          <p:nvPr>
+            <p:ph type="title"/>
+          </p:nvPr>
+        </p:nvSpPr>
+        <p:spPr/>
+        <p:txBody>
+          <a:bodyPr/>
+          <a:lstStyle/>
+          <a:p>
+            <a:r>
+              <a:rPr lang="en-US" dirty="0" smtClean="0"/>
+              <a:t>Older experimental data</a:t>
+            </a:r>
+            <a:endParaRPr lang="en-US" dirty="0"/>
+          </a:p>
+        </p:txBody>
+      </p:sp>
+      <p:pic>
+        <p:nvPicPr>
+          <p:cNvPr id="4" name="Picture 3"/>
+          <p:cNvPicPr>
+            <a:picLocks noChangeAspect="1"/>
+          </p:cNvPicPr>
+          <p:nvPr/>
+        </p:nvPicPr>
+        <p:blipFill>
+          <a:blip r:embed="rId2"/>
+          <a:stretch>
+            <a:fillRect/>
+          </a:stretch>
+        </p:blipFill>
+        <p:spPr>
+          <a:xfrm>
+            <a:off x="1791969" y="1839468"/>
+            <a:ext cx="8848725" cy="2667000"/>
+          </a:xfrm>
+          <a:prstGeom prst="rect">
+            <a:avLst/>
+          </a:prstGeom>
+        </p:spPr>
+      </p:pic>
+      <mc:AlternateContent xmlns:mc="http://schemas.openxmlformats.org/markup-compatibility/2006" xmlns:a14="http://schemas.microsoft.com/office/drawing/2010/main">
+        <mc:Choice Requires="a14">
+          <p:sp>
+            <p:nvSpPr>
+              <p:cNvPr id="5" name="TextBox 4"/>
+              <p:cNvSpPr txBox="1"/>
+              <p:nvPr/>
+            </p:nvSpPr>
+            <p:spPr>
+              <a:xfrm>
+                <a:off x="3201104" y="4977884"/>
+                <a:ext cx="5779477" cy="403637"/>
+              </a:xfrm>
+              <a:prstGeom prst="rect">
+                <a:avLst/>
+              </a:prstGeom>
+              <a:noFill/>
+            </p:spPr>
+            <p:txBody>
+              <a:bodyPr wrap="square" rtlCol="0">
+                <a:spAutoFit/>
+              </a:bodyPr>
+              <a:lstStyle/>
+              <a:p>
+                <a:pPr algn="ctr"/>
+                <a:r>
+                  <a:rPr lang="en-US" sz="1400" b="1" dirty="0" smtClean="0"/>
+                  <a:t>Frequency: </a:t>
+                </a:r>
+                <a:r>
+                  <a:rPr lang="en-US" sz="1400" dirty="0" smtClean="0"/>
+                  <a:t>1.210 Hz</a:t>
+                </a:r>
+                <a:r>
+                  <a:rPr lang="en-US" sz="1400" b="1" dirty="0" smtClean="0"/>
+                  <a:t>, </a:t>
+                </a:r>
+                <a:r>
+                  <a:rPr lang="en-US" sz="1400" b="1" dirty="0"/>
+                  <a:t>Norm. Power</a:t>
+                </a:r>
+                <a:r>
+                  <a:rPr lang="en-US" sz="1400" b="1" dirty="0" smtClean="0"/>
+                  <a:t>: </a:t>
+                </a:r>
+                <a:r>
+                  <a:rPr lang="en-US" sz="1400" dirty="0" smtClean="0"/>
+                  <a:t>2e-4,</a:t>
+                </a:r>
+                <a:r>
+                  <a:rPr lang="en-US" sz="1400" b="1" dirty="0" smtClean="0"/>
+                  <a:t> </a:t>
+                </a:r>
+                <a:r>
+                  <a:rPr lang="en-US" sz="1400" b="1" dirty="0"/>
+                  <a:t>Max </a:t>
+                </a:r>
+                <a14:m>
+                  <m:oMath xmlns:m="http://schemas.openxmlformats.org/officeDocument/2006/math">
+                    <m:f>
+                      <m:fPr>
+                        <m:ctrlPr>
+                          <a:rPr lang="en-US" sz="1400" i="1">
+                            <a:latin typeface="Cambria Math" panose="02040503050406030204" pitchFamily="18" charset="0"/>
+                            <a:ea typeface="Cambria Math" panose="02040503050406030204" pitchFamily="18" charset="0"/>
+                          </a:rPr>
+                        </m:ctrlPr>
+                      </m:fPr>
+                      <m:num>
+                        <m:r>
+                          <a:rPr lang="en-US" sz="1400" i="1">
+                            <a:latin typeface="Cambria Math" panose="02040503050406030204" pitchFamily="18" charset="0"/>
+                            <a:ea typeface="Cambria Math" panose="02040503050406030204" pitchFamily="18" charset="0"/>
+                          </a:rPr>
+                          <m:t>∆</m:t>
+                        </m:r>
+                        <m:r>
+                          <a:rPr lang="en-US" sz="1400" i="1">
+                            <a:latin typeface="Cambria Math" panose="02040503050406030204" pitchFamily="18" charset="0"/>
+                            <a:ea typeface="Cambria Math" panose="02040503050406030204" pitchFamily="18" charset="0"/>
+                          </a:rPr>
+                          <m:t>𝑝</m:t>
+                        </m:r>
+                      </m:num>
+                      <m:den>
+                        <m:r>
+                          <a:rPr lang="en-US" sz="1400" i="1">
+                            <a:latin typeface="Cambria Math" panose="02040503050406030204" pitchFamily="18" charset="0"/>
+                            <a:ea typeface="Cambria Math" panose="02040503050406030204" pitchFamily="18" charset="0"/>
+                          </a:rPr>
+                          <m:t>𝑠</m:t>
+                        </m:r>
+                      </m:den>
+                    </m:f>
+                  </m:oMath>
+                </a14:m>
+                <a:r>
+                  <a:rPr lang="en-US" sz="1400" b="1" dirty="0"/>
+                  <a:t> </a:t>
+                </a:r>
+                <a:r>
+                  <a:rPr lang="en-US" sz="1400" b="1" dirty="0" smtClean="0"/>
+                  <a:t>: </a:t>
+                </a:r>
+                <a:r>
+                  <a:rPr lang="en-US" sz="1400" dirty="0" smtClean="0"/>
+                  <a:t>0.0247</a:t>
+                </a:r>
+                <a:endParaRPr lang="en-US" sz="1400" dirty="0"/>
+              </a:p>
+            </p:txBody>
+          </p:sp>
+        </mc:Choice>
+        <mc:Fallback xmlns="">
+          <p:sp>
+            <p:nvSpPr>
+              <p:cNvPr id="5" name="TextBox 4"/>
+              <p:cNvSpPr txBox="1">
+                <a:spLocks noRot="1" noChangeAspect="1" noMove="1" noResize="1" noEditPoints="1" noAdjustHandles="1" noChangeArrowheads="1" noChangeShapeType="1" noTextEdit="1"/>
+              </p:cNvSpPr>
+              <p:nvPr/>
+            </p:nvSpPr>
+            <p:spPr>
+              <a:xfrm>
+                <a:off x="3201104" y="4977884"/>
+                <a:ext cx="5779477" cy="403637"/>
+              </a:xfrm>
+              <a:prstGeom prst="rect">
+                <a:avLst/>
+              </a:prstGeom>
+              <a:blipFill>
+                <a:blip r:embed="rId3"/>
+                <a:stretch>
+                  <a:fillRect b="-3030"/>
+                </a:stretch>
+              </a:blipFill>
+            </p:spPr>
+            <p:txBody>
+              <a:bodyPr/>
+              <a:lstStyle/>
+              <a:p>
+                <a:r>
+                  <a:rPr lang="en-US">
+                    <a:noFill/>
+                  </a:rPr>
+                  <a:t> </a:t>
+                </a:r>
+              </a:p>
+            </p:txBody>
+          </p:sp>
+        </mc:Fallback>
+      </mc:AlternateContent>
+    </p:spTree>
+    <p:extLst>
+      <p:ext uri="{BB962C8B-B14F-4D97-AF65-F5344CB8AC3E}">
+        <p14:creationId xmlns:p14="http://schemas.microsoft.com/office/powerpoint/2010/main" val="3844398012"/>
+      </p:ext>
+    </p:extLst>
+  </p:cSld>
+  <p:clrMapOvr>
+    <a:masterClrMapping/>
+  </p:clrMapOvr>
+</p:sld>
+</file>
+
+<file path=ppt/slides/slide12.xml><?xml version="1.0" encoding="utf-8"?>
+<p:sld xmlns:a="http://schemas.openxmlformats.org/drawingml/2006/main" xmlns:r="http://schemas.openxmlformats.org/officeDocument/2006/relationships" xmlns:p="http://schemas.openxmlformats.org/presentationml/2006/main">
+  <p:cSld>
+    <p:spTree>
+      <p:nvGrpSpPr>
+        <p:cNvPr id="1" name=""/>
+        <p:cNvGrpSpPr/>
+        <p:nvPr/>
+      </p:nvGrpSpPr>
+      <p:grpSpPr>
+        <a:xfrm>
+          <a:off x="0" y="0"/>
+          <a:ext cx="0" cy="0"/>
+          <a:chOff x="0" y="0"/>
+          <a:chExt cx="0" cy="0"/>
+        </a:xfrm>
+      </p:grpSpPr>
+      <p:sp>
+        <p:nvSpPr>
+          <p:cNvPr id="2" name="Content Placeholder 1"/>
+          <p:cNvSpPr>
+            <a:spLocks noGrp="1"/>
+          </p:cNvSpPr>
+          <p:nvPr>
+            <p:ph sz="quarter" idx="10"/>
+          </p:nvPr>
+        </p:nvSpPr>
+        <p:spPr/>
+        <p:txBody>
+          <a:bodyPr/>
+          <a:lstStyle/>
+          <a:p>
+            <a:r>
+              <a:rPr lang="en-US" dirty="0" smtClean="0"/>
+              <a:t>232 Gx49: 2018_08_22_1214_32</a:t>
+            </a:r>
+            <a:endParaRPr lang="en-US" dirty="0"/>
+          </a:p>
+        </p:txBody>
+      </p:sp>
+      <p:sp>
+        <p:nvSpPr>
+          <p:cNvPr id="3" name="Title 2"/>
+          <p:cNvSpPr>
+            <a:spLocks noGrp="1"/>
+          </p:cNvSpPr>
+          <p:nvPr>
+            <p:ph type="title"/>
+          </p:nvPr>
+        </p:nvSpPr>
+        <p:spPr/>
+        <p:txBody>
+          <a:bodyPr/>
+          <a:lstStyle/>
+          <a:p>
+            <a:r>
+              <a:rPr lang="en-US" dirty="0" smtClean="0"/>
+              <a:t>Other older experimental data</a:t>
+            </a:r>
+            <a:endParaRPr lang="en-US" dirty="0"/>
+          </a:p>
+        </p:txBody>
+      </p:sp>
+      <p:pic>
+        <p:nvPicPr>
+          <p:cNvPr id="4" name="Picture 3"/>
+          <p:cNvPicPr>
+            <a:picLocks noChangeAspect="1"/>
+          </p:cNvPicPr>
+          <p:nvPr/>
+        </p:nvPicPr>
+        <p:blipFill>
+          <a:blip r:embed="rId2"/>
+          <a:stretch>
+            <a:fillRect/>
+          </a:stretch>
+        </p:blipFill>
+        <p:spPr>
+          <a:xfrm>
+            <a:off x="1661718" y="1953387"/>
+            <a:ext cx="8858250" cy="2609850"/>
+          </a:xfrm>
+          <a:prstGeom prst="rect">
+            <a:avLst/>
+          </a:prstGeom>
+        </p:spPr>
+      </p:pic>
+      <mc:AlternateContent xmlns:mc="http://schemas.openxmlformats.org/markup-compatibility/2006" xmlns:a14="http://schemas.microsoft.com/office/drawing/2010/main">
+        <mc:Choice Requires="a14">
+          <p:sp>
+            <p:nvSpPr>
+              <p:cNvPr id="5" name="TextBox 4"/>
+              <p:cNvSpPr txBox="1"/>
+              <p:nvPr/>
+            </p:nvSpPr>
+            <p:spPr>
+              <a:xfrm>
+                <a:off x="3152336" y="4977884"/>
+                <a:ext cx="5779477" cy="403637"/>
+              </a:xfrm>
+              <a:prstGeom prst="rect">
+                <a:avLst/>
+              </a:prstGeom>
+              <a:noFill/>
+            </p:spPr>
+            <p:txBody>
+              <a:bodyPr wrap="square" rtlCol="0">
+                <a:spAutoFit/>
+              </a:bodyPr>
+              <a:lstStyle/>
+              <a:p>
+                <a:pPr algn="ctr"/>
+                <a:r>
+                  <a:rPr lang="en-US" sz="1400" b="1" dirty="0" smtClean="0"/>
+                  <a:t>Frequency: </a:t>
+                </a:r>
+                <a:r>
+                  <a:rPr lang="en-US" sz="1400" dirty="0" smtClean="0"/>
+                  <a:t>1.209</a:t>
+                </a:r>
+                <a:r>
+                  <a:rPr lang="en-US" sz="1400" b="1" dirty="0" smtClean="0"/>
+                  <a:t>, </a:t>
+                </a:r>
+                <a:r>
+                  <a:rPr lang="en-US" sz="1400" b="1" dirty="0"/>
+                  <a:t>Norm. Power</a:t>
+                </a:r>
+                <a:r>
+                  <a:rPr lang="en-US" sz="1400" b="1" dirty="0" smtClean="0"/>
+                  <a:t>: </a:t>
+                </a:r>
+                <a:r>
+                  <a:rPr lang="en-US" sz="1400" dirty="0" smtClean="0"/>
+                  <a:t>4e-5,</a:t>
+                </a:r>
+                <a:r>
+                  <a:rPr lang="en-US" sz="1400" b="1" dirty="0" smtClean="0"/>
+                  <a:t> </a:t>
+                </a:r>
+                <a:r>
+                  <a:rPr lang="en-US" sz="1400" b="1" dirty="0"/>
+                  <a:t>Max </a:t>
+                </a:r>
+                <a14:m>
+                  <m:oMath xmlns:m="http://schemas.openxmlformats.org/officeDocument/2006/math">
+                    <m:f>
+                      <m:fPr>
+                        <m:ctrlPr>
+                          <a:rPr lang="en-US" sz="1400" i="1">
+                            <a:latin typeface="Cambria Math" panose="02040503050406030204" pitchFamily="18" charset="0"/>
+                            <a:ea typeface="Cambria Math" panose="02040503050406030204" pitchFamily="18" charset="0"/>
+                          </a:rPr>
+                        </m:ctrlPr>
+                      </m:fPr>
+                      <m:num>
+                        <m:r>
+                          <a:rPr lang="en-US" sz="1400" i="1">
+                            <a:latin typeface="Cambria Math" panose="02040503050406030204" pitchFamily="18" charset="0"/>
+                            <a:ea typeface="Cambria Math" panose="02040503050406030204" pitchFamily="18" charset="0"/>
+                          </a:rPr>
+                          <m:t>∆</m:t>
+                        </m:r>
+                        <m:r>
+                          <a:rPr lang="en-US" sz="1400" i="1">
+                            <a:latin typeface="Cambria Math" panose="02040503050406030204" pitchFamily="18" charset="0"/>
+                            <a:ea typeface="Cambria Math" panose="02040503050406030204" pitchFamily="18" charset="0"/>
+                          </a:rPr>
+                          <m:t>𝑝</m:t>
+                        </m:r>
+                      </m:num>
+                      <m:den>
+                        <m:r>
+                          <a:rPr lang="en-US" sz="1400" i="1">
+                            <a:latin typeface="Cambria Math" panose="02040503050406030204" pitchFamily="18" charset="0"/>
+                            <a:ea typeface="Cambria Math" panose="02040503050406030204" pitchFamily="18" charset="0"/>
+                          </a:rPr>
+                          <m:t>𝑠</m:t>
+                        </m:r>
+                      </m:den>
+                    </m:f>
+                  </m:oMath>
+                </a14:m>
+                <a:r>
+                  <a:rPr lang="en-US" sz="1400" b="1" dirty="0"/>
+                  <a:t> </a:t>
+                </a:r>
+                <a:r>
+                  <a:rPr lang="en-US" sz="1400" b="1" dirty="0" smtClean="0"/>
+                  <a:t>: </a:t>
+                </a:r>
+                <a:r>
+                  <a:rPr lang="en-US" sz="1400" dirty="0" smtClean="0"/>
+                  <a:t>0.0233</a:t>
+                </a:r>
+                <a:endParaRPr lang="en-US" sz="1400" dirty="0"/>
+              </a:p>
+            </p:txBody>
+          </p:sp>
+        </mc:Choice>
+        <mc:Fallback xmlns="">
+          <p:sp>
+            <p:nvSpPr>
+              <p:cNvPr id="5" name="TextBox 4"/>
+              <p:cNvSpPr txBox="1">
+                <a:spLocks noRot="1" noChangeAspect="1" noMove="1" noResize="1" noEditPoints="1" noAdjustHandles="1" noChangeArrowheads="1" noChangeShapeType="1" noTextEdit="1"/>
+              </p:cNvSpPr>
+              <p:nvPr/>
+            </p:nvSpPr>
+            <p:spPr>
+              <a:xfrm>
+                <a:off x="3152336" y="4977884"/>
+                <a:ext cx="5779477" cy="403637"/>
+              </a:xfrm>
+              <a:prstGeom prst="rect">
+                <a:avLst/>
+              </a:prstGeom>
+              <a:blipFill>
+                <a:blip r:embed="rId3"/>
+                <a:stretch>
+                  <a:fillRect b="-3030"/>
+                </a:stretch>
+              </a:blipFill>
+            </p:spPr>
+            <p:txBody>
+              <a:bodyPr/>
+              <a:lstStyle/>
+              <a:p>
+                <a:r>
+                  <a:rPr lang="en-US">
+                    <a:noFill/>
+                  </a:rPr>
+                  <a:t> </a:t>
+                </a:r>
+              </a:p>
+            </p:txBody>
+          </p:sp>
+        </mc:Fallback>
+      </mc:AlternateContent>
+    </p:spTree>
+    <p:extLst>
+      <p:ext uri="{BB962C8B-B14F-4D97-AF65-F5344CB8AC3E}">
+        <p14:creationId xmlns:p14="http://schemas.microsoft.com/office/powerpoint/2010/main" val="994826649"/>
+      </p:ext>
+    </p:extLst>
+  </p:cSld>
+  <p:clrMapOvr>
+    <a:masterClrMapping/>
+  </p:clrMapOvr>
+</p:sld>
+</file>
+
 <file path=ppt/slides/slide2.xml><?xml version="1.0" encoding="utf-8"?>
 <p:sld xmlns:a="http://schemas.openxmlformats.org/drawingml/2006/main" xmlns:r="http://schemas.openxmlformats.org/officeDocument/2006/relationships" xmlns:p="http://schemas.openxmlformats.org/presentationml/2006/main">
   <p:cSld>
@@ -3247,8 +4239,8 @@
           </a:p>
         </p:txBody>
       </p:sp>
-      <mc:AlternateContent xmlns:mc="http://schemas.openxmlformats.org/markup-compatibility/2006">
-        <mc:Choice xmlns:a14="http://schemas.microsoft.com/office/drawing/2010/main" Requires="a14">
+      <mc:AlternateContent xmlns:mc="http://schemas.openxmlformats.org/markup-compatibility/2006" xmlns:a14="http://schemas.microsoft.com/office/drawing/2010/main">
+        <mc:Choice Requires="a14">
           <p:sp>
             <p:nvSpPr>
               <p:cNvPr id="4" name="TextBox 3"/>
@@ -3477,14 +4469,7 @@
                         <a:latin typeface="Cambria Math" panose="02040503050406030204" pitchFamily="18" charset="0"/>
                         <a:ea typeface="Cambria Math" panose="02040503050406030204" pitchFamily="18" charset="0"/>
                       </a:rPr>
-                      <m:t>.00</m:t>
-                    </m:r>
-                    <m:r>
-                      <a:rPr lang="en-US">
-                        <a:latin typeface="Cambria Math" panose="02040503050406030204" pitchFamily="18" charset="0"/>
-                        <a:ea typeface="Cambria Math" panose="02040503050406030204" pitchFamily="18" charset="0"/>
-                      </a:rPr>
-                      <m:t>8</m:t>
+                      <m:t>.008</m:t>
                     </m:r>
                     <m:func>
                       <m:funcPr>
@@ -3557,7 +4542,7 @@
             </p:txBody>
           </p:sp>
         </mc:Choice>
-        <mc:Fallback>
+        <mc:Fallback xmlns="">
           <p:sp>
             <p:nvSpPr>
               <p:cNvPr id="4" name="TextBox 3"/>
@@ -3668,8 +4653,8 @@
           </a:prstGeom>
         </p:spPr>
       </p:pic>
-      <mc:AlternateContent xmlns:mc="http://schemas.openxmlformats.org/markup-compatibility/2006">
-        <mc:Choice xmlns:a14="http://schemas.microsoft.com/office/drawing/2010/main" Requires="a14">
+      <mc:AlternateContent xmlns:mc="http://schemas.openxmlformats.org/markup-compatibility/2006" xmlns:a14="http://schemas.microsoft.com/office/drawing/2010/main">
+        <mc:Choice Requires="a14">
           <p:sp>
             <p:nvSpPr>
               <p:cNvPr id="2" name="Rectangle 1"/>
@@ -3691,6 +4676,7 @@
               </a:bodyPr>
               <a:lstStyle/>
               <a:p>
+                <a:pPr/>
                 <a14:m>
                   <m:oMathPara xmlns:m="http://schemas.openxmlformats.org/officeDocument/2006/math">
                     <m:oMathParaPr>
@@ -3734,7 +4720,7 @@
             </p:txBody>
           </p:sp>
         </mc:Choice>
-        <mc:Fallback>
+        <mc:Fallback xmlns="">
           <p:sp>
             <p:nvSpPr>
               <p:cNvPr id="2" name="Rectangle 1"/>
@@ -3810,8 +4796,8 @@
           </a:p>
         </p:txBody>
       </p:sp>
-      <mc:AlternateContent xmlns:mc="http://schemas.openxmlformats.org/markup-compatibility/2006">
-        <mc:Choice xmlns:a14="http://schemas.microsoft.com/office/drawing/2010/main" Requires="a14">
+      <mc:AlternateContent xmlns:mc="http://schemas.openxmlformats.org/markup-compatibility/2006" xmlns:a14="http://schemas.microsoft.com/office/drawing/2010/main">
+        <mc:Choice Requires="a14">
           <p:sp>
             <p:nvSpPr>
               <p:cNvPr id="11" name="Rectangle 10"/>
@@ -3880,7 +4866,7 @@
             </p:txBody>
           </p:sp>
         </mc:Choice>
-        <mc:Fallback>
+        <mc:Fallback xmlns="">
           <p:sp>
             <p:nvSpPr>
               <p:cNvPr id="11" name="Rectangle 10"/>
@@ -4035,8 +5021,8 @@
           </a:p>
         </p:txBody>
       </p:sp>
-      <mc:AlternateContent xmlns:mc="http://schemas.openxmlformats.org/markup-compatibility/2006">
-        <mc:Choice xmlns:a14="http://schemas.microsoft.com/office/drawing/2010/main" Requires="a14">
+      <mc:AlternateContent xmlns:mc="http://schemas.openxmlformats.org/markup-compatibility/2006" xmlns:a14="http://schemas.microsoft.com/office/drawing/2010/main">
+        <mc:Choice Requires="a14">
           <p:sp>
             <p:nvSpPr>
               <p:cNvPr id="5" name="Rectangle 4"/>
@@ -4308,7 +5294,7 @@
             </p:txBody>
           </p:sp>
         </mc:Choice>
-        <mc:Fallback>
+        <mc:Fallback xmlns="">
           <p:sp>
             <p:nvSpPr>
               <p:cNvPr id="5" name="Rectangle 4"/>
@@ -4489,8 +5475,8 @@
           </a:prstGeom>
         </p:spPr>
       </p:pic>
-      <mc:AlternateContent xmlns:mc="http://schemas.openxmlformats.org/markup-compatibility/2006">
-        <mc:Choice xmlns:a14="http://schemas.microsoft.com/office/drawing/2010/main" Requires="a14">
+      <mc:AlternateContent xmlns:mc="http://schemas.openxmlformats.org/markup-compatibility/2006" xmlns:a14="http://schemas.microsoft.com/office/drawing/2010/main">
+        <mc:Choice Requires="a14">
           <p:sp>
             <p:nvSpPr>
               <p:cNvPr id="6" name="TextBox 5"/>
@@ -4573,7 +5559,7 @@
             </p:txBody>
           </p:sp>
         </mc:Choice>
-        <mc:Fallback>
+        <mc:Fallback xmlns="">
           <p:sp>
             <p:nvSpPr>
               <p:cNvPr id="6" name="TextBox 5"/>
@@ -4686,8 +5672,8 @@
           </a:fontRef>
         </p:style>
       </p:cxnSp>
-      <mc:AlternateContent xmlns:mc="http://schemas.openxmlformats.org/markup-compatibility/2006">
-        <mc:Choice xmlns:a14="http://schemas.microsoft.com/office/drawing/2010/main" Requires="a14">
+      <mc:AlternateContent xmlns:mc="http://schemas.openxmlformats.org/markup-compatibility/2006" xmlns:a14="http://schemas.microsoft.com/office/drawing/2010/main">
+        <mc:Choice Requires="a14">
           <p:sp>
             <p:nvSpPr>
               <p:cNvPr id="12" name="TextBox 11"/>
@@ -4754,7 +5740,7 @@
             </p:txBody>
           </p:sp>
         </mc:Choice>
-        <mc:Fallback>
+        <mc:Fallback xmlns="">
           <p:sp>
             <p:nvSpPr>
               <p:cNvPr id="12" name="TextBox 11"/>
@@ -4976,11 +5962,7 @@
             <a:pPr algn="ctr"/>
             <a:r>
               <a:rPr lang="en-US" sz="1400" dirty="0" smtClean="0"/>
-              <a:t>I tried different ranges of amplitudes and frequencies, and the following relationship held for essentially all of the cases. However, when the maximum 1-state probability exceeds 1 (i.e. the 1-state probability vs. time plot for a single frequency no longer looks like a simple sine curve), this relationship breaks down. </a:t>
-            </a:r>
-            <a:r>
-              <a:rPr lang="en-US" sz="1400" dirty="0" smtClean="0"/>
-              <a:t>Although simulation data may exceed p = 1, experimental data is NOT likely to do so. We’ll probably see the 1-state probability going haywire in </a:t>
+              <a:t>I tried different ranges of amplitudes and frequencies, and the following relationship held for almost all of the cases (± 3 on the last digit of fitted parameters). However, when the maximum 1-state probability exceeds 1 (i.e. the 1-state probability vs. time plot for a single frequency no longer looks like a simple sine curve), this relationship breaks down. Although simulation data may exceed p = 1, experimental data is NOT likely to do so. We’ll probably see the 1-state probability going haywire in </a:t>
             </a:r>
             <a:r>
               <a:rPr lang="en-US" sz="1400" dirty="0" err="1" smtClean="0"/>
@@ -4994,8 +5976,8 @@
           </a:p>
         </p:txBody>
       </p:sp>
-      <mc:AlternateContent xmlns:mc="http://schemas.openxmlformats.org/markup-compatibility/2006">
-        <mc:Choice xmlns:a14="http://schemas.microsoft.com/office/drawing/2010/main" Requires="a14">
+      <mc:AlternateContent xmlns:mc="http://schemas.openxmlformats.org/markup-compatibility/2006" xmlns:a14="http://schemas.microsoft.com/office/drawing/2010/main">
+        <mc:Choice Requires="a14">
           <p:sp>
             <p:nvSpPr>
               <p:cNvPr id="6" name="TextBox 5"/>
@@ -5193,7 +6175,7 @@
             </p:txBody>
           </p:sp>
         </mc:Choice>
-        <mc:Fallback>
+        <mc:Fallback xmlns="">
           <p:sp>
             <p:nvSpPr>
               <p:cNvPr id="6" name="TextBox 5"/>
@@ -5616,8 +6598,8 @@
           </a:prstGeom>
         </p:spPr>
       </p:pic>
-      <mc:AlternateContent xmlns:mc="http://schemas.openxmlformats.org/markup-compatibility/2006">
-        <mc:Choice xmlns:a14="http://schemas.microsoft.com/office/drawing/2010/main" Requires="a14">
+      <mc:AlternateContent xmlns:mc="http://schemas.openxmlformats.org/markup-compatibility/2006" xmlns:a14="http://schemas.microsoft.com/office/drawing/2010/main">
+        <mc:Choice Requires="a14">
           <p:sp>
             <p:nvSpPr>
               <p:cNvPr id="6" name="TextBox 5"/>
@@ -5723,7 +6705,7 @@
             </p:txBody>
           </p:sp>
         </mc:Choice>
-        <mc:Fallback>
+        <mc:Fallback xmlns="">
           <p:sp>
             <p:nvSpPr>
               <p:cNvPr id="6" name="TextBox 5"/>
@@ -5762,8 +6744,8 @@
           </p:sp>
         </mc:Fallback>
       </mc:AlternateContent>
-      <mc:AlternateContent xmlns:mc="http://schemas.openxmlformats.org/markup-compatibility/2006">
-        <mc:Choice xmlns:a14="http://schemas.microsoft.com/office/drawing/2010/main" Requires="a14">
+      <mc:AlternateContent xmlns:mc="http://schemas.openxmlformats.org/markup-compatibility/2006" xmlns:a14="http://schemas.microsoft.com/office/drawing/2010/main">
+        <mc:Choice Requires="a14">
           <p:sp>
             <p:nvSpPr>
               <p:cNvPr id="7" name="TextBox 6"/>
@@ -5869,7 +6851,7 @@
             </p:txBody>
           </p:sp>
         </mc:Choice>
-        <mc:Fallback>
+        <mc:Fallback xmlns="">
           <p:sp>
             <p:nvSpPr>
               <p:cNvPr id="7" name="TextBox 6"/>
@@ -5938,8 +6920,8 @@
           <a:chExt cx="0" cy="0"/>
         </a:xfrm>
       </p:grpSpPr>
-      <mc:AlternateContent xmlns:mc="http://schemas.openxmlformats.org/markup-compatibility/2006">
-        <mc:Choice xmlns:a14="http://schemas.microsoft.com/office/drawing/2010/main" Requires="a14">
+      <mc:AlternateContent xmlns:mc="http://schemas.openxmlformats.org/markup-compatibility/2006" xmlns:a14="http://schemas.microsoft.com/office/drawing/2010/main">
+        <mc:Choice Requires="a14">
           <p:sp>
             <p:nvSpPr>
               <p:cNvPr id="2" name="Content Placeholder 1"/>
@@ -5950,7 +6932,12 @@
                 <p:ph sz="quarter" idx="10"/>
               </p:nvPr>
             </p:nvSpPr>
-            <p:spPr/>
+            <p:spPr>
+              <a:xfrm>
+                <a:off x="389242" y="1049254"/>
+                <a:ext cx="10915522" cy="4830616"/>
+              </a:xfrm>
+            </p:spPr>
             <p:txBody>
               <a:bodyPr/>
               <a:lstStyle/>
@@ -6233,13 +7220,49 @@
                 </a14:m>
                 <a:r>
                   <a:rPr lang="en-US" b="0" dirty="0" smtClean="0"/>
-                  <a:t> to the amount of detuning at the specified frequency.</a:t>
+                  <a:t> to the amount of error at the specified frequency.</a:t>
+                </a:r>
+              </a:p>
+              <a:p>
+                <a:endParaRPr lang="en-US" b="0" dirty="0" smtClean="0"/>
+              </a:p>
+              <a:p>
+                <a:pPr marL="0" indent="0">
+                  <a:buNone/>
+                </a:pPr>
+                <a:r>
+                  <a:rPr lang="en-US" b="0" dirty="0" smtClean="0"/>
+                  <a:t>***</a:t>
+                </a:r>
+                <a:r>
+                  <a:rPr lang="en-US" b="0" i="1" dirty="0" smtClean="0"/>
+                  <a:t>Concern: </a:t>
+                </a:r>
+                <a:r>
+                  <a:rPr lang="en-US" b="0" dirty="0" smtClean="0"/>
+                  <a:t>the simulations were all done using </a:t>
+                </a:r>
+                <a:r>
+                  <a:rPr lang="en-US" b="0" dirty="0" err="1" smtClean="0"/>
+                  <a:t>Gx^L</a:t>
+                </a:r>
+                <a:r>
+                  <a:rPr lang="en-US" b="0" dirty="0" smtClean="0"/>
+                  <a:t> experiments where the drifting parameter was the </a:t>
+                </a:r>
+                <a:r>
+                  <a:rPr lang="en-US" b="0" dirty="0" err="1" smtClean="0"/>
+                  <a:t>Gx</a:t>
+                </a:r>
+                <a:r>
+                  <a:rPr lang="en-US" b="0" dirty="0" smtClean="0"/>
+                  <a:t> amplitude. My model for converting power to 1-state probability is then only valid for amplitude errors. I’ll need to see what simulated Ramsey experiments generate for a drifting frequency detuning.****</a:t>
                 </a:r>
               </a:p>
             </p:txBody>
           </p:sp>
         </mc:Choice>
-        <mc:Fallback>
+        <mc:Fallback xmlns="">
           <p:sp>
             <p:nvSpPr>
               <p:cNvPr id="2" name="Content Placeholder 1"/>
@@ -6251,10 +7274,14 @@
               </p:nvPr>
             </p:nvSpPr>
             <p:spPr>
+              <a:xfrm>
+                <a:off x="389242" y="1049254"/>
+                <a:ext cx="10915522" cy="4830616"/>
+              </a:xfrm>
               <a:blipFill>
                 <a:blip r:embed="rId2"/>
                 <a:stretch>
-                  <a:fillRect l="-503"/>
+                  <a:fillRect l="-615" r="-1061" b="-9962"/>
                 </a:stretch>
               </a:blipFill>
             </p:spPr>
@@ -6300,6 +7327,339 @@
     <p:extLst>
       <p:ext uri="{BB962C8B-B14F-4D97-AF65-F5344CB8AC3E}">
         <p14:creationId xmlns:p14="http://schemas.microsoft.com/office/powerpoint/2010/main" val="2988728982"/>
+      </p:ext>
+    </p:extLst>
+  </p:cSld>
+  <p:clrMapOvr>
+    <a:masterClrMapping/>
+  </p:clrMapOvr>
+</p:sld>
+</file>
+
+<file path=ppt/slides/slide9.xml><?xml version="1.0" encoding="utf-8"?>
+<p:sld xmlns:a="http://schemas.openxmlformats.org/drawingml/2006/main" xmlns:r="http://schemas.openxmlformats.org/officeDocument/2006/relationships" xmlns:p="http://schemas.openxmlformats.org/presentationml/2006/main">
+  <p:cSld>
+    <p:spTree>
+      <p:nvGrpSpPr>
+        <p:cNvPr id="1" name=""/>
+        <p:cNvGrpSpPr/>
+        <p:nvPr/>
+      </p:nvGrpSpPr>
+      <p:grpSpPr>
+        <a:xfrm>
+          <a:off x="0" y="0"/>
+          <a:ext cx="0" cy="0"/>
+          <a:chOff x="0" y="0"/>
+          <a:chExt cx="0" cy="0"/>
+        </a:xfrm>
+      </p:grpSpPr>
+      <p:sp>
+        <p:nvSpPr>
+          <p:cNvPr id="2" name="Content Placeholder 1"/>
+          <p:cNvSpPr>
+            <a:spLocks noGrp="1"/>
+          </p:cNvSpPr>
+          <p:nvPr>
+            <p:ph sz="quarter" idx="10"/>
+          </p:nvPr>
+        </p:nvSpPr>
+        <p:spPr/>
+        <p:txBody>
+          <a:bodyPr/>
+          <a:lstStyle/>
+          <a:p>
+            <a:r>
+              <a:rPr lang="en-US" dirty="0" err="1" smtClean="0"/>
+              <a:t>Gx</a:t>
+            </a:r>
+            <a:r>
+              <a:rPr lang="en-US" dirty="0" smtClean="0"/>
+              <a:t>(32Gi)</a:t>
+            </a:r>
+            <a:r>
+              <a:rPr lang="en-US" dirty="0" err="1" smtClean="0"/>
+              <a:t>Gy</a:t>
+            </a:r>
+            <a:r>
+              <a:rPr lang="en-US" dirty="0" smtClean="0"/>
+              <a:t>: 2018_08_27_1627_08_DRIFT</a:t>
+            </a:r>
+            <a:endParaRPr lang="en-US" dirty="0"/>
+          </a:p>
+        </p:txBody>
+      </p:sp>
+      <p:sp>
+        <p:nvSpPr>
+          <p:cNvPr id="3" name="Title 2"/>
+          <p:cNvSpPr>
+            <a:spLocks noGrp="1"/>
+          </p:cNvSpPr>
+          <p:nvPr>
+            <p:ph type="title"/>
+          </p:nvPr>
+        </p:nvSpPr>
+        <p:spPr/>
+        <p:txBody>
+          <a:bodyPr/>
+          <a:lstStyle/>
+          <a:p>
+            <a:r>
+              <a:rPr lang="en-US" dirty="0" smtClean="0"/>
+              <a:t>More experimental data, using Ramsey experiments</a:t>
+            </a:r>
+            <a:endParaRPr lang="en-US" dirty="0"/>
+          </a:p>
+        </p:txBody>
+      </p:sp>
+      <p:pic>
+        <p:nvPicPr>
+          <p:cNvPr id="4" name="Picture 3"/>
+          <p:cNvPicPr>
+            <a:picLocks noChangeAspect="1"/>
+          </p:cNvPicPr>
+          <p:nvPr/>
+        </p:nvPicPr>
+        <p:blipFill rotWithShape="1">
+          <a:blip r:embed="rId2"/>
+          <a:srcRect b="12616"/>
+          <a:stretch/>
+        </p:blipFill>
+        <p:spPr>
+          <a:xfrm>
+            <a:off x="1560145" y="1783006"/>
+            <a:ext cx="8810625" cy="2671763"/>
+          </a:xfrm>
+          <a:prstGeom prst="rect">
+            <a:avLst/>
+          </a:prstGeom>
+        </p:spPr>
+      </p:pic>
+      <mc:AlternateContent xmlns:mc="http://schemas.openxmlformats.org/markup-compatibility/2006" xmlns:a14="http://schemas.microsoft.com/office/drawing/2010/main">
+        <mc:Choice Requires="a14">
+          <p:sp>
+            <p:nvSpPr>
+              <p:cNvPr id="5" name="TextBox 4"/>
+              <p:cNvSpPr txBox="1"/>
+              <p:nvPr/>
+            </p:nvSpPr>
+            <p:spPr>
+              <a:xfrm>
+                <a:off x="3201104" y="4716326"/>
+                <a:ext cx="5779477" cy="1145826"/>
+              </a:xfrm>
+              <a:prstGeom prst="rect">
+                <a:avLst/>
+              </a:prstGeom>
+              <a:noFill/>
+            </p:spPr>
+            <p:txBody>
+              <a:bodyPr wrap="square" rtlCol="0">
+                <a:spAutoFit/>
+              </a:bodyPr>
+              <a:lstStyle/>
+              <a:p>
+                <a:pPr algn="ctr"/>
+                <a:r>
+                  <a:rPr lang="en-US" sz="1400" b="1" dirty="0" smtClean="0"/>
+                  <a:t>Frequency: </a:t>
+                </a:r>
+                <a:r>
+                  <a:rPr lang="en-US" sz="1400" dirty="0" smtClean="0"/>
+                  <a:t>1.208 Hz</a:t>
+                </a:r>
+                <a:r>
+                  <a:rPr lang="en-US" sz="1400" b="1" dirty="0" smtClean="0"/>
+                  <a:t>, Norm. Power: </a:t>
+                </a:r>
+                <a:r>
+                  <a:rPr lang="en-US" sz="1400" dirty="0" smtClean="0"/>
+                  <a:t>2.9e-4</a:t>
+                </a:r>
+                <a:r>
+                  <a:rPr lang="en-US" sz="1400" b="1" dirty="0" smtClean="0"/>
+                  <a:t>, Max </a:t>
+                </a:r>
+                <a14:m>
+                  <m:oMath xmlns:m="http://schemas.openxmlformats.org/officeDocument/2006/math">
+                    <m:f>
+                      <m:fPr>
+                        <m:ctrlPr>
+                          <a:rPr lang="en-US" sz="1400" i="1">
+                            <a:latin typeface="Cambria Math" panose="02040503050406030204" pitchFamily="18" charset="0"/>
+                            <a:ea typeface="Cambria Math" panose="02040503050406030204" pitchFamily="18" charset="0"/>
+                          </a:rPr>
+                        </m:ctrlPr>
+                      </m:fPr>
+                      <m:num>
+                        <m:r>
+                          <a:rPr lang="en-US" sz="1400" i="1">
+                            <a:latin typeface="Cambria Math" panose="02040503050406030204" pitchFamily="18" charset="0"/>
+                            <a:ea typeface="Cambria Math" panose="02040503050406030204" pitchFamily="18" charset="0"/>
+                          </a:rPr>
+                          <m:t>∆</m:t>
+                        </m:r>
+                        <m:r>
+                          <a:rPr lang="en-US" sz="1400" i="1">
+                            <a:latin typeface="Cambria Math" panose="02040503050406030204" pitchFamily="18" charset="0"/>
+                            <a:ea typeface="Cambria Math" panose="02040503050406030204" pitchFamily="18" charset="0"/>
+                          </a:rPr>
+                          <m:t>𝑝</m:t>
+                        </m:r>
+                      </m:num>
+                      <m:den>
+                        <m:r>
+                          <a:rPr lang="en-US" sz="1400" i="1">
+                            <a:latin typeface="Cambria Math" panose="02040503050406030204" pitchFamily="18" charset="0"/>
+                            <a:ea typeface="Cambria Math" panose="02040503050406030204" pitchFamily="18" charset="0"/>
+                          </a:rPr>
+                          <m:t>𝑠</m:t>
+                        </m:r>
+                      </m:den>
+                    </m:f>
+                  </m:oMath>
+                </a14:m>
+                <a:r>
+                  <a:rPr lang="en-US" sz="1400" b="1" dirty="0" smtClean="0"/>
+                  <a:t> : </a:t>
+                </a:r>
+                <a:r>
+                  <a:rPr lang="en-US" sz="1400" dirty="0" smtClean="0"/>
+                  <a:t>0.0253</a:t>
+                </a:r>
+              </a:p>
+              <a:p>
+                <a:pPr algn="ctr"/>
+                <a:endParaRPr lang="en-US" sz="1400" b="1" dirty="0"/>
+              </a:p>
+              <a:p>
+                <a:pPr algn="ctr"/>
+                <a:r>
+                  <a:rPr lang="en-US" sz="1400" b="1" dirty="0"/>
+                  <a:t>Frequency: </a:t>
+                </a:r>
+                <a:r>
+                  <a:rPr lang="en-US" sz="1400" dirty="0" smtClean="0"/>
+                  <a:t>0.009 </a:t>
+                </a:r>
+                <a:r>
+                  <a:rPr lang="en-US" sz="1400" dirty="0"/>
+                  <a:t>Hz</a:t>
+                </a:r>
+                <a:r>
+                  <a:rPr lang="en-US" sz="1400" b="1" dirty="0"/>
+                  <a:t>, Norm. Power: </a:t>
+                </a:r>
+                <a:r>
+                  <a:rPr lang="en-US" sz="1400" dirty="0" smtClean="0"/>
+                  <a:t>0.0002,</a:t>
+                </a:r>
+                <a:r>
+                  <a:rPr lang="en-US" sz="1400" b="1" dirty="0" smtClean="0"/>
+                  <a:t> </a:t>
+                </a:r>
+                <a:r>
+                  <a:rPr lang="en-US" sz="1400" b="1" dirty="0"/>
+                  <a:t>Max </a:t>
+                </a:r>
+                <a14:m>
+                  <m:oMath xmlns:m="http://schemas.openxmlformats.org/officeDocument/2006/math">
+                    <m:f>
+                      <m:fPr>
+                        <m:ctrlPr>
+                          <a:rPr lang="en-US" sz="1400" i="1">
+                            <a:latin typeface="Cambria Math" panose="02040503050406030204" pitchFamily="18" charset="0"/>
+                            <a:ea typeface="Cambria Math" panose="02040503050406030204" pitchFamily="18" charset="0"/>
+                          </a:rPr>
+                        </m:ctrlPr>
+                      </m:fPr>
+                      <m:num>
+                        <m:r>
+                          <a:rPr lang="en-US" sz="1400" i="1">
+                            <a:latin typeface="Cambria Math" panose="02040503050406030204" pitchFamily="18" charset="0"/>
+                            <a:ea typeface="Cambria Math" panose="02040503050406030204" pitchFamily="18" charset="0"/>
+                          </a:rPr>
+                          <m:t>∆</m:t>
+                        </m:r>
+                        <m:r>
+                          <a:rPr lang="en-US" sz="1400" i="1">
+                            <a:latin typeface="Cambria Math" panose="02040503050406030204" pitchFamily="18" charset="0"/>
+                            <a:ea typeface="Cambria Math" panose="02040503050406030204" pitchFamily="18" charset="0"/>
+                          </a:rPr>
+                          <m:t>𝑝</m:t>
+                        </m:r>
+                      </m:num>
+                      <m:den>
+                        <m:r>
+                          <a:rPr lang="en-US" sz="1400" i="1">
+                            <a:latin typeface="Cambria Math" panose="02040503050406030204" pitchFamily="18" charset="0"/>
+                            <a:ea typeface="Cambria Math" panose="02040503050406030204" pitchFamily="18" charset="0"/>
+                          </a:rPr>
+                          <m:t>𝑠</m:t>
+                        </m:r>
+                      </m:den>
+                    </m:f>
+                  </m:oMath>
+                </a14:m>
+                <a:r>
+                  <a:rPr lang="en-US" sz="1400" b="1" dirty="0"/>
+                  <a:t> : </a:t>
+                </a:r>
+                <a:r>
+                  <a:rPr lang="en-US" sz="1400" dirty="0" smtClean="0"/>
+                  <a:t>0.001</a:t>
+                </a:r>
+                <a:endParaRPr lang="en-US" sz="1400" dirty="0"/>
+              </a:p>
+              <a:p>
+                <a:pPr algn="ctr"/>
+                <a:endParaRPr lang="en-US" sz="1400" b="1" dirty="0"/>
+              </a:p>
+            </p:txBody>
+          </p:sp>
+        </mc:Choice>
+        <mc:Fallback xmlns="">
+          <p:sp>
+            <p:nvSpPr>
+              <p:cNvPr id="5" name="TextBox 4"/>
+              <p:cNvSpPr txBox="1">
+                <a:spLocks noRot="1" noChangeAspect="1" noMove="1" noResize="1" noEditPoints="1" noAdjustHandles="1" noChangeArrowheads="1" noChangeShapeType="1" noTextEdit="1"/>
+              </p:cNvSpPr>
+              <p:nvPr/>
+            </p:nvSpPr>
+            <p:spPr>
+              <a:xfrm>
+                <a:off x="3201104" y="4716326"/>
+                <a:ext cx="5779477" cy="1145826"/>
+              </a:xfrm>
+              <a:prstGeom prst="rect">
+                <a:avLst/>
+              </a:prstGeom>
+              <a:blipFill>
+                <a:blip r:embed="rId3"/>
+                <a:stretch>
+                  <a:fillRect/>
+                </a:stretch>
+              </a:blipFill>
+            </p:spPr>
+            <p:txBody>
+              <a:bodyPr/>
+              <a:lstStyle/>
+              <a:p>
+                <a:r>
+                  <a:rPr lang="en-US">
+                    <a:noFill/>
+                  </a:rPr>
+                  <a:t> </a:t>
+                </a:r>
+              </a:p>
+            </p:txBody>
+          </p:sp>
+        </mc:Fallback>
+      </mc:AlternateContent>
+    </p:spTree>
+    <p:extLst>
+      <p:ext uri="{BB962C8B-B14F-4D97-AF65-F5344CB8AC3E}">
+        <p14:creationId xmlns:p14="http://schemas.microsoft.com/office/powerpoint/2010/main" val="3556836327"/>
       </p:ext>
     </p:extLst>
   </p:cSld>

</xml_diff>